<commit_message>
link updated in the ppt slides;
</commit_message>
<xml_diff>
--- a/Rugby Club Management .pptx
+++ b/Rugby Club Management .pptx
@@ -5,10 +5,10 @@
     <p:sldMasterId id="2147483648" r:id="rId1"/>
   </p:sldMasterIdLst>
   <p:notesMasterIdLst>
-    <p:notesMasterId r:id="rId9"/>
+    <p:notesMasterId r:id="rId10"/>
   </p:notesMasterIdLst>
   <p:handoutMasterIdLst>
-    <p:handoutMasterId r:id="rId10"/>
+    <p:handoutMasterId r:id="rId11"/>
   </p:handoutMasterIdLst>
   <p:sldIdLst>
     <p:sldId id="256" r:id="rId2"/>
@@ -18,6 +18,7 @@
     <p:sldId id="266" r:id="rId6"/>
     <p:sldId id="267" r:id="rId7"/>
     <p:sldId id="262" r:id="rId8"/>
+    <p:sldId id="268" r:id="rId9"/>
   </p:sldIdLst>
   <p:sldSz cx="12192000" cy="6858000"/>
   <p:notesSz cx="6858000" cy="9144000"/>
@@ -2513,6 +2514,13 @@
         </dgm:presLayoutVars>
       </dgm:prSet>
       <dgm:spPr/>
+      <dgm:t>
+        <a:bodyPr/>
+        <a:lstStyle/>
+        <a:p>
+          <a:endParaRPr lang="en-US"/>
+        </a:p>
+      </dgm:t>
     </dgm:pt>
     <dgm:pt modelId="{CC4A2AC8-13F0-42A1-B5D8-E984AF7A71F1}" type="pres">
       <dgm:prSet presAssocID="{5D53DF20-CDFB-41B6-94B4-059417367E18}" presName="compNode" presStyleCnt="0"/>
@@ -2532,7 +2540,7 @@
                 <a14:useLocalDpi xmlns:a14="http://schemas.microsoft.com/office/drawing/2010/main" val="0"/>
               </a:ext>
               <a:ext uri="{96DAC541-7B7A-43D3-8B79-37D633B846F1}">
-                <asvg:svgBlip xmlns:asvg="http://schemas.microsoft.com/office/drawing/2016/SVG/main" r:embed="rId2"/>
+                <asvg:svgBlip xmlns:asvg="http://schemas.microsoft.com/office/drawing/2016/SVG/main" xmlns="" r:embed="rId2"/>
               </a:ext>
             </a:extLst>
           </a:blip>
@@ -2559,6 +2567,13 @@
         </dgm:presLayoutVars>
       </dgm:prSet>
       <dgm:spPr/>
+      <dgm:t>
+        <a:bodyPr/>
+        <a:lstStyle/>
+        <a:p>
+          <a:endParaRPr lang="en-US"/>
+        </a:p>
+      </dgm:t>
     </dgm:pt>
     <dgm:pt modelId="{593C8A49-3B7E-43A4-BA39-0E66B1D7133E}" type="pres">
       <dgm:prSet presAssocID="{105686D5-503F-4871-A3A3-6EA664100A0D}" presName="sibTrans" presStyleCnt="0"/>
@@ -2582,7 +2597,7 @@
                 <a14:useLocalDpi xmlns:a14="http://schemas.microsoft.com/office/drawing/2010/main" val="0"/>
               </a:ext>
               <a:ext uri="{96DAC541-7B7A-43D3-8B79-37D633B846F1}">
-                <asvg:svgBlip xmlns:asvg="http://schemas.microsoft.com/office/drawing/2016/SVG/main" r:embed="rId4"/>
+                <asvg:svgBlip xmlns:asvg="http://schemas.microsoft.com/office/drawing/2016/SVG/main" xmlns="" r:embed="rId4"/>
               </a:ext>
             </a:extLst>
           </a:blip>
@@ -2609,6 +2624,13 @@
         </dgm:presLayoutVars>
       </dgm:prSet>
       <dgm:spPr/>
+      <dgm:t>
+        <a:bodyPr/>
+        <a:lstStyle/>
+        <a:p>
+          <a:endParaRPr lang="en-US"/>
+        </a:p>
+      </dgm:t>
     </dgm:pt>
     <dgm:pt modelId="{24369D5C-77DC-4B45-B03B-C8CFA9E4392A}" type="pres">
       <dgm:prSet presAssocID="{D6B2B815-5B26-4381-B211-908BE80157D8}" presName="sibTrans" presStyleCnt="0"/>
@@ -2632,7 +2654,7 @@
                 <a14:useLocalDpi xmlns:a14="http://schemas.microsoft.com/office/drawing/2010/main" val="0"/>
               </a:ext>
               <a:ext uri="{96DAC541-7B7A-43D3-8B79-37D633B846F1}">
-                <asvg:svgBlip xmlns:asvg="http://schemas.microsoft.com/office/drawing/2016/SVG/main" r:embed="rId6"/>
+                <asvg:svgBlip xmlns:asvg="http://schemas.microsoft.com/office/drawing/2016/SVG/main" xmlns="" r:embed="rId6"/>
               </a:ext>
             </a:extLst>
           </a:blip>
@@ -2659,16 +2681,23 @@
         </dgm:presLayoutVars>
       </dgm:prSet>
       <dgm:spPr/>
+      <dgm:t>
+        <a:bodyPr/>
+        <a:lstStyle/>
+        <a:p>
+          <a:endParaRPr lang="en-US"/>
+        </a:p>
+      </dgm:t>
     </dgm:pt>
   </dgm:ptLst>
   <dgm:cxnLst>
-    <dgm:cxn modelId="{DD4B8D10-C5C0-4878-B7CF-E44F6AD5EBAC}" srcId="{6EE1C3BA-B58B-4B2D-86A1-BB65855F2BEB}" destId="{458CCA1A-44F0-4C05-8D55-2698441C4202}" srcOrd="2" destOrd="0" parTransId="{C9B8130E-F363-4753-9F7F-2E08005A1B44}" sibTransId="{6A53EC99-0913-40F4-898C-83D5CB80E262}"/>
+    <dgm:cxn modelId="{356F3AA8-9747-45E4-AF0E-B0C89314169D}" type="presOf" srcId="{458CCA1A-44F0-4C05-8D55-2698441C4202}" destId="{0FB42F5C-F1D2-451F-B544-15C4FA9AAA7F}" srcOrd="0" destOrd="0" presId="urn:microsoft.com/office/officeart/2018/2/layout/IconVerticalSolidList"/>
+    <dgm:cxn modelId="{1CEB52B7-6934-4CFC-8353-CE59797027B7}" type="presOf" srcId="{BC59857D-9C26-4537-A61F-0CC83075371F}" destId="{BE94D43E-756B-4AC1-9F14-472D1AF8FC18}" srcOrd="0" destOrd="0" presId="urn:microsoft.com/office/officeart/2018/2/layout/IconVerticalSolidList"/>
+    <dgm:cxn modelId="{5B2025B4-3591-4961-8465-99F98D673C64}" srcId="{6EE1C3BA-B58B-4B2D-86A1-BB65855F2BEB}" destId="{5D53DF20-CDFB-41B6-94B4-059417367E18}" srcOrd="0" destOrd="0" parTransId="{DF1F7B4A-EE26-441B-AD42-5EA298DAD9A8}" sibTransId="{105686D5-503F-4871-A3A3-6EA664100A0D}"/>
+    <dgm:cxn modelId="{295F71BF-4E21-4DCD-A558-B1C0B3E269D9}" srcId="{6EE1C3BA-B58B-4B2D-86A1-BB65855F2BEB}" destId="{BC59857D-9C26-4537-A61F-0CC83075371F}" srcOrd="1" destOrd="0" parTransId="{22979518-88F3-4FDB-954E-4987080BBA55}" sibTransId="{D6B2B815-5B26-4381-B211-908BE80157D8}"/>
     <dgm:cxn modelId="{82353641-15BB-44AA-9D19-C33EE8FF3EC1}" type="presOf" srcId="{6EE1C3BA-B58B-4B2D-86A1-BB65855F2BEB}" destId="{7D1DE92B-2DEB-4FF5-B73D-C25F3AF6DBC9}" srcOrd="0" destOrd="0" presId="urn:microsoft.com/office/officeart/2018/2/layout/IconVerticalSolidList"/>
     <dgm:cxn modelId="{34EC95A5-2AA7-4304-8416-41BF5B2A4CC0}" type="presOf" srcId="{5D53DF20-CDFB-41B6-94B4-059417367E18}" destId="{7B9725C1-15DE-4165-B239-C0AA86581B00}" srcOrd="0" destOrd="0" presId="urn:microsoft.com/office/officeart/2018/2/layout/IconVerticalSolidList"/>
-    <dgm:cxn modelId="{356F3AA8-9747-45E4-AF0E-B0C89314169D}" type="presOf" srcId="{458CCA1A-44F0-4C05-8D55-2698441C4202}" destId="{0FB42F5C-F1D2-451F-B544-15C4FA9AAA7F}" srcOrd="0" destOrd="0" presId="urn:microsoft.com/office/officeart/2018/2/layout/IconVerticalSolidList"/>
-    <dgm:cxn modelId="{5B2025B4-3591-4961-8465-99F98D673C64}" srcId="{6EE1C3BA-B58B-4B2D-86A1-BB65855F2BEB}" destId="{5D53DF20-CDFB-41B6-94B4-059417367E18}" srcOrd="0" destOrd="0" parTransId="{DF1F7B4A-EE26-441B-AD42-5EA298DAD9A8}" sibTransId="{105686D5-503F-4871-A3A3-6EA664100A0D}"/>
-    <dgm:cxn modelId="{1CEB52B7-6934-4CFC-8353-CE59797027B7}" type="presOf" srcId="{BC59857D-9C26-4537-A61F-0CC83075371F}" destId="{BE94D43E-756B-4AC1-9F14-472D1AF8FC18}" srcOrd="0" destOrd="0" presId="urn:microsoft.com/office/officeart/2018/2/layout/IconVerticalSolidList"/>
-    <dgm:cxn modelId="{295F71BF-4E21-4DCD-A558-B1C0B3E269D9}" srcId="{6EE1C3BA-B58B-4B2D-86A1-BB65855F2BEB}" destId="{BC59857D-9C26-4537-A61F-0CC83075371F}" srcOrd="1" destOrd="0" parTransId="{22979518-88F3-4FDB-954E-4987080BBA55}" sibTransId="{D6B2B815-5B26-4381-B211-908BE80157D8}"/>
+    <dgm:cxn modelId="{DD4B8D10-C5C0-4878-B7CF-E44F6AD5EBAC}" srcId="{6EE1C3BA-B58B-4B2D-86A1-BB65855F2BEB}" destId="{458CCA1A-44F0-4C05-8D55-2698441C4202}" srcOrd="2" destOrd="0" parTransId="{C9B8130E-F363-4753-9F7F-2E08005A1B44}" sibTransId="{6A53EC99-0913-40F4-898C-83D5CB80E262}"/>
     <dgm:cxn modelId="{35ABB3CE-E186-4424-B390-2897DCE6E4C6}" type="presParOf" srcId="{7D1DE92B-2DEB-4FF5-B73D-C25F3AF6DBC9}" destId="{CC4A2AC8-13F0-42A1-B5D8-E984AF7A71F1}" srcOrd="0" destOrd="0" presId="urn:microsoft.com/office/officeart/2018/2/layout/IconVerticalSolidList"/>
     <dgm:cxn modelId="{6E811F1B-0F92-4D71-80C3-AD36E18A4B57}" type="presParOf" srcId="{CC4A2AC8-13F0-42A1-B5D8-E984AF7A71F1}" destId="{2A7519CA-9EB3-4255-9A4B-0CFFF54C3125}" srcOrd="0" destOrd="0" presId="urn:microsoft.com/office/officeart/2018/2/layout/IconVerticalSolidList"/>
     <dgm:cxn modelId="{9D1A5E45-B323-4478-9D45-51AFB178A2DB}" type="presParOf" srcId="{CC4A2AC8-13F0-42A1-B5D8-E984AF7A71F1}" destId="{F8085307-4B25-4CE5-9F86-0AAB3873EF1F}" srcOrd="1" destOrd="0" presId="urn:microsoft.com/office/officeart/2018/2/layout/IconVerticalSolidList"/>
@@ -2900,6 +2929,13 @@
         </dgm:presLayoutVars>
       </dgm:prSet>
       <dgm:spPr/>
+      <dgm:t>
+        <a:bodyPr/>
+        <a:lstStyle/>
+        <a:p>
+          <a:endParaRPr lang="en-US"/>
+        </a:p>
+      </dgm:t>
     </dgm:pt>
     <dgm:pt modelId="{4F8BE2CE-5CA7-4CD5-854E-11FC67CE0E80}" type="pres">
       <dgm:prSet presAssocID="{298E36AD-8AC6-4BD6-A39B-322591E1238E}" presName="thickLine" presStyleLbl="alignNode1" presStyleIdx="0" presStyleCnt="5"/>
@@ -2912,6 +2948,13 @@
     <dgm:pt modelId="{38EBF77A-9526-4D3F-ADE6-48559CF99FBD}" type="pres">
       <dgm:prSet presAssocID="{298E36AD-8AC6-4BD6-A39B-322591E1238E}" presName="tx1" presStyleLbl="revTx" presStyleIdx="0" presStyleCnt="5"/>
       <dgm:spPr/>
+      <dgm:t>
+        <a:bodyPr/>
+        <a:lstStyle/>
+        <a:p>
+          <a:endParaRPr lang="en-US"/>
+        </a:p>
+      </dgm:t>
     </dgm:pt>
     <dgm:pt modelId="{67DB6BA7-E356-48C9-BA62-8329F1FC3045}" type="pres">
       <dgm:prSet presAssocID="{298E36AD-8AC6-4BD6-A39B-322591E1238E}" presName="vert1" presStyleCnt="0"/>
@@ -2928,6 +2971,13 @@
     <dgm:pt modelId="{14975301-FA52-42A2-B148-8F1294747BD5}" type="pres">
       <dgm:prSet presAssocID="{9C218BBE-DC27-4AA1-9D66-CBD6ACAD5DBF}" presName="tx1" presStyleLbl="revTx" presStyleIdx="1" presStyleCnt="5"/>
       <dgm:spPr/>
+      <dgm:t>
+        <a:bodyPr/>
+        <a:lstStyle/>
+        <a:p>
+          <a:endParaRPr lang="en-US"/>
+        </a:p>
+      </dgm:t>
     </dgm:pt>
     <dgm:pt modelId="{88CB7AA3-14AB-4D40-B5D9-F7429E711FF6}" type="pres">
       <dgm:prSet presAssocID="{9C218BBE-DC27-4AA1-9D66-CBD6ACAD5DBF}" presName="vert1" presStyleCnt="0"/>
@@ -2944,6 +2994,13 @@
     <dgm:pt modelId="{246A4C03-D7FA-4BF2-9D43-BE770C63417D}" type="pres">
       <dgm:prSet presAssocID="{A68C4353-790E-4F89-A852-1A1F9A821007}" presName="tx1" presStyleLbl="revTx" presStyleIdx="2" presStyleCnt="5"/>
       <dgm:spPr/>
+      <dgm:t>
+        <a:bodyPr/>
+        <a:lstStyle/>
+        <a:p>
+          <a:endParaRPr lang="en-US"/>
+        </a:p>
+      </dgm:t>
     </dgm:pt>
     <dgm:pt modelId="{5B51E621-19A5-4327-9340-D1E9B1E76271}" type="pres">
       <dgm:prSet presAssocID="{A68C4353-790E-4F89-A852-1A1F9A821007}" presName="vert1" presStyleCnt="0"/>
@@ -2960,6 +3017,13 @@
     <dgm:pt modelId="{0D5B195F-3288-4904-AE80-A121553E5A39}" type="pres">
       <dgm:prSet presAssocID="{32E4FB8F-6108-45C0-9763-D13F22EB899E}" presName="tx1" presStyleLbl="revTx" presStyleIdx="3" presStyleCnt="5"/>
       <dgm:spPr/>
+      <dgm:t>
+        <a:bodyPr/>
+        <a:lstStyle/>
+        <a:p>
+          <a:endParaRPr lang="en-US"/>
+        </a:p>
+      </dgm:t>
     </dgm:pt>
     <dgm:pt modelId="{BF30C6B6-EC17-40C5-9B56-AE2AE434F591}" type="pres">
       <dgm:prSet presAssocID="{32E4FB8F-6108-45C0-9763-D13F22EB899E}" presName="vert1" presStyleCnt="0"/>
@@ -2976,6 +3040,13 @@
     <dgm:pt modelId="{2FA8B83E-0F05-4F5A-8018-D193083B47BB}" type="pres">
       <dgm:prSet presAssocID="{69E8C140-22B7-4135-9593-B733C8FB4A21}" presName="tx1" presStyleLbl="revTx" presStyleIdx="4" presStyleCnt="5"/>
       <dgm:spPr/>
+      <dgm:t>
+        <a:bodyPr/>
+        <a:lstStyle/>
+        <a:p>
+          <a:endParaRPr lang="en-US"/>
+        </a:p>
+      </dgm:t>
     </dgm:pt>
     <dgm:pt modelId="{CDA35393-4860-4781-9FD7-2A4D728AEDFD}" type="pres">
       <dgm:prSet presAssocID="{69E8C140-22B7-4135-9593-B733C8FB4A21}" presName="vert1" presStyleCnt="0"/>
@@ -2983,17 +3054,17 @@
     </dgm:pt>
   </dgm:ptLst>
   <dgm:cxnLst>
-    <dgm:cxn modelId="{AA532817-E2F4-43B8-A9F7-FD2297F67820}" srcId="{522C1C43-5A8F-4F6A-AF2A-4A5A4B5C4958}" destId="{298E36AD-8AC6-4BD6-A39B-322591E1238E}" srcOrd="0" destOrd="0" parTransId="{2E4FCF00-E964-46AB-8B97-664D117272E2}" sibTransId="{CF5C1721-737A-4260-B726-C708903221D4}"/>
-    <dgm:cxn modelId="{2277733B-3360-4401-8125-9E92DCF0CE5E}" type="presOf" srcId="{9C218BBE-DC27-4AA1-9D66-CBD6ACAD5DBF}" destId="{14975301-FA52-42A2-B148-8F1294747BD5}" srcOrd="0" destOrd="0" presId="urn:microsoft.com/office/officeart/2008/layout/LinedList"/>
+    <dgm:cxn modelId="{2BB95AD9-A44D-43F1-9CDE-9EF9995A0692}" srcId="{522C1C43-5A8F-4F6A-AF2A-4A5A4B5C4958}" destId="{9C218BBE-DC27-4AA1-9D66-CBD6ACAD5DBF}" srcOrd="1" destOrd="0" parTransId="{113AD054-EF6E-4B7F-8F21-C23ECEFE553D}" sibTransId="{641B8146-E782-4B79-BEEF-11C4D28781DB}"/>
+    <dgm:cxn modelId="{A70269D4-4191-4B09-8D6B-BC1F8F85CF3E}" srcId="{522C1C43-5A8F-4F6A-AF2A-4A5A4B5C4958}" destId="{69E8C140-22B7-4135-9593-B733C8FB4A21}" srcOrd="4" destOrd="0" parTransId="{02AB1C7A-7E8A-47E0-A5F2-30A701EB5C5F}" sibTransId="{73DB359B-9726-407B-B766-8118DF9DA230}"/>
     <dgm:cxn modelId="{4045995A-455C-47FF-989F-22C47DFD2463}" srcId="{522C1C43-5A8F-4F6A-AF2A-4A5A4B5C4958}" destId="{A68C4353-790E-4F89-A852-1A1F9A821007}" srcOrd="2" destOrd="0" parTransId="{A0593633-0A20-4E42-B13D-16A95C6C5C5B}" sibTransId="{2A62E920-C95F-4D55-ABCD-C8A8D5D83C83}"/>
-    <dgm:cxn modelId="{DF70B492-871E-44A2-9E9B-9C9C5ACD7EDE}" type="presOf" srcId="{A68C4353-790E-4F89-A852-1A1F9A821007}" destId="{246A4C03-D7FA-4BF2-9D43-BE770C63417D}" srcOrd="0" destOrd="0" presId="urn:microsoft.com/office/officeart/2008/layout/LinedList"/>
-    <dgm:cxn modelId="{26A2ECC8-1A8B-4743-A035-7D7A96D9EF81}" type="presOf" srcId="{298E36AD-8AC6-4BD6-A39B-322591E1238E}" destId="{38EBF77A-9526-4D3F-ADE6-48559CF99FBD}" srcOrd="0" destOrd="0" presId="urn:microsoft.com/office/officeart/2008/layout/LinedList"/>
     <dgm:cxn modelId="{6ECAA5D0-A6A4-4F3D-B38E-1EDD93F7CA59}" type="presOf" srcId="{32E4FB8F-6108-45C0-9763-D13F22EB899E}" destId="{0D5B195F-3288-4904-AE80-A121553E5A39}" srcOrd="0" destOrd="0" presId="urn:microsoft.com/office/officeart/2008/layout/LinedList"/>
-    <dgm:cxn modelId="{A70269D4-4191-4B09-8D6B-BC1F8F85CF3E}" srcId="{522C1C43-5A8F-4F6A-AF2A-4A5A4B5C4958}" destId="{69E8C140-22B7-4135-9593-B733C8FB4A21}" srcOrd="4" destOrd="0" parTransId="{02AB1C7A-7E8A-47E0-A5F2-30A701EB5C5F}" sibTransId="{73DB359B-9726-407B-B766-8118DF9DA230}"/>
-    <dgm:cxn modelId="{2BB95AD9-A44D-43F1-9CDE-9EF9995A0692}" srcId="{522C1C43-5A8F-4F6A-AF2A-4A5A4B5C4958}" destId="{9C218BBE-DC27-4AA1-9D66-CBD6ACAD5DBF}" srcOrd="1" destOrd="0" parTransId="{113AD054-EF6E-4B7F-8F21-C23ECEFE553D}" sibTransId="{641B8146-E782-4B79-BEEF-11C4D28781DB}"/>
     <dgm:cxn modelId="{24D76BE0-0E29-4438-AF40-6B6BC41E7B28}" srcId="{522C1C43-5A8F-4F6A-AF2A-4A5A4B5C4958}" destId="{32E4FB8F-6108-45C0-9763-D13F22EB899E}" srcOrd="3" destOrd="0" parTransId="{787248E0-8CD9-4BC8-B2DB-4F2633120896}" sibTransId="{FC1CCF7E-FCAD-46D2-A101-92248EFDEBCC}"/>
     <dgm:cxn modelId="{50D780EA-8F34-4AFA-B1A8-AFA5F506E6AD}" type="presOf" srcId="{69E8C140-22B7-4135-9593-B733C8FB4A21}" destId="{2FA8B83E-0F05-4F5A-8018-D193083B47BB}" srcOrd="0" destOrd="0" presId="urn:microsoft.com/office/officeart/2008/layout/LinedList"/>
+    <dgm:cxn modelId="{26A2ECC8-1A8B-4743-A035-7D7A96D9EF81}" type="presOf" srcId="{298E36AD-8AC6-4BD6-A39B-322591E1238E}" destId="{38EBF77A-9526-4D3F-ADE6-48559CF99FBD}" srcOrd="0" destOrd="0" presId="urn:microsoft.com/office/officeart/2008/layout/LinedList"/>
+    <dgm:cxn modelId="{2277733B-3360-4401-8125-9E92DCF0CE5E}" type="presOf" srcId="{9C218BBE-DC27-4AA1-9D66-CBD6ACAD5DBF}" destId="{14975301-FA52-42A2-B148-8F1294747BD5}" srcOrd="0" destOrd="0" presId="urn:microsoft.com/office/officeart/2008/layout/LinedList"/>
+    <dgm:cxn modelId="{AA532817-E2F4-43B8-A9F7-FD2297F67820}" srcId="{522C1C43-5A8F-4F6A-AF2A-4A5A4B5C4958}" destId="{298E36AD-8AC6-4BD6-A39B-322591E1238E}" srcOrd="0" destOrd="0" parTransId="{2E4FCF00-E964-46AB-8B97-664D117272E2}" sibTransId="{CF5C1721-737A-4260-B726-C708903221D4}"/>
     <dgm:cxn modelId="{D161D4F1-CAC6-42BB-88E0-C8FEB531A47C}" type="presOf" srcId="{522C1C43-5A8F-4F6A-AF2A-4A5A4B5C4958}" destId="{5E0D7A7E-76C8-4EE6-B473-69FA85E41CB9}" srcOrd="0" destOrd="0" presId="urn:microsoft.com/office/officeart/2008/layout/LinedList"/>
+    <dgm:cxn modelId="{DF70B492-871E-44A2-9E9B-9C9C5ACD7EDE}" type="presOf" srcId="{A68C4353-790E-4F89-A852-1A1F9A821007}" destId="{246A4C03-D7FA-4BF2-9D43-BE770C63417D}" srcOrd="0" destOrd="0" presId="urn:microsoft.com/office/officeart/2008/layout/LinedList"/>
     <dgm:cxn modelId="{5487E09B-3D5D-41D5-82ED-86E7B3AF65C7}" type="presParOf" srcId="{5E0D7A7E-76C8-4EE6-B473-69FA85E41CB9}" destId="{4F8BE2CE-5CA7-4CD5-854E-11FC67CE0E80}" srcOrd="0" destOrd="0" presId="urn:microsoft.com/office/officeart/2008/layout/LinedList"/>
     <dgm:cxn modelId="{0A39CB4F-CB11-4A7A-A64D-B76C58C0CA45}" type="presParOf" srcId="{5E0D7A7E-76C8-4EE6-B473-69FA85E41CB9}" destId="{F4F9427F-9155-4B0F-9096-EF039534D09D}" srcOrd="1" destOrd="0" presId="urn:microsoft.com/office/officeart/2008/layout/LinedList"/>
     <dgm:cxn modelId="{DD974AFE-6C5A-42BB-9004-D0DEC50EB9EA}" type="presParOf" srcId="{F4F9427F-9155-4B0F-9096-EF039534D09D}" destId="{38EBF77A-9526-4D3F-ADE6-48559CF99FBD}" srcOrd="0" destOrd="0" presId="urn:microsoft.com/office/officeart/2008/layout/LinedList"/>
@@ -3228,6 +3299,13 @@
         </dgm:presLayoutVars>
       </dgm:prSet>
       <dgm:spPr/>
+      <dgm:t>
+        <a:bodyPr/>
+        <a:lstStyle/>
+        <a:p>
+          <a:endParaRPr lang="en-US"/>
+        </a:p>
+      </dgm:t>
     </dgm:pt>
     <dgm:pt modelId="{4F8BE2CE-5CA7-4CD5-854E-11FC67CE0E80}" type="pres">
       <dgm:prSet presAssocID="{298E36AD-8AC6-4BD6-A39B-322591E1238E}" presName="thickLine" presStyleLbl="alignNode1" presStyleIdx="0" presStyleCnt="4"/>
@@ -3240,6 +3318,13 @@
     <dgm:pt modelId="{38EBF77A-9526-4D3F-ADE6-48559CF99FBD}" type="pres">
       <dgm:prSet presAssocID="{298E36AD-8AC6-4BD6-A39B-322591E1238E}" presName="tx1" presStyleLbl="revTx" presStyleIdx="0" presStyleCnt="4"/>
       <dgm:spPr/>
+      <dgm:t>
+        <a:bodyPr/>
+        <a:lstStyle/>
+        <a:p>
+          <a:endParaRPr lang="en-US"/>
+        </a:p>
+      </dgm:t>
     </dgm:pt>
     <dgm:pt modelId="{67DB6BA7-E356-48C9-BA62-8329F1FC3045}" type="pres">
       <dgm:prSet presAssocID="{298E36AD-8AC6-4BD6-A39B-322591E1238E}" presName="vert1" presStyleCnt="0"/>
@@ -3256,6 +3341,13 @@
     <dgm:pt modelId="{14975301-FA52-42A2-B148-8F1294747BD5}" type="pres">
       <dgm:prSet presAssocID="{9C218BBE-DC27-4AA1-9D66-CBD6ACAD5DBF}" presName="tx1" presStyleLbl="revTx" presStyleIdx="1" presStyleCnt="4"/>
       <dgm:spPr/>
+      <dgm:t>
+        <a:bodyPr/>
+        <a:lstStyle/>
+        <a:p>
+          <a:endParaRPr lang="en-US"/>
+        </a:p>
+      </dgm:t>
     </dgm:pt>
     <dgm:pt modelId="{88CB7AA3-14AB-4D40-B5D9-F7429E711FF6}" type="pres">
       <dgm:prSet presAssocID="{9C218BBE-DC27-4AA1-9D66-CBD6ACAD5DBF}" presName="vert1" presStyleCnt="0"/>
@@ -3272,6 +3364,13 @@
     <dgm:pt modelId="{246A4C03-D7FA-4BF2-9D43-BE770C63417D}" type="pres">
       <dgm:prSet presAssocID="{A68C4353-790E-4F89-A852-1A1F9A821007}" presName="tx1" presStyleLbl="revTx" presStyleIdx="2" presStyleCnt="4"/>
       <dgm:spPr/>
+      <dgm:t>
+        <a:bodyPr/>
+        <a:lstStyle/>
+        <a:p>
+          <a:endParaRPr lang="en-US"/>
+        </a:p>
+      </dgm:t>
     </dgm:pt>
     <dgm:pt modelId="{5B51E621-19A5-4327-9340-D1E9B1E76271}" type="pres">
       <dgm:prSet presAssocID="{A68C4353-790E-4F89-A852-1A1F9A821007}" presName="vert1" presStyleCnt="0"/>
@@ -3288,6 +3387,13 @@
     <dgm:pt modelId="{0D5B195F-3288-4904-AE80-A121553E5A39}" type="pres">
       <dgm:prSet presAssocID="{32E4FB8F-6108-45C0-9763-D13F22EB899E}" presName="tx1" presStyleLbl="revTx" presStyleIdx="3" presStyleCnt="4"/>
       <dgm:spPr/>
+      <dgm:t>
+        <a:bodyPr/>
+        <a:lstStyle/>
+        <a:p>
+          <a:endParaRPr lang="en-US"/>
+        </a:p>
+      </dgm:t>
     </dgm:pt>
     <dgm:pt modelId="{BF30C6B6-EC17-40C5-9B56-AE2AE434F591}" type="pres">
       <dgm:prSet presAssocID="{32E4FB8F-6108-45C0-9763-D13F22EB899E}" presName="vert1" presStyleCnt="0"/>
@@ -3295,15 +3401,15 @@
     </dgm:pt>
   </dgm:ptLst>
   <dgm:cxnLst>
+    <dgm:cxn modelId="{2BB95AD9-A44D-43F1-9CDE-9EF9995A0692}" srcId="{522C1C43-5A8F-4F6A-AF2A-4A5A4B5C4958}" destId="{9C218BBE-DC27-4AA1-9D66-CBD6ACAD5DBF}" srcOrd="1" destOrd="0" parTransId="{113AD054-EF6E-4B7F-8F21-C23ECEFE553D}" sibTransId="{641B8146-E782-4B79-BEEF-11C4D28781DB}"/>
+    <dgm:cxn modelId="{4045995A-455C-47FF-989F-22C47DFD2463}" srcId="{522C1C43-5A8F-4F6A-AF2A-4A5A4B5C4958}" destId="{A68C4353-790E-4F89-A852-1A1F9A821007}" srcOrd="2" destOrd="0" parTransId="{A0593633-0A20-4E42-B13D-16A95C6C5C5B}" sibTransId="{2A62E920-C95F-4D55-ABCD-C8A8D5D83C83}"/>
+    <dgm:cxn modelId="{6ECAA5D0-A6A4-4F3D-B38E-1EDD93F7CA59}" type="presOf" srcId="{32E4FB8F-6108-45C0-9763-D13F22EB899E}" destId="{0D5B195F-3288-4904-AE80-A121553E5A39}" srcOrd="0" destOrd="0" presId="urn:microsoft.com/office/officeart/2008/layout/LinedList"/>
+    <dgm:cxn modelId="{24D76BE0-0E29-4438-AF40-6B6BC41E7B28}" srcId="{522C1C43-5A8F-4F6A-AF2A-4A5A4B5C4958}" destId="{32E4FB8F-6108-45C0-9763-D13F22EB899E}" srcOrd="3" destOrd="0" parTransId="{787248E0-8CD9-4BC8-B2DB-4F2633120896}" sibTransId="{FC1CCF7E-FCAD-46D2-A101-92248EFDEBCC}"/>
+    <dgm:cxn modelId="{26A2ECC8-1A8B-4743-A035-7D7A96D9EF81}" type="presOf" srcId="{298E36AD-8AC6-4BD6-A39B-322591E1238E}" destId="{38EBF77A-9526-4D3F-ADE6-48559CF99FBD}" srcOrd="0" destOrd="0" presId="urn:microsoft.com/office/officeart/2008/layout/LinedList"/>
+    <dgm:cxn modelId="{2277733B-3360-4401-8125-9E92DCF0CE5E}" type="presOf" srcId="{9C218BBE-DC27-4AA1-9D66-CBD6ACAD5DBF}" destId="{14975301-FA52-42A2-B148-8F1294747BD5}" srcOrd="0" destOrd="0" presId="urn:microsoft.com/office/officeart/2008/layout/LinedList"/>
     <dgm:cxn modelId="{AA532817-E2F4-43B8-A9F7-FD2297F67820}" srcId="{522C1C43-5A8F-4F6A-AF2A-4A5A4B5C4958}" destId="{298E36AD-8AC6-4BD6-A39B-322591E1238E}" srcOrd="0" destOrd="0" parTransId="{2E4FCF00-E964-46AB-8B97-664D117272E2}" sibTransId="{CF5C1721-737A-4260-B726-C708903221D4}"/>
-    <dgm:cxn modelId="{2277733B-3360-4401-8125-9E92DCF0CE5E}" type="presOf" srcId="{9C218BBE-DC27-4AA1-9D66-CBD6ACAD5DBF}" destId="{14975301-FA52-42A2-B148-8F1294747BD5}" srcOrd="0" destOrd="0" presId="urn:microsoft.com/office/officeart/2008/layout/LinedList"/>
-    <dgm:cxn modelId="{4045995A-455C-47FF-989F-22C47DFD2463}" srcId="{522C1C43-5A8F-4F6A-AF2A-4A5A4B5C4958}" destId="{A68C4353-790E-4F89-A852-1A1F9A821007}" srcOrd="2" destOrd="0" parTransId="{A0593633-0A20-4E42-B13D-16A95C6C5C5B}" sibTransId="{2A62E920-C95F-4D55-ABCD-C8A8D5D83C83}"/>
+    <dgm:cxn modelId="{D161D4F1-CAC6-42BB-88E0-C8FEB531A47C}" type="presOf" srcId="{522C1C43-5A8F-4F6A-AF2A-4A5A4B5C4958}" destId="{5E0D7A7E-76C8-4EE6-B473-69FA85E41CB9}" srcOrd="0" destOrd="0" presId="urn:microsoft.com/office/officeart/2008/layout/LinedList"/>
     <dgm:cxn modelId="{DF70B492-871E-44A2-9E9B-9C9C5ACD7EDE}" type="presOf" srcId="{A68C4353-790E-4F89-A852-1A1F9A821007}" destId="{246A4C03-D7FA-4BF2-9D43-BE770C63417D}" srcOrd="0" destOrd="0" presId="urn:microsoft.com/office/officeart/2008/layout/LinedList"/>
-    <dgm:cxn modelId="{26A2ECC8-1A8B-4743-A035-7D7A96D9EF81}" type="presOf" srcId="{298E36AD-8AC6-4BD6-A39B-322591E1238E}" destId="{38EBF77A-9526-4D3F-ADE6-48559CF99FBD}" srcOrd="0" destOrd="0" presId="urn:microsoft.com/office/officeart/2008/layout/LinedList"/>
-    <dgm:cxn modelId="{6ECAA5D0-A6A4-4F3D-B38E-1EDD93F7CA59}" type="presOf" srcId="{32E4FB8F-6108-45C0-9763-D13F22EB899E}" destId="{0D5B195F-3288-4904-AE80-A121553E5A39}" srcOrd="0" destOrd="0" presId="urn:microsoft.com/office/officeart/2008/layout/LinedList"/>
-    <dgm:cxn modelId="{2BB95AD9-A44D-43F1-9CDE-9EF9995A0692}" srcId="{522C1C43-5A8F-4F6A-AF2A-4A5A4B5C4958}" destId="{9C218BBE-DC27-4AA1-9D66-CBD6ACAD5DBF}" srcOrd="1" destOrd="0" parTransId="{113AD054-EF6E-4B7F-8F21-C23ECEFE553D}" sibTransId="{641B8146-E782-4B79-BEEF-11C4D28781DB}"/>
-    <dgm:cxn modelId="{24D76BE0-0E29-4438-AF40-6B6BC41E7B28}" srcId="{522C1C43-5A8F-4F6A-AF2A-4A5A4B5C4958}" destId="{32E4FB8F-6108-45C0-9763-D13F22EB899E}" srcOrd="3" destOrd="0" parTransId="{787248E0-8CD9-4BC8-B2DB-4F2633120896}" sibTransId="{FC1CCF7E-FCAD-46D2-A101-92248EFDEBCC}"/>
-    <dgm:cxn modelId="{D161D4F1-CAC6-42BB-88E0-C8FEB531A47C}" type="presOf" srcId="{522C1C43-5A8F-4F6A-AF2A-4A5A4B5C4958}" destId="{5E0D7A7E-76C8-4EE6-B473-69FA85E41CB9}" srcOrd="0" destOrd="0" presId="urn:microsoft.com/office/officeart/2008/layout/LinedList"/>
     <dgm:cxn modelId="{5487E09B-3D5D-41D5-82ED-86E7B3AF65C7}" type="presParOf" srcId="{5E0D7A7E-76C8-4EE6-B473-69FA85E41CB9}" destId="{4F8BE2CE-5CA7-4CD5-854E-11FC67CE0E80}" srcOrd="0" destOrd="0" presId="urn:microsoft.com/office/officeart/2008/layout/LinedList"/>
     <dgm:cxn modelId="{0A39CB4F-CB11-4A7A-A64D-B76C58C0CA45}" type="presParOf" srcId="{5E0D7A7E-76C8-4EE6-B473-69FA85E41CB9}" destId="{F4F9427F-9155-4B0F-9096-EF039534D09D}" srcOrd="1" destOrd="0" presId="urn:microsoft.com/office/officeart/2008/layout/LinedList"/>
     <dgm:cxn modelId="{DD974AFE-6C5A-42BB-9004-D0DEC50EB9EA}" type="presParOf" srcId="{F4F9427F-9155-4B0F-9096-EF039534D09D}" destId="{38EBF77A-9526-4D3F-ADE6-48559CF99FBD}" srcOrd="0" destOrd="0" presId="urn:microsoft.com/office/officeart/2008/layout/LinedList"/>
@@ -3339,483 +3445,6 @@
       <dsp:cNvGrpSpPr/>
     </dsp:nvGrpSpPr>
     <dsp:grpSpPr/>
-    <dsp:sp modelId="{2A7519CA-9EB3-4255-9A4B-0CFFF54C3125}">
-      <dsp:nvSpPr>
-        <dsp:cNvPr id="0" name=""/>
-        <dsp:cNvSpPr/>
-      </dsp:nvSpPr>
-      <dsp:spPr>
-        <a:xfrm>
-          <a:off x="0" y="390"/>
-          <a:ext cx="5754896" cy="913338"/>
-        </a:xfrm>
-        <a:prstGeom prst="roundRect">
-          <a:avLst>
-            <a:gd name="adj" fmla="val 10000"/>
-          </a:avLst>
-        </a:prstGeom>
-        <a:solidFill>
-          <a:schemeClr val="accent1">
-            <a:tint val="40000"/>
-            <a:hueOff val="0"/>
-            <a:satOff val="0"/>
-            <a:lumOff val="0"/>
-            <a:alphaOff val="0"/>
-          </a:schemeClr>
-        </a:solidFill>
-        <a:ln>
-          <a:noFill/>
-        </a:ln>
-        <a:effectLst/>
-      </dsp:spPr>
-      <dsp:style>
-        <a:lnRef idx="0">
-          <a:scrgbClr r="0" g="0" b="0"/>
-        </a:lnRef>
-        <a:fillRef idx="1">
-          <a:scrgbClr r="0" g="0" b="0"/>
-        </a:fillRef>
-        <a:effectRef idx="0">
-          <a:scrgbClr r="0" g="0" b="0"/>
-        </a:effectRef>
-        <a:fontRef idx="minor"/>
-      </dsp:style>
-    </dsp:sp>
-    <dsp:sp modelId="{F8085307-4B25-4CE5-9F86-0AAB3873EF1F}">
-      <dsp:nvSpPr>
-        <dsp:cNvPr id="0" name=""/>
-        <dsp:cNvSpPr/>
-      </dsp:nvSpPr>
-      <dsp:spPr>
-        <a:xfrm>
-          <a:off x="276284" y="205891"/>
-          <a:ext cx="502335" cy="502335"/>
-        </a:xfrm>
-        <a:prstGeom prst="rect">
-          <a:avLst/>
-        </a:prstGeom>
-        <a:blipFill>
-          <a:blip xmlns:r="http://schemas.openxmlformats.org/officeDocument/2006/relationships" r:embed="rId1">
-            <a:extLst>
-              <a:ext uri="{28A0092B-C50C-407E-A947-70E740481C1C}">
-                <a14:useLocalDpi xmlns:a14="http://schemas.microsoft.com/office/drawing/2010/main" val="0"/>
-              </a:ext>
-              <a:ext uri="{96DAC541-7B7A-43D3-8B79-37D633B846F1}">
-                <asvg:svgBlip xmlns:asvg="http://schemas.microsoft.com/office/drawing/2016/SVG/main" r:embed="rId2"/>
-              </a:ext>
-            </a:extLst>
-          </a:blip>
-          <a:stretch>
-            <a:fillRect/>
-          </a:stretch>
-        </a:blipFill>
-        <a:ln w="12700" cap="flat" cmpd="sng" algn="ctr">
-          <a:solidFill>
-            <a:schemeClr val="lt1">
-              <a:hueOff val="0"/>
-              <a:satOff val="0"/>
-              <a:lumOff val="0"/>
-              <a:alphaOff val="0"/>
-            </a:schemeClr>
-          </a:solidFill>
-          <a:prstDash val="solid"/>
-          <a:miter lim="800000"/>
-        </a:ln>
-        <a:effectLst/>
-      </dsp:spPr>
-      <dsp:style>
-        <a:lnRef idx="2">
-          <a:scrgbClr r="0" g="0" b="0"/>
-        </a:lnRef>
-        <a:fillRef idx="1">
-          <a:scrgbClr r="0" g="0" b="0"/>
-        </a:fillRef>
-        <a:effectRef idx="0">
-          <a:scrgbClr r="0" g="0" b="0"/>
-        </a:effectRef>
-        <a:fontRef idx="minor">
-          <a:schemeClr val="lt1"/>
-        </a:fontRef>
-      </dsp:style>
-    </dsp:sp>
-    <dsp:sp modelId="{7B9725C1-15DE-4165-B239-C0AA86581B00}">
-      <dsp:nvSpPr>
-        <dsp:cNvPr id="0" name=""/>
-        <dsp:cNvSpPr/>
-      </dsp:nvSpPr>
-      <dsp:spPr>
-        <a:xfrm>
-          <a:off x="1054905" y="390"/>
-          <a:ext cx="4699990" cy="913338"/>
-        </a:xfrm>
-        <a:prstGeom prst="rect">
-          <a:avLst/>
-        </a:prstGeom>
-        <a:noFill/>
-        <a:ln>
-          <a:noFill/>
-        </a:ln>
-        <a:effectLst/>
-      </dsp:spPr>
-      <dsp:style>
-        <a:lnRef idx="0">
-          <a:scrgbClr r="0" g="0" b="0"/>
-        </a:lnRef>
-        <a:fillRef idx="0">
-          <a:scrgbClr r="0" g="0" b="0"/>
-        </a:fillRef>
-        <a:effectRef idx="0">
-          <a:scrgbClr r="0" g="0" b="0"/>
-        </a:effectRef>
-        <a:fontRef idx="minor"/>
-      </dsp:style>
-      <dsp:txBody>
-        <a:bodyPr spcFirstLastPara="0" vert="horz" wrap="square" lIns="96662" tIns="96662" rIns="96662" bIns="96662" numCol="1" spcCol="1270" anchor="ctr" anchorCtr="0">
-          <a:noAutofit/>
-        </a:bodyPr>
-        <a:lstStyle/>
-        <a:p>
-          <a:pPr marL="0" lvl="0" indent="0" algn="l" defTabSz="1022350">
-            <a:lnSpc>
-              <a:spcPct val="100000"/>
-            </a:lnSpc>
-            <a:spcBef>
-              <a:spcPct val="0"/>
-            </a:spcBef>
-            <a:spcAft>
-              <a:spcPct val="35000"/>
-            </a:spcAft>
-            <a:buNone/>
-          </a:pPr>
-          <a:r>
-            <a:rPr lang="en-US" sz="2300" kern="1200"/>
-            <a:t>Defining the Problem</a:t>
-          </a:r>
-        </a:p>
-      </dsp:txBody>
-      <dsp:txXfrm>
-        <a:off x="1054905" y="390"/>
-        <a:ext cx="4699990" cy="913338"/>
-      </dsp:txXfrm>
-    </dsp:sp>
-    <dsp:sp modelId="{FB108AC7-0626-4F03-A198-011E86E493C5}">
-      <dsp:nvSpPr>
-        <dsp:cNvPr id="0" name=""/>
-        <dsp:cNvSpPr/>
-      </dsp:nvSpPr>
-      <dsp:spPr>
-        <a:xfrm>
-          <a:off x="0" y="1142062"/>
-          <a:ext cx="5754896" cy="913338"/>
-        </a:xfrm>
-        <a:prstGeom prst="roundRect">
-          <a:avLst>
-            <a:gd name="adj" fmla="val 10000"/>
-          </a:avLst>
-        </a:prstGeom>
-        <a:solidFill>
-          <a:schemeClr val="accent1">
-            <a:tint val="40000"/>
-            <a:hueOff val="0"/>
-            <a:satOff val="0"/>
-            <a:lumOff val="0"/>
-            <a:alphaOff val="0"/>
-          </a:schemeClr>
-        </a:solidFill>
-        <a:ln>
-          <a:noFill/>
-        </a:ln>
-        <a:effectLst/>
-      </dsp:spPr>
-      <dsp:style>
-        <a:lnRef idx="0">
-          <a:scrgbClr r="0" g="0" b="0"/>
-        </a:lnRef>
-        <a:fillRef idx="1">
-          <a:scrgbClr r="0" g="0" b="0"/>
-        </a:fillRef>
-        <a:effectRef idx="0">
-          <a:scrgbClr r="0" g="0" b="0"/>
-        </a:effectRef>
-        <a:fontRef idx="minor"/>
-      </dsp:style>
-    </dsp:sp>
-    <dsp:sp modelId="{9C5A4382-1898-43C1-8DC5-FF5616C2BA00}">
-      <dsp:nvSpPr>
-        <dsp:cNvPr id="0" name=""/>
-        <dsp:cNvSpPr/>
-      </dsp:nvSpPr>
-      <dsp:spPr>
-        <a:xfrm>
-          <a:off x="276284" y="1347564"/>
-          <a:ext cx="502335" cy="502335"/>
-        </a:xfrm>
-        <a:prstGeom prst="rect">
-          <a:avLst/>
-        </a:prstGeom>
-        <a:blipFill>
-          <a:blip xmlns:r="http://schemas.openxmlformats.org/officeDocument/2006/relationships" r:embed="rId3">
-            <a:extLst>
-              <a:ext uri="{28A0092B-C50C-407E-A947-70E740481C1C}">
-                <a14:useLocalDpi xmlns:a14="http://schemas.microsoft.com/office/drawing/2010/main" val="0"/>
-              </a:ext>
-              <a:ext uri="{96DAC541-7B7A-43D3-8B79-37D633B846F1}">
-                <asvg:svgBlip xmlns:asvg="http://schemas.microsoft.com/office/drawing/2016/SVG/main" r:embed="rId4"/>
-              </a:ext>
-            </a:extLst>
-          </a:blip>
-          <a:stretch>
-            <a:fillRect/>
-          </a:stretch>
-        </a:blipFill>
-        <a:ln w="12700" cap="flat" cmpd="sng" algn="ctr">
-          <a:solidFill>
-            <a:schemeClr val="lt1">
-              <a:hueOff val="0"/>
-              <a:satOff val="0"/>
-              <a:lumOff val="0"/>
-              <a:alphaOff val="0"/>
-            </a:schemeClr>
-          </a:solidFill>
-          <a:prstDash val="solid"/>
-          <a:miter lim="800000"/>
-        </a:ln>
-        <a:effectLst/>
-      </dsp:spPr>
-      <dsp:style>
-        <a:lnRef idx="2">
-          <a:scrgbClr r="0" g="0" b="0"/>
-        </a:lnRef>
-        <a:fillRef idx="1">
-          <a:scrgbClr r="0" g="0" b="0"/>
-        </a:fillRef>
-        <a:effectRef idx="0">
-          <a:scrgbClr r="0" g="0" b="0"/>
-        </a:effectRef>
-        <a:fontRef idx="minor">
-          <a:schemeClr val="lt1"/>
-        </a:fontRef>
-      </dsp:style>
-    </dsp:sp>
-    <dsp:sp modelId="{BE94D43E-756B-4AC1-9F14-472D1AF8FC18}">
-      <dsp:nvSpPr>
-        <dsp:cNvPr id="0" name=""/>
-        <dsp:cNvSpPr/>
-      </dsp:nvSpPr>
-      <dsp:spPr>
-        <a:xfrm>
-          <a:off x="1054905" y="1142062"/>
-          <a:ext cx="4699990" cy="913338"/>
-        </a:xfrm>
-        <a:prstGeom prst="rect">
-          <a:avLst/>
-        </a:prstGeom>
-        <a:noFill/>
-        <a:ln>
-          <a:noFill/>
-        </a:ln>
-        <a:effectLst/>
-      </dsp:spPr>
-      <dsp:style>
-        <a:lnRef idx="0">
-          <a:scrgbClr r="0" g="0" b="0"/>
-        </a:lnRef>
-        <a:fillRef idx="0">
-          <a:scrgbClr r="0" g="0" b="0"/>
-        </a:fillRef>
-        <a:effectRef idx="0">
-          <a:scrgbClr r="0" g="0" b="0"/>
-        </a:effectRef>
-        <a:fontRef idx="minor"/>
-      </dsp:style>
-      <dsp:txBody>
-        <a:bodyPr spcFirstLastPara="0" vert="horz" wrap="square" lIns="96662" tIns="96662" rIns="96662" bIns="96662" numCol="1" spcCol="1270" anchor="ctr" anchorCtr="0">
-          <a:noAutofit/>
-        </a:bodyPr>
-        <a:lstStyle/>
-        <a:p>
-          <a:pPr marL="0" lvl="0" indent="0" algn="l" defTabSz="1022350">
-            <a:lnSpc>
-              <a:spcPct val="100000"/>
-            </a:lnSpc>
-            <a:spcBef>
-              <a:spcPct val="0"/>
-            </a:spcBef>
-            <a:spcAft>
-              <a:spcPct val="35000"/>
-            </a:spcAft>
-            <a:buNone/>
-          </a:pPr>
-          <a:r>
-            <a:rPr lang="en-US" sz="2300" kern="1200"/>
-            <a:t>Highlighting Key Challenges</a:t>
-          </a:r>
-        </a:p>
-      </dsp:txBody>
-      <dsp:txXfrm>
-        <a:off x="1054905" y="1142062"/>
-        <a:ext cx="4699990" cy="913338"/>
-      </dsp:txXfrm>
-    </dsp:sp>
-    <dsp:sp modelId="{26104149-125E-4387-9909-4C3B937F1A72}">
-      <dsp:nvSpPr>
-        <dsp:cNvPr id="0" name=""/>
-        <dsp:cNvSpPr/>
-      </dsp:nvSpPr>
-      <dsp:spPr>
-        <a:xfrm>
-          <a:off x="0" y="2283735"/>
-          <a:ext cx="5754896" cy="913338"/>
-        </a:xfrm>
-        <a:prstGeom prst="roundRect">
-          <a:avLst>
-            <a:gd name="adj" fmla="val 10000"/>
-          </a:avLst>
-        </a:prstGeom>
-        <a:solidFill>
-          <a:schemeClr val="accent1">
-            <a:tint val="40000"/>
-            <a:hueOff val="0"/>
-            <a:satOff val="0"/>
-            <a:lumOff val="0"/>
-            <a:alphaOff val="0"/>
-          </a:schemeClr>
-        </a:solidFill>
-        <a:ln>
-          <a:noFill/>
-        </a:ln>
-        <a:effectLst/>
-      </dsp:spPr>
-      <dsp:style>
-        <a:lnRef idx="0">
-          <a:scrgbClr r="0" g="0" b="0"/>
-        </a:lnRef>
-        <a:fillRef idx="1">
-          <a:scrgbClr r="0" g="0" b="0"/>
-        </a:fillRef>
-        <a:effectRef idx="0">
-          <a:scrgbClr r="0" g="0" b="0"/>
-        </a:effectRef>
-        <a:fontRef idx="minor"/>
-      </dsp:style>
-    </dsp:sp>
-    <dsp:sp modelId="{D0B5E45A-CC87-422A-BAC3-44E203B2FBA9}">
-      <dsp:nvSpPr>
-        <dsp:cNvPr id="0" name=""/>
-        <dsp:cNvSpPr/>
-      </dsp:nvSpPr>
-      <dsp:spPr>
-        <a:xfrm>
-          <a:off x="276284" y="2489236"/>
-          <a:ext cx="502335" cy="502335"/>
-        </a:xfrm>
-        <a:prstGeom prst="rect">
-          <a:avLst/>
-        </a:prstGeom>
-        <a:blipFill>
-          <a:blip xmlns:r="http://schemas.openxmlformats.org/officeDocument/2006/relationships" r:embed="rId5">
-            <a:extLst>
-              <a:ext uri="{28A0092B-C50C-407E-A947-70E740481C1C}">
-                <a14:useLocalDpi xmlns:a14="http://schemas.microsoft.com/office/drawing/2010/main" val="0"/>
-              </a:ext>
-              <a:ext uri="{96DAC541-7B7A-43D3-8B79-37D633B846F1}">
-                <asvg:svgBlip xmlns:asvg="http://schemas.microsoft.com/office/drawing/2016/SVG/main" r:embed="rId6"/>
-              </a:ext>
-            </a:extLst>
-          </a:blip>
-          <a:stretch>
-            <a:fillRect/>
-          </a:stretch>
-        </a:blipFill>
-        <a:ln w="12700" cap="flat" cmpd="sng" algn="ctr">
-          <a:solidFill>
-            <a:schemeClr val="lt1">
-              <a:hueOff val="0"/>
-              <a:satOff val="0"/>
-              <a:lumOff val="0"/>
-              <a:alphaOff val="0"/>
-            </a:schemeClr>
-          </a:solidFill>
-          <a:prstDash val="solid"/>
-          <a:miter lim="800000"/>
-        </a:ln>
-        <a:effectLst/>
-      </dsp:spPr>
-      <dsp:style>
-        <a:lnRef idx="2">
-          <a:scrgbClr r="0" g="0" b="0"/>
-        </a:lnRef>
-        <a:fillRef idx="1">
-          <a:scrgbClr r="0" g="0" b="0"/>
-        </a:fillRef>
-        <a:effectRef idx="0">
-          <a:scrgbClr r="0" g="0" b="0"/>
-        </a:effectRef>
-        <a:fontRef idx="minor">
-          <a:schemeClr val="lt1"/>
-        </a:fontRef>
-      </dsp:style>
-    </dsp:sp>
-    <dsp:sp modelId="{0FB42F5C-F1D2-451F-B544-15C4FA9AAA7F}">
-      <dsp:nvSpPr>
-        <dsp:cNvPr id="0" name=""/>
-        <dsp:cNvSpPr/>
-      </dsp:nvSpPr>
-      <dsp:spPr>
-        <a:xfrm>
-          <a:off x="1054905" y="2283735"/>
-          <a:ext cx="4699990" cy="913338"/>
-        </a:xfrm>
-        <a:prstGeom prst="rect">
-          <a:avLst/>
-        </a:prstGeom>
-        <a:noFill/>
-        <a:ln>
-          <a:noFill/>
-        </a:ln>
-        <a:effectLst/>
-      </dsp:spPr>
-      <dsp:style>
-        <a:lnRef idx="0">
-          <a:scrgbClr r="0" g="0" b="0"/>
-        </a:lnRef>
-        <a:fillRef idx="0">
-          <a:scrgbClr r="0" g="0" b="0"/>
-        </a:fillRef>
-        <a:effectRef idx="0">
-          <a:scrgbClr r="0" g="0" b="0"/>
-        </a:effectRef>
-        <a:fontRef idx="minor"/>
-      </dsp:style>
-      <dsp:txBody>
-        <a:bodyPr spcFirstLastPara="0" vert="horz" wrap="square" lIns="96662" tIns="96662" rIns="96662" bIns="96662" numCol="1" spcCol="1270" anchor="ctr" anchorCtr="0">
-          <a:noAutofit/>
-        </a:bodyPr>
-        <a:lstStyle/>
-        <a:p>
-          <a:pPr marL="0" lvl="0" indent="0" algn="l" defTabSz="1022350">
-            <a:lnSpc>
-              <a:spcPct val="100000"/>
-            </a:lnSpc>
-            <a:spcBef>
-              <a:spcPct val="0"/>
-            </a:spcBef>
-            <a:spcAft>
-              <a:spcPct val="35000"/>
-            </a:spcAft>
-            <a:buNone/>
-          </a:pPr>
-          <a:r>
-            <a:rPr lang="en-US" sz="2300" kern="1200"/>
-            <a:t>Importance of addressing these challenges</a:t>
-          </a:r>
-        </a:p>
-      </dsp:txBody>
-      <dsp:txXfrm>
-        <a:off x="1054905" y="2283735"/>
-        <a:ext cx="4699990" cy="913338"/>
-      </dsp:txXfrm>
-    </dsp:sp>
   </dsp:spTree>
 </dsp:drawing>
 </file>
@@ -3828,556 +3457,6 @@
       <dsp:cNvGrpSpPr/>
     </dsp:nvGrpSpPr>
     <dsp:grpSpPr/>
-    <dsp:sp modelId="{4F8BE2CE-5CA7-4CD5-854E-11FC67CE0E80}">
-      <dsp:nvSpPr>
-        <dsp:cNvPr id="0" name=""/>
-        <dsp:cNvSpPr/>
-      </dsp:nvSpPr>
-      <dsp:spPr>
-        <a:xfrm>
-          <a:off x="0" y="511"/>
-          <a:ext cx="5458837" cy="0"/>
-        </a:xfrm>
-        <a:prstGeom prst="line">
-          <a:avLst/>
-        </a:prstGeom>
-        <a:solidFill>
-          <a:schemeClr val="accent1">
-            <a:hueOff val="0"/>
-            <a:satOff val="0"/>
-            <a:lumOff val="0"/>
-            <a:alphaOff val="0"/>
-          </a:schemeClr>
-        </a:solidFill>
-        <a:ln w="12700" cap="flat" cmpd="sng" algn="ctr">
-          <a:solidFill>
-            <a:schemeClr val="accent1">
-              <a:hueOff val="0"/>
-              <a:satOff val="0"/>
-              <a:lumOff val="0"/>
-              <a:alphaOff val="0"/>
-            </a:schemeClr>
-          </a:solidFill>
-          <a:prstDash val="solid"/>
-          <a:miter lim="800000"/>
-        </a:ln>
-        <a:effectLst/>
-      </dsp:spPr>
-      <dsp:style>
-        <a:lnRef idx="2">
-          <a:scrgbClr r="0" g="0" b="0"/>
-        </a:lnRef>
-        <a:fillRef idx="1">
-          <a:scrgbClr r="0" g="0" b="0"/>
-        </a:fillRef>
-        <a:effectRef idx="0">
-          <a:scrgbClr r="0" g="0" b="0"/>
-        </a:effectRef>
-        <a:fontRef idx="minor">
-          <a:schemeClr val="lt1"/>
-        </a:fontRef>
-      </dsp:style>
-    </dsp:sp>
-    <dsp:sp modelId="{38EBF77A-9526-4D3F-ADE6-48559CF99FBD}">
-      <dsp:nvSpPr>
-        <dsp:cNvPr id="0" name=""/>
-        <dsp:cNvSpPr/>
-      </dsp:nvSpPr>
-      <dsp:spPr>
-        <a:xfrm>
-          <a:off x="0" y="511"/>
-          <a:ext cx="5458837" cy="838299"/>
-        </a:xfrm>
-        <a:prstGeom prst="rect">
-          <a:avLst/>
-        </a:prstGeom>
-        <a:noFill/>
-        <a:ln>
-          <a:noFill/>
-        </a:ln>
-        <a:effectLst/>
-      </dsp:spPr>
-      <dsp:style>
-        <a:lnRef idx="0">
-          <a:scrgbClr r="0" g="0" b="0"/>
-        </a:lnRef>
-        <a:fillRef idx="0">
-          <a:scrgbClr r="0" g="0" b="0"/>
-        </a:fillRef>
-        <a:effectRef idx="0">
-          <a:scrgbClr r="0" g="0" b="0"/>
-        </a:effectRef>
-        <a:fontRef idx="minor"/>
-      </dsp:style>
-      <dsp:txBody>
-        <a:bodyPr spcFirstLastPara="0" vert="horz" wrap="square" lIns="140970" tIns="140970" rIns="140970" bIns="140970" numCol="1" spcCol="1270" anchor="t" anchorCtr="0">
-          <a:noAutofit/>
-        </a:bodyPr>
-        <a:lstStyle/>
-        <a:p>
-          <a:pPr marL="0" lvl="0" indent="0" algn="l" defTabSz="1644650">
-            <a:lnSpc>
-              <a:spcPct val="90000"/>
-            </a:lnSpc>
-            <a:spcBef>
-              <a:spcPct val="0"/>
-            </a:spcBef>
-            <a:spcAft>
-              <a:spcPct val="35000"/>
-            </a:spcAft>
-            <a:buNone/>
-          </a:pPr>
-          <a:r>
-            <a:rPr lang="en-US" sz="3700" kern="1200" dirty="0"/>
-            <a:t>Data Management</a:t>
-          </a:r>
-        </a:p>
-      </dsp:txBody>
-      <dsp:txXfrm>
-        <a:off x="0" y="511"/>
-        <a:ext cx="5458837" cy="838299"/>
-      </dsp:txXfrm>
-    </dsp:sp>
-    <dsp:sp modelId="{B67680E4-BD92-46FD-B639-08CF108A79A5}">
-      <dsp:nvSpPr>
-        <dsp:cNvPr id="0" name=""/>
-        <dsp:cNvSpPr/>
-      </dsp:nvSpPr>
-      <dsp:spPr>
-        <a:xfrm>
-          <a:off x="0" y="838811"/>
-          <a:ext cx="5458837" cy="0"/>
-        </a:xfrm>
-        <a:prstGeom prst="line">
-          <a:avLst/>
-        </a:prstGeom>
-        <a:solidFill>
-          <a:schemeClr val="accent1">
-            <a:hueOff val="0"/>
-            <a:satOff val="0"/>
-            <a:lumOff val="0"/>
-            <a:alphaOff val="0"/>
-          </a:schemeClr>
-        </a:solidFill>
-        <a:ln w="12700" cap="flat" cmpd="sng" algn="ctr">
-          <a:solidFill>
-            <a:schemeClr val="accent1">
-              <a:hueOff val="0"/>
-              <a:satOff val="0"/>
-              <a:lumOff val="0"/>
-              <a:alphaOff val="0"/>
-            </a:schemeClr>
-          </a:solidFill>
-          <a:prstDash val="solid"/>
-          <a:miter lim="800000"/>
-        </a:ln>
-        <a:effectLst/>
-      </dsp:spPr>
-      <dsp:style>
-        <a:lnRef idx="2">
-          <a:scrgbClr r="0" g="0" b="0"/>
-        </a:lnRef>
-        <a:fillRef idx="1">
-          <a:scrgbClr r="0" g="0" b="0"/>
-        </a:fillRef>
-        <a:effectRef idx="0">
-          <a:scrgbClr r="0" g="0" b="0"/>
-        </a:effectRef>
-        <a:fontRef idx="minor">
-          <a:schemeClr val="lt1"/>
-        </a:fontRef>
-      </dsp:style>
-    </dsp:sp>
-    <dsp:sp modelId="{14975301-FA52-42A2-B148-8F1294747BD5}">
-      <dsp:nvSpPr>
-        <dsp:cNvPr id="0" name=""/>
-        <dsp:cNvSpPr/>
-      </dsp:nvSpPr>
-      <dsp:spPr>
-        <a:xfrm>
-          <a:off x="0" y="838811"/>
-          <a:ext cx="5458837" cy="838299"/>
-        </a:xfrm>
-        <a:prstGeom prst="rect">
-          <a:avLst/>
-        </a:prstGeom>
-        <a:noFill/>
-        <a:ln>
-          <a:noFill/>
-        </a:ln>
-        <a:effectLst/>
-      </dsp:spPr>
-      <dsp:style>
-        <a:lnRef idx="0">
-          <a:scrgbClr r="0" g="0" b="0"/>
-        </a:lnRef>
-        <a:fillRef idx="0">
-          <a:scrgbClr r="0" g="0" b="0"/>
-        </a:fillRef>
-        <a:effectRef idx="0">
-          <a:scrgbClr r="0" g="0" b="0"/>
-        </a:effectRef>
-        <a:fontRef idx="minor"/>
-      </dsp:style>
-      <dsp:txBody>
-        <a:bodyPr spcFirstLastPara="0" vert="horz" wrap="square" lIns="140970" tIns="140970" rIns="140970" bIns="140970" numCol="1" spcCol="1270" anchor="t" anchorCtr="0">
-          <a:noAutofit/>
-        </a:bodyPr>
-        <a:lstStyle/>
-        <a:p>
-          <a:pPr marL="0" lvl="0" indent="0" algn="l" defTabSz="1644650">
-            <a:lnSpc>
-              <a:spcPct val="90000"/>
-            </a:lnSpc>
-            <a:spcBef>
-              <a:spcPct val="0"/>
-            </a:spcBef>
-            <a:spcAft>
-              <a:spcPct val="35000"/>
-            </a:spcAft>
-            <a:buNone/>
-          </a:pPr>
-          <a:r>
-            <a:rPr lang="en-US" sz="3700" kern="1200" dirty="0"/>
-            <a:t>Sorting Data</a:t>
-          </a:r>
-        </a:p>
-      </dsp:txBody>
-      <dsp:txXfrm>
-        <a:off x="0" y="838811"/>
-        <a:ext cx="5458837" cy="838299"/>
-      </dsp:txXfrm>
-    </dsp:sp>
-    <dsp:sp modelId="{D72802A4-4187-49D5-A44A-5BAD1FB5F19E}">
-      <dsp:nvSpPr>
-        <dsp:cNvPr id="0" name=""/>
-        <dsp:cNvSpPr/>
-      </dsp:nvSpPr>
-      <dsp:spPr>
-        <a:xfrm>
-          <a:off x="0" y="1677110"/>
-          <a:ext cx="5458837" cy="0"/>
-        </a:xfrm>
-        <a:prstGeom prst="line">
-          <a:avLst/>
-        </a:prstGeom>
-        <a:solidFill>
-          <a:schemeClr val="accent1">
-            <a:hueOff val="0"/>
-            <a:satOff val="0"/>
-            <a:lumOff val="0"/>
-            <a:alphaOff val="0"/>
-          </a:schemeClr>
-        </a:solidFill>
-        <a:ln w="12700" cap="flat" cmpd="sng" algn="ctr">
-          <a:solidFill>
-            <a:schemeClr val="accent1">
-              <a:hueOff val="0"/>
-              <a:satOff val="0"/>
-              <a:lumOff val="0"/>
-              <a:alphaOff val="0"/>
-            </a:schemeClr>
-          </a:solidFill>
-          <a:prstDash val="solid"/>
-          <a:miter lim="800000"/>
-        </a:ln>
-        <a:effectLst/>
-      </dsp:spPr>
-      <dsp:style>
-        <a:lnRef idx="2">
-          <a:scrgbClr r="0" g="0" b="0"/>
-        </a:lnRef>
-        <a:fillRef idx="1">
-          <a:scrgbClr r="0" g="0" b="0"/>
-        </a:fillRef>
-        <a:effectRef idx="0">
-          <a:scrgbClr r="0" g="0" b="0"/>
-        </a:effectRef>
-        <a:fontRef idx="minor">
-          <a:schemeClr val="lt1"/>
-        </a:fontRef>
-      </dsp:style>
-    </dsp:sp>
-    <dsp:sp modelId="{246A4C03-D7FA-4BF2-9D43-BE770C63417D}">
-      <dsp:nvSpPr>
-        <dsp:cNvPr id="0" name=""/>
-        <dsp:cNvSpPr/>
-      </dsp:nvSpPr>
-      <dsp:spPr>
-        <a:xfrm>
-          <a:off x="0" y="1677110"/>
-          <a:ext cx="5458837" cy="838299"/>
-        </a:xfrm>
-        <a:prstGeom prst="rect">
-          <a:avLst/>
-        </a:prstGeom>
-        <a:noFill/>
-        <a:ln>
-          <a:noFill/>
-        </a:ln>
-        <a:effectLst/>
-      </dsp:spPr>
-      <dsp:style>
-        <a:lnRef idx="0">
-          <a:scrgbClr r="0" g="0" b="0"/>
-        </a:lnRef>
-        <a:fillRef idx="0">
-          <a:scrgbClr r="0" g="0" b="0"/>
-        </a:fillRef>
-        <a:effectRef idx="0">
-          <a:scrgbClr r="0" g="0" b="0"/>
-        </a:effectRef>
-        <a:fontRef idx="minor"/>
-      </dsp:style>
-      <dsp:txBody>
-        <a:bodyPr spcFirstLastPara="0" vert="horz" wrap="square" lIns="140970" tIns="140970" rIns="140970" bIns="140970" numCol="1" spcCol="1270" anchor="t" anchorCtr="0">
-          <a:noAutofit/>
-        </a:bodyPr>
-        <a:lstStyle/>
-        <a:p>
-          <a:pPr marL="0" lvl="0" indent="0" algn="l" defTabSz="1644650">
-            <a:lnSpc>
-              <a:spcPct val="90000"/>
-            </a:lnSpc>
-            <a:spcBef>
-              <a:spcPct val="0"/>
-            </a:spcBef>
-            <a:spcAft>
-              <a:spcPct val="35000"/>
-            </a:spcAft>
-            <a:buNone/>
-          </a:pPr>
-          <a:r>
-            <a:rPr lang="en-US" sz="3700" kern="1200" dirty="0"/>
-            <a:t>Searching Players </a:t>
-          </a:r>
-        </a:p>
-      </dsp:txBody>
-      <dsp:txXfrm>
-        <a:off x="0" y="1677110"/>
-        <a:ext cx="5458837" cy="838299"/>
-      </dsp:txXfrm>
-    </dsp:sp>
-    <dsp:sp modelId="{0DE814F1-9FFB-45E2-97FD-6F142D4D5A26}">
-      <dsp:nvSpPr>
-        <dsp:cNvPr id="0" name=""/>
-        <dsp:cNvSpPr/>
-      </dsp:nvSpPr>
-      <dsp:spPr>
-        <a:xfrm>
-          <a:off x="0" y="2515409"/>
-          <a:ext cx="5458837" cy="0"/>
-        </a:xfrm>
-        <a:prstGeom prst="line">
-          <a:avLst/>
-        </a:prstGeom>
-        <a:solidFill>
-          <a:schemeClr val="accent1">
-            <a:hueOff val="0"/>
-            <a:satOff val="0"/>
-            <a:lumOff val="0"/>
-            <a:alphaOff val="0"/>
-          </a:schemeClr>
-        </a:solidFill>
-        <a:ln w="12700" cap="flat" cmpd="sng" algn="ctr">
-          <a:solidFill>
-            <a:schemeClr val="accent1">
-              <a:hueOff val="0"/>
-              <a:satOff val="0"/>
-              <a:lumOff val="0"/>
-              <a:alphaOff val="0"/>
-            </a:schemeClr>
-          </a:solidFill>
-          <a:prstDash val="solid"/>
-          <a:miter lim="800000"/>
-        </a:ln>
-        <a:effectLst/>
-      </dsp:spPr>
-      <dsp:style>
-        <a:lnRef idx="2">
-          <a:scrgbClr r="0" g="0" b="0"/>
-        </a:lnRef>
-        <a:fillRef idx="1">
-          <a:scrgbClr r="0" g="0" b="0"/>
-        </a:fillRef>
-        <a:effectRef idx="0">
-          <a:scrgbClr r="0" g="0" b="0"/>
-        </a:effectRef>
-        <a:fontRef idx="minor">
-          <a:schemeClr val="lt1"/>
-        </a:fontRef>
-      </dsp:style>
-    </dsp:sp>
-    <dsp:sp modelId="{0D5B195F-3288-4904-AE80-A121553E5A39}">
-      <dsp:nvSpPr>
-        <dsp:cNvPr id="0" name=""/>
-        <dsp:cNvSpPr/>
-      </dsp:nvSpPr>
-      <dsp:spPr>
-        <a:xfrm>
-          <a:off x="0" y="2515409"/>
-          <a:ext cx="5458837" cy="838299"/>
-        </a:xfrm>
-        <a:prstGeom prst="rect">
-          <a:avLst/>
-        </a:prstGeom>
-        <a:noFill/>
-        <a:ln>
-          <a:noFill/>
-        </a:ln>
-        <a:effectLst/>
-      </dsp:spPr>
-      <dsp:style>
-        <a:lnRef idx="0">
-          <a:scrgbClr r="0" g="0" b="0"/>
-        </a:lnRef>
-        <a:fillRef idx="0">
-          <a:scrgbClr r="0" g="0" b="0"/>
-        </a:fillRef>
-        <a:effectRef idx="0">
-          <a:scrgbClr r="0" g="0" b="0"/>
-        </a:effectRef>
-        <a:fontRef idx="minor"/>
-      </dsp:style>
-      <dsp:txBody>
-        <a:bodyPr spcFirstLastPara="0" vert="horz" wrap="square" lIns="140970" tIns="140970" rIns="140970" bIns="140970" numCol="1" spcCol="1270" anchor="t" anchorCtr="0">
-          <a:noAutofit/>
-        </a:bodyPr>
-        <a:lstStyle/>
-        <a:p>
-          <a:pPr marL="0" lvl="0" indent="0" algn="l" defTabSz="1644650">
-            <a:lnSpc>
-              <a:spcPct val="90000"/>
-            </a:lnSpc>
-            <a:spcBef>
-              <a:spcPct val="0"/>
-            </a:spcBef>
-            <a:spcAft>
-              <a:spcPct val="35000"/>
-            </a:spcAft>
-            <a:buNone/>
-          </a:pPr>
-          <a:r>
-            <a:rPr lang="en-US" sz="3700" kern="1200" dirty="0"/>
-            <a:t>Improving User Experience</a:t>
-          </a:r>
-        </a:p>
-      </dsp:txBody>
-      <dsp:txXfrm>
-        <a:off x="0" y="2515409"/>
-        <a:ext cx="5458837" cy="838299"/>
-      </dsp:txXfrm>
-    </dsp:sp>
-    <dsp:sp modelId="{F6518536-6002-4E4E-8329-48EB508621C1}">
-      <dsp:nvSpPr>
-        <dsp:cNvPr id="0" name=""/>
-        <dsp:cNvSpPr/>
-      </dsp:nvSpPr>
-      <dsp:spPr>
-        <a:xfrm>
-          <a:off x="0" y="3353708"/>
-          <a:ext cx="5458837" cy="0"/>
-        </a:xfrm>
-        <a:prstGeom prst="line">
-          <a:avLst/>
-        </a:prstGeom>
-        <a:solidFill>
-          <a:schemeClr val="accent1">
-            <a:hueOff val="0"/>
-            <a:satOff val="0"/>
-            <a:lumOff val="0"/>
-            <a:alphaOff val="0"/>
-          </a:schemeClr>
-        </a:solidFill>
-        <a:ln w="12700" cap="flat" cmpd="sng" algn="ctr">
-          <a:solidFill>
-            <a:schemeClr val="accent1">
-              <a:hueOff val="0"/>
-              <a:satOff val="0"/>
-              <a:lumOff val="0"/>
-              <a:alphaOff val="0"/>
-            </a:schemeClr>
-          </a:solidFill>
-          <a:prstDash val="solid"/>
-          <a:miter lim="800000"/>
-        </a:ln>
-        <a:effectLst/>
-      </dsp:spPr>
-      <dsp:style>
-        <a:lnRef idx="2">
-          <a:scrgbClr r="0" g="0" b="0"/>
-        </a:lnRef>
-        <a:fillRef idx="1">
-          <a:scrgbClr r="0" g="0" b="0"/>
-        </a:fillRef>
-        <a:effectRef idx="0">
-          <a:scrgbClr r="0" g="0" b="0"/>
-        </a:effectRef>
-        <a:fontRef idx="minor">
-          <a:schemeClr val="lt1"/>
-        </a:fontRef>
-      </dsp:style>
-    </dsp:sp>
-    <dsp:sp modelId="{2FA8B83E-0F05-4F5A-8018-D193083B47BB}">
-      <dsp:nvSpPr>
-        <dsp:cNvPr id="0" name=""/>
-        <dsp:cNvSpPr/>
-      </dsp:nvSpPr>
-      <dsp:spPr>
-        <a:xfrm>
-          <a:off x="0" y="3353708"/>
-          <a:ext cx="5458837" cy="838299"/>
-        </a:xfrm>
-        <a:prstGeom prst="rect">
-          <a:avLst/>
-        </a:prstGeom>
-        <a:noFill/>
-        <a:ln>
-          <a:noFill/>
-        </a:ln>
-        <a:effectLst/>
-      </dsp:spPr>
-      <dsp:style>
-        <a:lnRef idx="0">
-          <a:scrgbClr r="0" g="0" b="0"/>
-        </a:lnRef>
-        <a:fillRef idx="0">
-          <a:scrgbClr r="0" g="0" b="0"/>
-        </a:fillRef>
-        <a:effectRef idx="0">
-          <a:scrgbClr r="0" g="0" b="0"/>
-        </a:effectRef>
-        <a:fontRef idx="minor"/>
-      </dsp:style>
-      <dsp:txBody>
-        <a:bodyPr spcFirstLastPara="0" vert="horz" wrap="square" lIns="140970" tIns="140970" rIns="140970" bIns="140970" numCol="1" spcCol="1270" anchor="t" anchorCtr="0">
-          <a:noAutofit/>
-        </a:bodyPr>
-        <a:lstStyle/>
-        <a:p>
-          <a:pPr marL="0" lvl="0" indent="0" algn="l" defTabSz="1644650">
-            <a:lnSpc>
-              <a:spcPct val="90000"/>
-            </a:lnSpc>
-            <a:spcBef>
-              <a:spcPct val="0"/>
-            </a:spcBef>
-            <a:spcAft>
-              <a:spcPct val="35000"/>
-            </a:spcAft>
-            <a:buNone/>
-          </a:pPr>
-          <a:r>
-            <a:rPr lang="en-US" sz="3700" kern="1200" dirty="0"/>
-            <a:t>Scalability</a:t>
-          </a:r>
-        </a:p>
-      </dsp:txBody>
-      <dsp:txXfrm>
-        <a:off x="0" y="3353708"/>
-        <a:ext cx="5458837" cy="838299"/>
-      </dsp:txXfrm>
-    </dsp:sp>
   </dsp:spTree>
 </dsp:drawing>
 </file>
@@ -4390,482 +3469,6 @@
       <dsp:cNvGrpSpPr/>
     </dsp:nvGrpSpPr>
     <dsp:grpSpPr/>
-    <dsp:sp modelId="{4F8BE2CE-5CA7-4CD5-854E-11FC67CE0E80}">
-      <dsp:nvSpPr>
-        <dsp:cNvPr id="0" name=""/>
-        <dsp:cNvSpPr/>
-      </dsp:nvSpPr>
-      <dsp:spPr>
-        <a:xfrm>
-          <a:off x="0" y="0"/>
-          <a:ext cx="5458837" cy="0"/>
-        </a:xfrm>
-        <a:prstGeom prst="line">
-          <a:avLst/>
-        </a:prstGeom>
-        <a:solidFill>
-          <a:schemeClr val="accent1">
-            <a:hueOff val="0"/>
-            <a:satOff val="0"/>
-            <a:lumOff val="0"/>
-            <a:alphaOff val="0"/>
-          </a:schemeClr>
-        </a:solidFill>
-        <a:ln w="12700" cap="flat" cmpd="sng" algn="ctr">
-          <a:solidFill>
-            <a:schemeClr val="accent1">
-              <a:hueOff val="0"/>
-              <a:satOff val="0"/>
-              <a:lumOff val="0"/>
-              <a:alphaOff val="0"/>
-            </a:schemeClr>
-          </a:solidFill>
-          <a:prstDash val="solid"/>
-          <a:miter lim="800000"/>
-        </a:ln>
-        <a:effectLst/>
-      </dsp:spPr>
-      <dsp:style>
-        <a:lnRef idx="2">
-          <a:scrgbClr r="0" g="0" b="0"/>
-        </a:lnRef>
-        <a:fillRef idx="1">
-          <a:scrgbClr r="0" g="0" b="0"/>
-        </a:fillRef>
-        <a:effectRef idx="0">
-          <a:scrgbClr r="0" g="0" b="0"/>
-        </a:effectRef>
-        <a:fontRef idx="minor">
-          <a:schemeClr val="lt1"/>
-        </a:fontRef>
-      </dsp:style>
-    </dsp:sp>
-    <dsp:sp modelId="{38EBF77A-9526-4D3F-ADE6-48559CF99FBD}">
-      <dsp:nvSpPr>
-        <dsp:cNvPr id="0" name=""/>
-        <dsp:cNvSpPr/>
-      </dsp:nvSpPr>
-      <dsp:spPr>
-        <a:xfrm>
-          <a:off x="0" y="0"/>
-          <a:ext cx="5458837" cy="1048130"/>
-        </a:xfrm>
-        <a:prstGeom prst="rect">
-          <a:avLst/>
-        </a:prstGeom>
-        <a:noFill/>
-        <a:ln>
-          <a:noFill/>
-        </a:ln>
-        <a:effectLst/>
-      </dsp:spPr>
-      <dsp:style>
-        <a:lnRef idx="0">
-          <a:scrgbClr r="0" g="0" b="0"/>
-        </a:lnRef>
-        <a:fillRef idx="0">
-          <a:scrgbClr r="0" g="0" b="0"/>
-        </a:fillRef>
-        <a:effectRef idx="0">
-          <a:scrgbClr r="0" g="0" b="0"/>
-        </a:effectRef>
-        <a:fontRef idx="minor"/>
-      </dsp:style>
-      <dsp:txBody>
-        <a:bodyPr spcFirstLastPara="0" vert="horz" wrap="square" lIns="133350" tIns="133350" rIns="133350" bIns="133350" numCol="1" spcCol="1270" anchor="t" anchorCtr="0">
-          <a:noAutofit/>
-        </a:bodyPr>
-        <a:lstStyle/>
-        <a:p>
-          <a:pPr marL="0" lvl="0" indent="0" algn="l" defTabSz="1555750">
-            <a:lnSpc>
-              <a:spcPct val="90000"/>
-            </a:lnSpc>
-            <a:spcBef>
-              <a:spcPct val="0"/>
-            </a:spcBef>
-            <a:spcAft>
-              <a:spcPct val="35000"/>
-            </a:spcAft>
-            <a:buNone/>
-          </a:pPr>
-          <a:r>
-            <a:rPr lang="en-US" sz="3500" b="1" i="0" kern="1200" dirty="0">
-              <a:solidFill>
-                <a:schemeClr val="accent6"/>
-              </a:solidFill>
-            </a:rPr>
-            <a:t>Error Handling Mechanisms</a:t>
-          </a:r>
-          <a:endParaRPr lang="en-US" sz="3500" kern="1200" dirty="0">
-            <a:solidFill>
-              <a:schemeClr val="accent6"/>
-            </a:solidFill>
-          </a:endParaRPr>
-        </a:p>
-      </dsp:txBody>
-      <dsp:txXfrm>
-        <a:off x="0" y="0"/>
-        <a:ext cx="5458837" cy="1048130"/>
-      </dsp:txXfrm>
-    </dsp:sp>
-    <dsp:sp modelId="{B67680E4-BD92-46FD-B639-08CF108A79A5}">
-      <dsp:nvSpPr>
-        <dsp:cNvPr id="0" name=""/>
-        <dsp:cNvSpPr/>
-      </dsp:nvSpPr>
-      <dsp:spPr>
-        <a:xfrm>
-          <a:off x="0" y="1048129"/>
-          <a:ext cx="5458837" cy="0"/>
-        </a:xfrm>
-        <a:prstGeom prst="line">
-          <a:avLst/>
-        </a:prstGeom>
-        <a:solidFill>
-          <a:schemeClr val="accent1">
-            <a:hueOff val="0"/>
-            <a:satOff val="0"/>
-            <a:lumOff val="0"/>
-            <a:alphaOff val="0"/>
-          </a:schemeClr>
-        </a:solidFill>
-        <a:ln w="12700" cap="flat" cmpd="sng" algn="ctr">
-          <a:solidFill>
-            <a:schemeClr val="accent1">
-              <a:hueOff val="0"/>
-              <a:satOff val="0"/>
-              <a:lumOff val="0"/>
-              <a:alphaOff val="0"/>
-            </a:schemeClr>
-          </a:solidFill>
-          <a:prstDash val="solid"/>
-          <a:miter lim="800000"/>
-        </a:ln>
-        <a:effectLst/>
-      </dsp:spPr>
-      <dsp:style>
-        <a:lnRef idx="2">
-          <a:scrgbClr r="0" g="0" b="0"/>
-        </a:lnRef>
-        <a:fillRef idx="1">
-          <a:scrgbClr r="0" g="0" b="0"/>
-        </a:fillRef>
-        <a:effectRef idx="0">
-          <a:scrgbClr r="0" g="0" b="0"/>
-        </a:effectRef>
-        <a:fontRef idx="minor">
-          <a:schemeClr val="lt1"/>
-        </a:fontRef>
-      </dsp:style>
-    </dsp:sp>
-    <dsp:sp modelId="{14975301-FA52-42A2-B148-8F1294747BD5}">
-      <dsp:nvSpPr>
-        <dsp:cNvPr id="0" name=""/>
-        <dsp:cNvSpPr/>
-      </dsp:nvSpPr>
-      <dsp:spPr>
-        <a:xfrm>
-          <a:off x="0" y="1048130"/>
-          <a:ext cx="5458837" cy="1048130"/>
-        </a:xfrm>
-        <a:prstGeom prst="rect">
-          <a:avLst/>
-        </a:prstGeom>
-        <a:noFill/>
-        <a:ln>
-          <a:noFill/>
-        </a:ln>
-        <a:effectLst/>
-      </dsp:spPr>
-      <dsp:style>
-        <a:lnRef idx="0">
-          <a:scrgbClr r="0" g="0" b="0"/>
-        </a:lnRef>
-        <a:fillRef idx="0">
-          <a:scrgbClr r="0" g="0" b="0"/>
-        </a:fillRef>
-        <a:effectRef idx="0">
-          <a:scrgbClr r="0" g="0" b="0"/>
-        </a:effectRef>
-        <a:fontRef idx="minor"/>
-      </dsp:style>
-      <dsp:txBody>
-        <a:bodyPr spcFirstLastPara="0" vert="horz" wrap="square" lIns="133350" tIns="133350" rIns="133350" bIns="133350" numCol="1" spcCol="1270" anchor="t" anchorCtr="0">
-          <a:noAutofit/>
-        </a:bodyPr>
-        <a:lstStyle/>
-        <a:p>
-          <a:pPr marL="0" lvl="0" indent="0" algn="l" defTabSz="1555750">
-            <a:lnSpc>
-              <a:spcPct val="90000"/>
-            </a:lnSpc>
-            <a:spcBef>
-              <a:spcPct val="0"/>
-            </a:spcBef>
-            <a:spcAft>
-              <a:spcPct val="35000"/>
-            </a:spcAft>
-            <a:buNone/>
-          </a:pPr>
-          <a:r>
-            <a:rPr lang="en-US" sz="3500" b="1" i="0" kern="1200" dirty="0">
-              <a:solidFill>
-                <a:schemeClr val="accent6"/>
-              </a:solidFill>
-            </a:rPr>
-            <a:t>Algorithm Optimization</a:t>
-          </a:r>
-          <a:endParaRPr lang="en-US" sz="3500" kern="1200" dirty="0">
-            <a:solidFill>
-              <a:schemeClr val="accent6"/>
-            </a:solidFill>
-          </a:endParaRPr>
-        </a:p>
-      </dsp:txBody>
-      <dsp:txXfrm>
-        <a:off x="0" y="1048130"/>
-        <a:ext cx="5458837" cy="1048130"/>
-      </dsp:txXfrm>
-    </dsp:sp>
-    <dsp:sp modelId="{D72802A4-4187-49D5-A44A-5BAD1FB5F19E}">
-      <dsp:nvSpPr>
-        <dsp:cNvPr id="0" name=""/>
-        <dsp:cNvSpPr/>
-      </dsp:nvSpPr>
-      <dsp:spPr>
-        <a:xfrm>
-          <a:off x="0" y="2096259"/>
-          <a:ext cx="5458837" cy="0"/>
-        </a:xfrm>
-        <a:prstGeom prst="line">
-          <a:avLst/>
-        </a:prstGeom>
-        <a:solidFill>
-          <a:schemeClr val="accent1">
-            <a:hueOff val="0"/>
-            <a:satOff val="0"/>
-            <a:lumOff val="0"/>
-            <a:alphaOff val="0"/>
-          </a:schemeClr>
-        </a:solidFill>
-        <a:ln w="12700" cap="flat" cmpd="sng" algn="ctr">
-          <a:solidFill>
-            <a:schemeClr val="accent1">
-              <a:hueOff val="0"/>
-              <a:satOff val="0"/>
-              <a:lumOff val="0"/>
-              <a:alphaOff val="0"/>
-            </a:schemeClr>
-          </a:solidFill>
-          <a:prstDash val="solid"/>
-          <a:miter lim="800000"/>
-        </a:ln>
-        <a:effectLst/>
-      </dsp:spPr>
-      <dsp:style>
-        <a:lnRef idx="2">
-          <a:scrgbClr r="0" g="0" b="0"/>
-        </a:lnRef>
-        <a:fillRef idx="1">
-          <a:scrgbClr r="0" g="0" b="0"/>
-        </a:fillRef>
-        <a:effectRef idx="0">
-          <a:scrgbClr r="0" g="0" b="0"/>
-        </a:effectRef>
-        <a:fontRef idx="minor">
-          <a:schemeClr val="lt1"/>
-        </a:fontRef>
-      </dsp:style>
-    </dsp:sp>
-    <dsp:sp modelId="{246A4C03-D7FA-4BF2-9D43-BE770C63417D}">
-      <dsp:nvSpPr>
-        <dsp:cNvPr id="0" name=""/>
-        <dsp:cNvSpPr/>
-      </dsp:nvSpPr>
-      <dsp:spPr>
-        <a:xfrm>
-          <a:off x="0" y="2096260"/>
-          <a:ext cx="5458837" cy="1048130"/>
-        </a:xfrm>
-        <a:prstGeom prst="rect">
-          <a:avLst/>
-        </a:prstGeom>
-        <a:noFill/>
-        <a:ln>
-          <a:noFill/>
-        </a:ln>
-        <a:effectLst/>
-      </dsp:spPr>
-      <dsp:style>
-        <a:lnRef idx="0">
-          <a:scrgbClr r="0" g="0" b="0"/>
-        </a:lnRef>
-        <a:fillRef idx="0">
-          <a:scrgbClr r="0" g="0" b="0"/>
-        </a:fillRef>
-        <a:effectRef idx="0">
-          <a:scrgbClr r="0" g="0" b="0"/>
-        </a:effectRef>
-        <a:fontRef idx="minor"/>
-      </dsp:style>
-      <dsp:txBody>
-        <a:bodyPr spcFirstLastPara="0" vert="horz" wrap="square" lIns="133350" tIns="133350" rIns="133350" bIns="133350" numCol="1" spcCol="1270" anchor="t" anchorCtr="0">
-          <a:noAutofit/>
-        </a:bodyPr>
-        <a:lstStyle/>
-        <a:p>
-          <a:pPr marL="0" lvl="0" indent="0" algn="l" defTabSz="1555750">
-            <a:lnSpc>
-              <a:spcPct val="90000"/>
-            </a:lnSpc>
-            <a:spcBef>
-              <a:spcPct val="0"/>
-            </a:spcBef>
-            <a:spcAft>
-              <a:spcPct val="35000"/>
-            </a:spcAft>
-            <a:buNone/>
-          </a:pPr>
-          <a:r>
-            <a:rPr lang="en-US" sz="3500" b="1" i="0" kern="1200" dirty="0">
-              <a:solidFill>
-                <a:schemeClr val="accent6"/>
-              </a:solidFill>
-            </a:rPr>
-            <a:t>Input Validation</a:t>
-          </a:r>
-          <a:endParaRPr lang="en-US" sz="3500" kern="1200" dirty="0">
-            <a:solidFill>
-              <a:schemeClr val="accent6"/>
-            </a:solidFill>
-          </a:endParaRPr>
-        </a:p>
-      </dsp:txBody>
-      <dsp:txXfrm>
-        <a:off x="0" y="2096260"/>
-        <a:ext cx="5458837" cy="1048130"/>
-      </dsp:txXfrm>
-    </dsp:sp>
-    <dsp:sp modelId="{0DE814F1-9FFB-45E2-97FD-6F142D4D5A26}">
-      <dsp:nvSpPr>
-        <dsp:cNvPr id="0" name=""/>
-        <dsp:cNvSpPr/>
-      </dsp:nvSpPr>
-      <dsp:spPr>
-        <a:xfrm>
-          <a:off x="0" y="3144390"/>
-          <a:ext cx="5458837" cy="0"/>
-        </a:xfrm>
-        <a:prstGeom prst="line">
-          <a:avLst/>
-        </a:prstGeom>
-        <a:solidFill>
-          <a:schemeClr val="accent1">
-            <a:hueOff val="0"/>
-            <a:satOff val="0"/>
-            <a:lumOff val="0"/>
-            <a:alphaOff val="0"/>
-          </a:schemeClr>
-        </a:solidFill>
-        <a:ln w="12700" cap="flat" cmpd="sng" algn="ctr">
-          <a:solidFill>
-            <a:schemeClr val="accent1">
-              <a:hueOff val="0"/>
-              <a:satOff val="0"/>
-              <a:lumOff val="0"/>
-              <a:alphaOff val="0"/>
-            </a:schemeClr>
-          </a:solidFill>
-          <a:prstDash val="solid"/>
-          <a:miter lim="800000"/>
-        </a:ln>
-        <a:effectLst/>
-      </dsp:spPr>
-      <dsp:style>
-        <a:lnRef idx="2">
-          <a:scrgbClr r="0" g="0" b="0"/>
-        </a:lnRef>
-        <a:fillRef idx="1">
-          <a:scrgbClr r="0" g="0" b="0"/>
-        </a:fillRef>
-        <a:effectRef idx="0">
-          <a:scrgbClr r="0" g="0" b="0"/>
-        </a:effectRef>
-        <a:fontRef idx="minor">
-          <a:schemeClr val="lt1"/>
-        </a:fontRef>
-      </dsp:style>
-    </dsp:sp>
-    <dsp:sp modelId="{0D5B195F-3288-4904-AE80-A121553E5A39}">
-      <dsp:nvSpPr>
-        <dsp:cNvPr id="0" name=""/>
-        <dsp:cNvSpPr/>
-      </dsp:nvSpPr>
-      <dsp:spPr>
-        <a:xfrm>
-          <a:off x="0" y="3144390"/>
-          <a:ext cx="5458837" cy="1048130"/>
-        </a:xfrm>
-        <a:prstGeom prst="rect">
-          <a:avLst/>
-        </a:prstGeom>
-        <a:noFill/>
-        <a:ln>
-          <a:noFill/>
-        </a:ln>
-        <a:effectLst/>
-      </dsp:spPr>
-      <dsp:style>
-        <a:lnRef idx="0">
-          <a:scrgbClr r="0" g="0" b="0"/>
-        </a:lnRef>
-        <a:fillRef idx="0">
-          <a:scrgbClr r="0" g="0" b="0"/>
-        </a:fillRef>
-        <a:effectRef idx="0">
-          <a:scrgbClr r="0" g="0" b="0"/>
-        </a:effectRef>
-        <a:fontRef idx="minor"/>
-      </dsp:style>
-      <dsp:txBody>
-        <a:bodyPr spcFirstLastPara="0" vert="horz" wrap="square" lIns="133350" tIns="133350" rIns="133350" bIns="133350" numCol="1" spcCol="1270" anchor="t" anchorCtr="0">
-          <a:noAutofit/>
-        </a:bodyPr>
-        <a:lstStyle/>
-        <a:p>
-          <a:pPr marL="0" lvl="0" indent="0" algn="l" defTabSz="1555750">
-            <a:lnSpc>
-              <a:spcPct val="90000"/>
-            </a:lnSpc>
-            <a:spcBef>
-              <a:spcPct val="0"/>
-            </a:spcBef>
-            <a:spcAft>
-              <a:spcPct val="35000"/>
-            </a:spcAft>
-            <a:buNone/>
-          </a:pPr>
-          <a:r>
-            <a:rPr lang="en-US" sz="3500" b="1" i="0" kern="1200" dirty="0">
-              <a:solidFill>
-                <a:schemeClr val="accent6"/>
-              </a:solidFill>
-            </a:rPr>
-            <a:t>Modular Design</a:t>
-          </a:r>
-          <a:endParaRPr lang="en-US" sz="3500" kern="1200" dirty="0">
-            <a:solidFill>
-              <a:schemeClr val="accent6"/>
-            </a:solidFill>
-          </a:endParaRPr>
-        </a:p>
-      </dsp:txBody>
-      <dsp:txXfrm>
-        <a:off x="0" y="3144390"/>
-        <a:ext cx="5458837" cy="1048130"/>
-      </dsp:txXfrm>
-    </dsp:sp>
   </dsp:spTree>
 </dsp:drawing>
 </file>
@@ -5147,7 +3750,7 @@
   </dgm:layoutNode>
   <dgm:extLst>
     <a:ext uri="{68A01E43-0DF5-4B5B-8FA6-DAF915123BFB}">
-      <dgm1612:lstStyle xmlns:dgm1612="http://schemas.microsoft.com/office/drawing/2016/12/diagram">
+      <dgm1612:lstStyle xmlns:dgm1612="http://schemas.microsoft.com/office/drawing/2016/12/diagram" xmlns="">
         <a:lvl1pPr>
           <a:lnSpc>
             <a:spcPct val="100000"/>
@@ -9225,7 +7828,7 @@
           <p:cNvPr id="2" name="Header Placeholder 1">
             <a:extLst>
               <a:ext uri="{FF2B5EF4-FFF2-40B4-BE49-F238E27FC236}">
-                <a16:creationId xmlns:a16="http://schemas.microsoft.com/office/drawing/2014/main" id="{CA2E547D-1406-4A6F-8F93-E441204CE6E7}"/>
+                <a16:creationId xmlns:a16="http://schemas.microsoft.com/office/drawing/2014/main" xmlns="" id="{CA2E547D-1406-4A6F-8F93-E441204CE6E7}"/>
               </a:ext>
             </a:extLst>
           </p:cNvPr>
@@ -9262,7 +7865,7 @@
           <p:cNvPr id="3" name="Date Placeholder 2">
             <a:extLst>
               <a:ext uri="{FF2B5EF4-FFF2-40B4-BE49-F238E27FC236}">
-                <a16:creationId xmlns:a16="http://schemas.microsoft.com/office/drawing/2014/main" id="{76667F8A-B889-49B3-AC77-5DDF11A08AFE}"/>
+                <a16:creationId xmlns:a16="http://schemas.microsoft.com/office/drawing/2014/main" xmlns="" id="{76667F8A-B889-49B3-AC77-5DDF11A08AFE}"/>
               </a:ext>
             </a:extLst>
           </p:cNvPr>
@@ -9303,7 +7906,7 @@
           <p:cNvPr id="4" name="Footer Placeholder 3">
             <a:extLst>
               <a:ext uri="{FF2B5EF4-FFF2-40B4-BE49-F238E27FC236}">
-                <a16:creationId xmlns:a16="http://schemas.microsoft.com/office/drawing/2014/main" id="{567AFD4F-C0E7-421C-AF77-6F9CC963C9C8}"/>
+                <a16:creationId xmlns:a16="http://schemas.microsoft.com/office/drawing/2014/main" xmlns="" id="{567AFD4F-C0E7-421C-AF77-6F9CC963C9C8}"/>
               </a:ext>
             </a:extLst>
           </p:cNvPr>
@@ -9340,7 +7943,7 @@
           <p:cNvPr id="5" name="Slide Number Placeholder 4">
             <a:extLst>
               <a:ext uri="{FF2B5EF4-FFF2-40B4-BE49-F238E27FC236}">
-                <a16:creationId xmlns:a16="http://schemas.microsoft.com/office/drawing/2014/main" id="{1074AB9F-6726-4FB1-8769-82E23336CEBC}"/>
+                <a16:creationId xmlns:a16="http://schemas.microsoft.com/office/drawing/2014/main" xmlns="" id="{1074AB9F-6726-4FB1-8769-82E23336CEBC}"/>
               </a:ext>
             </a:extLst>
           </p:cNvPr>
@@ -10280,7 +8883,7 @@
           <p:cNvPr id="2" name="Title 1">
             <a:extLst>
               <a:ext uri="{FF2B5EF4-FFF2-40B4-BE49-F238E27FC236}">
-                <a16:creationId xmlns:a16="http://schemas.microsoft.com/office/drawing/2014/main" id="{8E9718B7-7F68-4CC9-8291-332587FA31D3}"/>
+                <a16:creationId xmlns:a16="http://schemas.microsoft.com/office/drawing/2014/main" xmlns="" id="{8E9718B7-7F68-4CC9-8291-332587FA31D3}"/>
               </a:ext>
             </a:extLst>
           </p:cNvPr>
@@ -10317,7 +8920,7 @@
           <p:cNvPr id="3" name="Subtitle 2">
             <a:extLst>
               <a:ext uri="{FF2B5EF4-FFF2-40B4-BE49-F238E27FC236}">
-                <a16:creationId xmlns:a16="http://schemas.microsoft.com/office/drawing/2014/main" id="{A181D6BB-0446-49E8-8677-EADF274E952F}"/>
+                <a16:creationId xmlns:a16="http://schemas.microsoft.com/office/drawing/2014/main" xmlns="" id="{A181D6BB-0446-49E8-8677-EADF274E952F}"/>
               </a:ext>
             </a:extLst>
           </p:cNvPr>
@@ -10387,7 +8990,7 @@
           <p:cNvPr id="4" name="Date Placeholder 3">
             <a:extLst>
               <a:ext uri="{FF2B5EF4-FFF2-40B4-BE49-F238E27FC236}">
-                <a16:creationId xmlns:a16="http://schemas.microsoft.com/office/drawing/2014/main" id="{535AEE24-534A-40F1-99E4-00B7D5FD9124}"/>
+                <a16:creationId xmlns:a16="http://schemas.microsoft.com/office/drawing/2014/main" xmlns="" id="{535AEE24-534A-40F1-99E4-00B7D5FD9124}"/>
               </a:ext>
             </a:extLst>
           </p:cNvPr>
@@ -10416,7 +9019,7 @@
           <p:cNvPr id="5" name="Footer Placeholder 4">
             <a:extLst>
               <a:ext uri="{FF2B5EF4-FFF2-40B4-BE49-F238E27FC236}">
-                <a16:creationId xmlns:a16="http://schemas.microsoft.com/office/drawing/2014/main" id="{CD594011-48FF-493D-8286-F62D34552531}"/>
+                <a16:creationId xmlns:a16="http://schemas.microsoft.com/office/drawing/2014/main" xmlns="" id="{CD594011-48FF-493D-8286-F62D34552531}"/>
               </a:ext>
             </a:extLst>
           </p:cNvPr>
@@ -10441,7 +9044,7 @@
           <p:cNvPr id="6" name="Slide Number Placeholder 5">
             <a:extLst>
               <a:ext uri="{FF2B5EF4-FFF2-40B4-BE49-F238E27FC236}">
-                <a16:creationId xmlns:a16="http://schemas.microsoft.com/office/drawing/2014/main" id="{4880EFCD-7E72-4882-86DC-2F371D7D9516}"/>
+                <a16:creationId xmlns:a16="http://schemas.microsoft.com/office/drawing/2014/main" xmlns="" id="{4880EFCD-7E72-4882-86DC-2F371D7D9516}"/>
               </a:ext>
             </a:extLst>
           </p:cNvPr>
@@ -10500,7 +9103,7 @@
           <p:cNvPr id="2" name="Title 1">
             <a:extLst>
               <a:ext uri="{FF2B5EF4-FFF2-40B4-BE49-F238E27FC236}">
-                <a16:creationId xmlns:a16="http://schemas.microsoft.com/office/drawing/2014/main" id="{C4A47D73-EDDA-49A6-BA12-1CA980DA9BC0}"/>
+                <a16:creationId xmlns:a16="http://schemas.microsoft.com/office/drawing/2014/main" xmlns="" id="{C4A47D73-EDDA-49A6-BA12-1CA980DA9BC0}"/>
               </a:ext>
             </a:extLst>
           </p:cNvPr>
@@ -10528,7 +9131,7 @@
           <p:cNvPr id="3" name="Vertical Text Placeholder 2">
             <a:extLst>
               <a:ext uri="{FF2B5EF4-FFF2-40B4-BE49-F238E27FC236}">
-                <a16:creationId xmlns:a16="http://schemas.microsoft.com/office/drawing/2014/main" id="{2189B82E-4CA1-47A5-B133-FBD4D8A83983}"/>
+                <a16:creationId xmlns:a16="http://schemas.microsoft.com/office/drawing/2014/main" xmlns="" id="{2189B82E-4CA1-47A5-B133-FBD4D8A83983}"/>
               </a:ext>
             </a:extLst>
           </p:cNvPr>
@@ -10585,7 +9188,7 @@
           <p:cNvPr id="4" name="Date Placeholder 3">
             <a:extLst>
               <a:ext uri="{FF2B5EF4-FFF2-40B4-BE49-F238E27FC236}">
-                <a16:creationId xmlns:a16="http://schemas.microsoft.com/office/drawing/2014/main" id="{938A267F-D142-4D04-9F03-6CB099E6FA32}"/>
+                <a16:creationId xmlns:a16="http://schemas.microsoft.com/office/drawing/2014/main" xmlns="" id="{938A267F-D142-4D04-9F03-6CB099E6FA32}"/>
               </a:ext>
             </a:extLst>
           </p:cNvPr>
@@ -10614,7 +9217,7 @@
           <p:cNvPr id="5" name="Footer Placeholder 4">
             <a:extLst>
               <a:ext uri="{FF2B5EF4-FFF2-40B4-BE49-F238E27FC236}">
-                <a16:creationId xmlns:a16="http://schemas.microsoft.com/office/drawing/2014/main" id="{705127CA-154D-4E90-B776-A2EE71F78D2E}"/>
+                <a16:creationId xmlns:a16="http://schemas.microsoft.com/office/drawing/2014/main" xmlns="" id="{705127CA-154D-4E90-B776-A2EE71F78D2E}"/>
               </a:ext>
             </a:extLst>
           </p:cNvPr>
@@ -10639,7 +9242,7 @@
           <p:cNvPr id="6" name="Slide Number Placeholder 5">
             <a:extLst>
               <a:ext uri="{FF2B5EF4-FFF2-40B4-BE49-F238E27FC236}">
-                <a16:creationId xmlns:a16="http://schemas.microsoft.com/office/drawing/2014/main" id="{ED5F0BA5-F4EE-4282-B111-76B869BE267D}"/>
+                <a16:creationId xmlns:a16="http://schemas.microsoft.com/office/drawing/2014/main" xmlns="" id="{ED5F0BA5-F4EE-4282-B111-76B869BE267D}"/>
               </a:ext>
             </a:extLst>
           </p:cNvPr>
@@ -10698,7 +9301,7 @@
           <p:cNvPr id="2" name="Vertical Title 1">
             <a:extLst>
               <a:ext uri="{FF2B5EF4-FFF2-40B4-BE49-F238E27FC236}">
-                <a16:creationId xmlns:a16="http://schemas.microsoft.com/office/drawing/2014/main" id="{0256E92A-52E0-4710-BDEF-0A1534685403}"/>
+                <a16:creationId xmlns:a16="http://schemas.microsoft.com/office/drawing/2014/main" xmlns="" id="{0256E92A-52E0-4710-BDEF-0A1534685403}"/>
               </a:ext>
             </a:extLst>
           </p:cNvPr>
@@ -10731,7 +9334,7 @@
           <p:cNvPr id="3" name="Vertical Text Placeholder 2">
             <a:extLst>
               <a:ext uri="{FF2B5EF4-FFF2-40B4-BE49-F238E27FC236}">
-                <a16:creationId xmlns:a16="http://schemas.microsoft.com/office/drawing/2014/main" id="{B7A240E1-5EB0-47FD-AA37-BF945D136CC3}"/>
+                <a16:creationId xmlns:a16="http://schemas.microsoft.com/office/drawing/2014/main" xmlns="" id="{B7A240E1-5EB0-47FD-AA37-BF945D136CC3}"/>
               </a:ext>
             </a:extLst>
           </p:cNvPr>
@@ -10793,7 +9396,7 @@
           <p:cNvPr id="4" name="Date Placeholder 3">
             <a:extLst>
               <a:ext uri="{FF2B5EF4-FFF2-40B4-BE49-F238E27FC236}">
-                <a16:creationId xmlns:a16="http://schemas.microsoft.com/office/drawing/2014/main" id="{A1A14243-F1E4-487A-ABEC-30516A01DF2B}"/>
+                <a16:creationId xmlns:a16="http://schemas.microsoft.com/office/drawing/2014/main" xmlns="" id="{A1A14243-F1E4-487A-ABEC-30516A01DF2B}"/>
               </a:ext>
             </a:extLst>
           </p:cNvPr>
@@ -10822,7 +9425,7 @@
           <p:cNvPr id="5" name="Footer Placeholder 4">
             <a:extLst>
               <a:ext uri="{FF2B5EF4-FFF2-40B4-BE49-F238E27FC236}">
-                <a16:creationId xmlns:a16="http://schemas.microsoft.com/office/drawing/2014/main" id="{AC358244-98FD-472D-AB8C-075F71C10BF7}"/>
+                <a16:creationId xmlns:a16="http://schemas.microsoft.com/office/drawing/2014/main" xmlns="" id="{AC358244-98FD-472D-AB8C-075F71C10BF7}"/>
               </a:ext>
             </a:extLst>
           </p:cNvPr>
@@ -10847,7 +9450,7 @@
           <p:cNvPr id="6" name="Slide Number Placeholder 5">
             <a:extLst>
               <a:ext uri="{FF2B5EF4-FFF2-40B4-BE49-F238E27FC236}">
-                <a16:creationId xmlns:a16="http://schemas.microsoft.com/office/drawing/2014/main" id="{74998D5A-820D-4519-967F-33320971CBAB}"/>
+                <a16:creationId xmlns:a16="http://schemas.microsoft.com/office/drawing/2014/main" xmlns="" id="{74998D5A-820D-4519-967F-33320971CBAB}"/>
               </a:ext>
             </a:extLst>
           </p:cNvPr>
@@ -10906,7 +9509,7 @@
           <p:cNvPr id="2" name="Title 1">
             <a:extLst>
               <a:ext uri="{FF2B5EF4-FFF2-40B4-BE49-F238E27FC236}">
-                <a16:creationId xmlns:a16="http://schemas.microsoft.com/office/drawing/2014/main" id="{C86334F3-0709-471B-A734-C4B404F55B8E}"/>
+                <a16:creationId xmlns:a16="http://schemas.microsoft.com/office/drawing/2014/main" xmlns="" id="{C86334F3-0709-471B-A734-C4B404F55B8E}"/>
               </a:ext>
             </a:extLst>
           </p:cNvPr>
@@ -10934,7 +9537,7 @@
           <p:cNvPr id="3" name="Content Placeholder 2">
             <a:extLst>
               <a:ext uri="{FF2B5EF4-FFF2-40B4-BE49-F238E27FC236}">
-                <a16:creationId xmlns:a16="http://schemas.microsoft.com/office/drawing/2014/main" id="{AF795016-AF78-4708-9C5F-21110C197B03}"/>
+                <a16:creationId xmlns:a16="http://schemas.microsoft.com/office/drawing/2014/main" xmlns="" id="{AF795016-AF78-4708-9C5F-21110C197B03}"/>
               </a:ext>
             </a:extLst>
           </p:cNvPr>
@@ -10991,7 +9594,7 @@
           <p:cNvPr id="4" name="Date Placeholder 3">
             <a:extLst>
               <a:ext uri="{FF2B5EF4-FFF2-40B4-BE49-F238E27FC236}">
-                <a16:creationId xmlns:a16="http://schemas.microsoft.com/office/drawing/2014/main" id="{2AAEA2D1-B124-4454-AFDC-EA60A14BA121}"/>
+                <a16:creationId xmlns:a16="http://schemas.microsoft.com/office/drawing/2014/main" xmlns="" id="{2AAEA2D1-B124-4454-AFDC-EA60A14BA121}"/>
               </a:ext>
             </a:extLst>
           </p:cNvPr>
@@ -11020,7 +9623,7 @@
           <p:cNvPr id="5" name="Footer Placeholder 4">
             <a:extLst>
               <a:ext uri="{FF2B5EF4-FFF2-40B4-BE49-F238E27FC236}">
-                <a16:creationId xmlns:a16="http://schemas.microsoft.com/office/drawing/2014/main" id="{B4F58000-F9D7-4A53-A6C5-E5E8154226B4}"/>
+                <a16:creationId xmlns:a16="http://schemas.microsoft.com/office/drawing/2014/main" xmlns="" id="{B4F58000-F9D7-4A53-A6C5-E5E8154226B4}"/>
               </a:ext>
             </a:extLst>
           </p:cNvPr>
@@ -11045,7 +9648,7 @@
           <p:cNvPr id="6" name="Slide Number Placeholder 5">
             <a:extLst>
               <a:ext uri="{FF2B5EF4-FFF2-40B4-BE49-F238E27FC236}">
-                <a16:creationId xmlns:a16="http://schemas.microsoft.com/office/drawing/2014/main" id="{70D22AAD-0D08-4F47-8D5A-EFE29017E8DD}"/>
+                <a16:creationId xmlns:a16="http://schemas.microsoft.com/office/drawing/2014/main" xmlns="" id="{70D22AAD-0D08-4F47-8D5A-EFE29017E8DD}"/>
               </a:ext>
             </a:extLst>
           </p:cNvPr>
@@ -11104,7 +9707,7 @@
           <p:cNvPr id="2" name="Title 1">
             <a:extLst>
               <a:ext uri="{FF2B5EF4-FFF2-40B4-BE49-F238E27FC236}">
-                <a16:creationId xmlns:a16="http://schemas.microsoft.com/office/drawing/2014/main" id="{39036159-1280-4EE9-96D3-A56BD5826612}"/>
+                <a16:creationId xmlns:a16="http://schemas.microsoft.com/office/drawing/2014/main" xmlns="" id="{39036159-1280-4EE9-96D3-A56BD5826612}"/>
               </a:ext>
             </a:extLst>
           </p:cNvPr>
@@ -11141,7 +9744,7 @@
           <p:cNvPr id="3" name="Text Placeholder 2">
             <a:extLst>
               <a:ext uri="{FF2B5EF4-FFF2-40B4-BE49-F238E27FC236}">
-                <a16:creationId xmlns:a16="http://schemas.microsoft.com/office/drawing/2014/main" id="{3BA27A78-1874-488A-B215-7D763D338186}"/>
+                <a16:creationId xmlns:a16="http://schemas.microsoft.com/office/drawing/2014/main" xmlns="" id="{3BA27A78-1874-488A-B215-7D763D338186}"/>
               </a:ext>
             </a:extLst>
           </p:cNvPr>
@@ -11266,7 +9869,7 @@
           <p:cNvPr id="4" name="Date Placeholder 3">
             <a:extLst>
               <a:ext uri="{FF2B5EF4-FFF2-40B4-BE49-F238E27FC236}">
-                <a16:creationId xmlns:a16="http://schemas.microsoft.com/office/drawing/2014/main" id="{084BB3D1-3138-4B69-BF5D-4B1A213451CA}"/>
+                <a16:creationId xmlns:a16="http://schemas.microsoft.com/office/drawing/2014/main" xmlns="" id="{084BB3D1-3138-4B69-BF5D-4B1A213451CA}"/>
               </a:ext>
             </a:extLst>
           </p:cNvPr>
@@ -11295,7 +9898,7 @@
           <p:cNvPr id="5" name="Footer Placeholder 4">
             <a:extLst>
               <a:ext uri="{FF2B5EF4-FFF2-40B4-BE49-F238E27FC236}">
-                <a16:creationId xmlns:a16="http://schemas.microsoft.com/office/drawing/2014/main" id="{0EFF90C5-31F4-4A22-AC00-3FB5ED291B28}"/>
+                <a16:creationId xmlns:a16="http://schemas.microsoft.com/office/drawing/2014/main" xmlns="" id="{0EFF90C5-31F4-4A22-AC00-3FB5ED291B28}"/>
               </a:ext>
             </a:extLst>
           </p:cNvPr>
@@ -11320,7 +9923,7 @@
           <p:cNvPr id="6" name="Slide Number Placeholder 5">
             <a:extLst>
               <a:ext uri="{FF2B5EF4-FFF2-40B4-BE49-F238E27FC236}">
-                <a16:creationId xmlns:a16="http://schemas.microsoft.com/office/drawing/2014/main" id="{951F787E-B946-4091-ABC6-F9DB06BBEE34}"/>
+                <a16:creationId xmlns:a16="http://schemas.microsoft.com/office/drawing/2014/main" xmlns="" id="{951F787E-B946-4091-ABC6-F9DB06BBEE34}"/>
               </a:ext>
             </a:extLst>
           </p:cNvPr>
@@ -11379,7 +9982,7 @@
           <p:cNvPr id="2" name="Title 1">
             <a:extLst>
               <a:ext uri="{FF2B5EF4-FFF2-40B4-BE49-F238E27FC236}">
-                <a16:creationId xmlns:a16="http://schemas.microsoft.com/office/drawing/2014/main" id="{F60CAA11-CC97-44E5-AE4D-808FD741A066}"/>
+                <a16:creationId xmlns:a16="http://schemas.microsoft.com/office/drawing/2014/main" xmlns="" id="{F60CAA11-CC97-44E5-AE4D-808FD741A066}"/>
               </a:ext>
             </a:extLst>
           </p:cNvPr>
@@ -11407,7 +10010,7 @@
           <p:cNvPr id="3" name="Content Placeholder 2">
             <a:extLst>
               <a:ext uri="{FF2B5EF4-FFF2-40B4-BE49-F238E27FC236}">
-                <a16:creationId xmlns:a16="http://schemas.microsoft.com/office/drawing/2014/main" id="{683AB6CB-9460-4BCA-86C5-5F26357AB80F}"/>
+                <a16:creationId xmlns:a16="http://schemas.microsoft.com/office/drawing/2014/main" xmlns="" id="{683AB6CB-9460-4BCA-86C5-5F26357AB80F}"/>
               </a:ext>
             </a:extLst>
           </p:cNvPr>
@@ -11469,7 +10072,7 @@
           <p:cNvPr id="4" name="Content Placeholder 3">
             <a:extLst>
               <a:ext uri="{FF2B5EF4-FFF2-40B4-BE49-F238E27FC236}">
-                <a16:creationId xmlns:a16="http://schemas.microsoft.com/office/drawing/2014/main" id="{69FAB0F6-401D-4BAF-A300-65AD684DF961}"/>
+                <a16:creationId xmlns:a16="http://schemas.microsoft.com/office/drawing/2014/main" xmlns="" id="{69FAB0F6-401D-4BAF-A300-65AD684DF961}"/>
               </a:ext>
             </a:extLst>
           </p:cNvPr>
@@ -11531,7 +10134,7 @@
           <p:cNvPr id="5" name="Date Placeholder 4">
             <a:extLst>
               <a:ext uri="{FF2B5EF4-FFF2-40B4-BE49-F238E27FC236}">
-                <a16:creationId xmlns:a16="http://schemas.microsoft.com/office/drawing/2014/main" id="{C4561BBA-B185-4B45-B152-3D320E15F550}"/>
+                <a16:creationId xmlns:a16="http://schemas.microsoft.com/office/drawing/2014/main" xmlns="" id="{C4561BBA-B185-4B45-B152-3D320E15F550}"/>
               </a:ext>
             </a:extLst>
           </p:cNvPr>
@@ -11560,7 +10163,7 @@
           <p:cNvPr id="6" name="Footer Placeholder 5">
             <a:extLst>
               <a:ext uri="{FF2B5EF4-FFF2-40B4-BE49-F238E27FC236}">
-                <a16:creationId xmlns:a16="http://schemas.microsoft.com/office/drawing/2014/main" id="{D61CD760-96AC-4821-A56B-0B805F2FAD44}"/>
+                <a16:creationId xmlns:a16="http://schemas.microsoft.com/office/drawing/2014/main" xmlns="" id="{D61CD760-96AC-4821-A56B-0B805F2FAD44}"/>
               </a:ext>
             </a:extLst>
           </p:cNvPr>
@@ -11585,7 +10188,7 @@
           <p:cNvPr id="7" name="Slide Number Placeholder 6">
             <a:extLst>
               <a:ext uri="{FF2B5EF4-FFF2-40B4-BE49-F238E27FC236}">
-                <a16:creationId xmlns:a16="http://schemas.microsoft.com/office/drawing/2014/main" id="{2F750665-D5B5-4D0B-B2F0-CB6B027CDEC7}"/>
+                <a16:creationId xmlns:a16="http://schemas.microsoft.com/office/drawing/2014/main" xmlns="" id="{2F750665-D5B5-4D0B-B2F0-CB6B027CDEC7}"/>
               </a:ext>
             </a:extLst>
           </p:cNvPr>
@@ -11644,7 +10247,7 @@
           <p:cNvPr id="2" name="Title 1">
             <a:extLst>
               <a:ext uri="{FF2B5EF4-FFF2-40B4-BE49-F238E27FC236}">
-                <a16:creationId xmlns:a16="http://schemas.microsoft.com/office/drawing/2014/main" id="{01EA47C3-C498-415A-A057-E19BCEB5F28D}"/>
+                <a16:creationId xmlns:a16="http://schemas.microsoft.com/office/drawing/2014/main" xmlns="" id="{01EA47C3-C498-415A-A057-E19BCEB5F28D}"/>
               </a:ext>
             </a:extLst>
           </p:cNvPr>
@@ -11677,7 +10280,7 @@
           <p:cNvPr id="3" name="Text Placeholder 2">
             <a:extLst>
               <a:ext uri="{FF2B5EF4-FFF2-40B4-BE49-F238E27FC236}">
-                <a16:creationId xmlns:a16="http://schemas.microsoft.com/office/drawing/2014/main" id="{7BF6677F-2712-4810-A3AA-56FA75386D2A}"/>
+                <a16:creationId xmlns:a16="http://schemas.microsoft.com/office/drawing/2014/main" xmlns="" id="{7BF6677F-2712-4810-A3AA-56FA75386D2A}"/>
               </a:ext>
             </a:extLst>
           </p:cNvPr>
@@ -11748,7 +10351,7 @@
           <p:cNvPr id="4" name="Content Placeholder 3">
             <a:extLst>
               <a:ext uri="{FF2B5EF4-FFF2-40B4-BE49-F238E27FC236}">
-                <a16:creationId xmlns:a16="http://schemas.microsoft.com/office/drawing/2014/main" id="{F871B54A-6775-4978-8E19-32694C9B5E38}"/>
+                <a16:creationId xmlns:a16="http://schemas.microsoft.com/office/drawing/2014/main" xmlns="" id="{F871B54A-6775-4978-8E19-32694C9B5E38}"/>
               </a:ext>
             </a:extLst>
           </p:cNvPr>
@@ -11810,7 +10413,7 @@
           <p:cNvPr id="5" name="Text Placeholder 4">
             <a:extLst>
               <a:ext uri="{FF2B5EF4-FFF2-40B4-BE49-F238E27FC236}">
-                <a16:creationId xmlns:a16="http://schemas.microsoft.com/office/drawing/2014/main" id="{DDBA1303-B245-476D-BD02-A4E4A359F6E7}"/>
+                <a16:creationId xmlns:a16="http://schemas.microsoft.com/office/drawing/2014/main" xmlns="" id="{DDBA1303-B245-476D-BD02-A4E4A359F6E7}"/>
               </a:ext>
             </a:extLst>
           </p:cNvPr>
@@ -11881,7 +10484,7 @@
           <p:cNvPr id="6" name="Content Placeholder 5">
             <a:extLst>
               <a:ext uri="{FF2B5EF4-FFF2-40B4-BE49-F238E27FC236}">
-                <a16:creationId xmlns:a16="http://schemas.microsoft.com/office/drawing/2014/main" id="{BE8E898F-5B79-46F1-89C1-F827997CC485}"/>
+                <a16:creationId xmlns:a16="http://schemas.microsoft.com/office/drawing/2014/main" xmlns="" id="{BE8E898F-5B79-46F1-89C1-F827997CC485}"/>
               </a:ext>
             </a:extLst>
           </p:cNvPr>
@@ -11943,7 +10546,7 @@
           <p:cNvPr id="7" name="Date Placeholder 6">
             <a:extLst>
               <a:ext uri="{FF2B5EF4-FFF2-40B4-BE49-F238E27FC236}">
-                <a16:creationId xmlns:a16="http://schemas.microsoft.com/office/drawing/2014/main" id="{6B417A4D-2EC9-4294-BFF4-EAE22EE1099A}"/>
+                <a16:creationId xmlns:a16="http://schemas.microsoft.com/office/drawing/2014/main" xmlns="" id="{6B417A4D-2EC9-4294-BFF4-EAE22EE1099A}"/>
               </a:ext>
             </a:extLst>
           </p:cNvPr>
@@ -11972,7 +10575,7 @@
           <p:cNvPr id="8" name="Footer Placeholder 7">
             <a:extLst>
               <a:ext uri="{FF2B5EF4-FFF2-40B4-BE49-F238E27FC236}">
-                <a16:creationId xmlns:a16="http://schemas.microsoft.com/office/drawing/2014/main" id="{6150E317-3602-42A1-BB7F-0184072E8D5F}"/>
+                <a16:creationId xmlns:a16="http://schemas.microsoft.com/office/drawing/2014/main" xmlns="" id="{6150E317-3602-42A1-BB7F-0184072E8D5F}"/>
               </a:ext>
             </a:extLst>
           </p:cNvPr>
@@ -11997,7 +10600,7 @@
           <p:cNvPr id="9" name="Slide Number Placeholder 8">
             <a:extLst>
               <a:ext uri="{FF2B5EF4-FFF2-40B4-BE49-F238E27FC236}">
-                <a16:creationId xmlns:a16="http://schemas.microsoft.com/office/drawing/2014/main" id="{50CE2C97-E26C-4A8B-93A0-B01E2C7F4522}"/>
+                <a16:creationId xmlns:a16="http://schemas.microsoft.com/office/drawing/2014/main" xmlns="" id="{50CE2C97-E26C-4A8B-93A0-B01E2C7F4522}"/>
               </a:ext>
             </a:extLst>
           </p:cNvPr>
@@ -12056,7 +10659,7 @@
           <p:cNvPr id="2" name="Title 1">
             <a:extLst>
               <a:ext uri="{FF2B5EF4-FFF2-40B4-BE49-F238E27FC236}">
-                <a16:creationId xmlns:a16="http://schemas.microsoft.com/office/drawing/2014/main" id="{719F68FC-5755-447A-8D7F-9ADED3E994A3}"/>
+                <a16:creationId xmlns:a16="http://schemas.microsoft.com/office/drawing/2014/main" xmlns="" id="{719F68FC-5755-447A-8D7F-9ADED3E994A3}"/>
               </a:ext>
             </a:extLst>
           </p:cNvPr>
@@ -12084,7 +10687,7 @@
           <p:cNvPr id="3" name="Date Placeholder 2">
             <a:extLst>
               <a:ext uri="{FF2B5EF4-FFF2-40B4-BE49-F238E27FC236}">
-                <a16:creationId xmlns:a16="http://schemas.microsoft.com/office/drawing/2014/main" id="{8AB50287-81AA-46CA-8CB3-53A7F8313741}"/>
+                <a16:creationId xmlns:a16="http://schemas.microsoft.com/office/drawing/2014/main" xmlns="" id="{8AB50287-81AA-46CA-8CB3-53A7F8313741}"/>
               </a:ext>
             </a:extLst>
           </p:cNvPr>
@@ -12113,7 +10716,7 @@
           <p:cNvPr id="4" name="Footer Placeholder 3">
             <a:extLst>
               <a:ext uri="{FF2B5EF4-FFF2-40B4-BE49-F238E27FC236}">
-                <a16:creationId xmlns:a16="http://schemas.microsoft.com/office/drawing/2014/main" id="{2F1BA4AA-02C9-459E-9362-3DA60E3B5972}"/>
+                <a16:creationId xmlns:a16="http://schemas.microsoft.com/office/drawing/2014/main" xmlns="" id="{2F1BA4AA-02C9-459E-9362-3DA60E3B5972}"/>
               </a:ext>
             </a:extLst>
           </p:cNvPr>
@@ -12138,7 +10741,7 @@
           <p:cNvPr id="5" name="Slide Number Placeholder 4">
             <a:extLst>
               <a:ext uri="{FF2B5EF4-FFF2-40B4-BE49-F238E27FC236}">
-                <a16:creationId xmlns:a16="http://schemas.microsoft.com/office/drawing/2014/main" id="{AB2A2C8F-DBB4-4235-A67E-FB4039D9AA24}"/>
+                <a16:creationId xmlns:a16="http://schemas.microsoft.com/office/drawing/2014/main" xmlns="" id="{AB2A2C8F-DBB4-4235-A67E-FB4039D9AA24}"/>
               </a:ext>
             </a:extLst>
           </p:cNvPr>
@@ -12197,7 +10800,7 @@
           <p:cNvPr id="2" name="Date Placeholder 1">
             <a:extLst>
               <a:ext uri="{FF2B5EF4-FFF2-40B4-BE49-F238E27FC236}">
-                <a16:creationId xmlns:a16="http://schemas.microsoft.com/office/drawing/2014/main" id="{B46ACAA5-F8E7-46E9-8BA7-A510948B62CC}"/>
+                <a16:creationId xmlns:a16="http://schemas.microsoft.com/office/drawing/2014/main" xmlns="" id="{B46ACAA5-F8E7-46E9-8BA7-A510948B62CC}"/>
               </a:ext>
             </a:extLst>
           </p:cNvPr>
@@ -12226,7 +10829,7 @@
           <p:cNvPr id="3" name="Footer Placeholder 2">
             <a:extLst>
               <a:ext uri="{FF2B5EF4-FFF2-40B4-BE49-F238E27FC236}">
-                <a16:creationId xmlns:a16="http://schemas.microsoft.com/office/drawing/2014/main" id="{D1F2DEE8-5654-4DCA-A8D0-D883E52B6FBC}"/>
+                <a16:creationId xmlns:a16="http://schemas.microsoft.com/office/drawing/2014/main" xmlns="" id="{D1F2DEE8-5654-4DCA-A8D0-D883E52B6FBC}"/>
               </a:ext>
             </a:extLst>
           </p:cNvPr>
@@ -12251,7 +10854,7 @@
           <p:cNvPr id="4" name="Slide Number Placeholder 3">
             <a:extLst>
               <a:ext uri="{FF2B5EF4-FFF2-40B4-BE49-F238E27FC236}">
-                <a16:creationId xmlns:a16="http://schemas.microsoft.com/office/drawing/2014/main" id="{B0B179A5-4329-4057-9DEB-5B6E3AD1183F}"/>
+                <a16:creationId xmlns:a16="http://schemas.microsoft.com/office/drawing/2014/main" xmlns="" id="{B0B179A5-4329-4057-9DEB-5B6E3AD1183F}"/>
               </a:ext>
             </a:extLst>
           </p:cNvPr>
@@ -12310,7 +10913,7 @@
           <p:cNvPr id="2" name="Title 1">
             <a:extLst>
               <a:ext uri="{FF2B5EF4-FFF2-40B4-BE49-F238E27FC236}">
-                <a16:creationId xmlns:a16="http://schemas.microsoft.com/office/drawing/2014/main" id="{3291DA80-336B-4DBB-91A1-6E3E4B3C20AA}"/>
+                <a16:creationId xmlns:a16="http://schemas.microsoft.com/office/drawing/2014/main" xmlns="" id="{3291DA80-336B-4DBB-91A1-6E3E4B3C20AA}"/>
               </a:ext>
             </a:extLst>
           </p:cNvPr>
@@ -12347,7 +10950,7 @@
           <p:cNvPr id="3" name="Content Placeholder 2">
             <a:extLst>
               <a:ext uri="{FF2B5EF4-FFF2-40B4-BE49-F238E27FC236}">
-                <a16:creationId xmlns:a16="http://schemas.microsoft.com/office/drawing/2014/main" id="{3840D456-F0A3-4789-A310-A23F01B2EC00}"/>
+                <a16:creationId xmlns:a16="http://schemas.microsoft.com/office/drawing/2014/main" xmlns="" id="{3840D456-F0A3-4789-A310-A23F01B2EC00}"/>
               </a:ext>
             </a:extLst>
           </p:cNvPr>
@@ -12437,7 +11040,7 @@
           <p:cNvPr id="4" name="Text Placeholder 3">
             <a:extLst>
               <a:ext uri="{FF2B5EF4-FFF2-40B4-BE49-F238E27FC236}">
-                <a16:creationId xmlns:a16="http://schemas.microsoft.com/office/drawing/2014/main" id="{CB8A8B05-7071-44D4-80F7-3E8191C9A49B}"/>
+                <a16:creationId xmlns:a16="http://schemas.microsoft.com/office/drawing/2014/main" xmlns="" id="{CB8A8B05-7071-44D4-80F7-3E8191C9A49B}"/>
               </a:ext>
             </a:extLst>
           </p:cNvPr>
@@ -12508,7 +11111,7 @@
           <p:cNvPr id="5" name="Date Placeholder 4">
             <a:extLst>
               <a:ext uri="{FF2B5EF4-FFF2-40B4-BE49-F238E27FC236}">
-                <a16:creationId xmlns:a16="http://schemas.microsoft.com/office/drawing/2014/main" id="{E5D8562E-E6F1-449B-909C-98426BA86B36}"/>
+                <a16:creationId xmlns:a16="http://schemas.microsoft.com/office/drawing/2014/main" xmlns="" id="{E5D8562E-E6F1-449B-909C-98426BA86B36}"/>
               </a:ext>
             </a:extLst>
           </p:cNvPr>
@@ -12537,7 +11140,7 @@
           <p:cNvPr id="6" name="Footer Placeholder 5">
             <a:extLst>
               <a:ext uri="{FF2B5EF4-FFF2-40B4-BE49-F238E27FC236}">
-                <a16:creationId xmlns:a16="http://schemas.microsoft.com/office/drawing/2014/main" id="{7EB47A9A-FB08-407B-A73A-0AC513F0FD5A}"/>
+                <a16:creationId xmlns:a16="http://schemas.microsoft.com/office/drawing/2014/main" xmlns="" id="{7EB47A9A-FB08-407B-A73A-0AC513F0FD5A}"/>
               </a:ext>
             </a:extLst>
           </p:cNvPr>
@@ -12562,7 +11165,7 @@
           <p:cNvPr id="7" name="Slide Number Placeholder 6">
             <a:extLst>
               <a:ext uri="{FF2B5EF4-FFF2-40B4-BE49-F238E27FC236}">
-                <a16:creationId xmlns:a16="http://schemas.microsoft.com/office/drawing/2014/main" id="{4BFF841F-796A-4FE6-B5E0-C8A4986793EE}"/>
+                <a16:creationId xmlns:a16="http://schemas.microsoft.com/office/drawing/2014/main" xmlns="" id="{4BFF841F-796A-4FE6-B5E0-C8A4986793EE}"/>
               </a:ext>
             </a:extLst>
           </p:cNvPr>
@@ -12621,7 +11224,7 @@
           <p:cNvPr id="2" name="Title 1">
             <a:extLst>
               <a:ext uri="{FF2B5EF4-FFF2-40B4-BE49-F238E27FC236}">
-                <a16:creationId xmlns:a16="http://schemas.microsoft.com/office/drawing/2014/main" id="{3CAD474D-6779-4C23-BD3C-82F5DC3E3E2F}"/>
+                <a16:creationId xmlns:a16="http://schemas.microsoft.com/office/drawing/2014/main" xmlns="" id="{3CAD474D-6779-4C23-BD3C-82F5DC3E3E2F}"/>
               </a:ext>
             </a:extLst>
           </p:cNvPr>
@@ -12658,7 +11261,7 @@
           <p:cNvPr id="3" name="Picture Placeholder 2">
             <a:extLst>
               <a:ext uri="{FF2B5EF4-FFF2-40B4-BE49-F238E27FC236}">
-                <a16:creationId xmlns:a16="http://schemas.microsoft.com/office/drawing/2014/main" id="{0A21096C-E430-49C7-A801-21C0BD95DC42}"/>
+                <a16:creationId xmlns:a16="http://schemas.microsoft.com/office/drawing/2014/main" xmlns="" id="{0A21096C-E430-49C7-A801-21C0BD95DC42}"/>
               </a:ext>
             </a:extLst>
           </p:cNvPr>
@@ -12729,7 +11332,7 @@
           <p:cNvPr id="4" name="Text Placeholder 3">
             <a:extLst>
               <a:ext uri="{FF2B5EF4-FFF2-40B4-BE49-F238E27FC236}">
-                <a16:creationId xmlns:a16="http://schemas.microsoft.com/office/drawing/2014/main" id="{0024828F-334F-4A50-850D-10684F245271}"/>
+                <a16:creationId xmlns:a16="http://schemas.microsoft.com/office/drawing/2014/main" xmlns="" id="{0024828F-334F-4A50-850D-10684F245271}"/>
               </a:ext>
             </a:extLst>
           </p:cNvPr>
@@ -12800,7 +11403,7 @@
           <p:cNvPr id="5" name="Date Placeholder 4">
             <a:extLst>
               <a:ext uri="{FF2B5EF4-FFF2-40B4-BE49-F238E27FC236}">
-                <a16:creationId xmlns:a16="http://schemas.microsoft.com/office/drawing/2014/main" id="{533293F4-2B70-4BB5-A982-219E4133E251}"/>
+                <a16:creationId xmlns:a16="http://schemas.microsoft.com/office/drawing/2014/main" xmlns="" id="{533293F4-2B70-4BB5-A982-219E4133E251}"/>
               </a:ext>
             </a:extLst>
           </p:cNvPr>
@@ -12829,7 +11432,7 @@
           <p:cNvPr id="6" name="Footer Placeholder 5">
             <a:extLst>
               <a:ext uri="{FF2B5EF4-FFF2-40B4-BE49-F238E27FC236}">
-                <a16:creationId xmlns:a16="http://schemas.microsoft.com/office/drawing/2014/main" id="{C4F9A86F-B378-4759-B50E-2E0BFAE62463}"/>
+                <a16:creationId xmlns:a16="http://schemas.microsoft.com/office/drawing/2014/main" xmlns="" id="{C4F9A86F-B378-4759-B50E-2E0BFAE62463}"/>
               </a:ext>
             </a:extLst>
           </p:cNvPr>
@@ -12854,7 +11457,7 @@
           <p:cNvPr id="7" name="Slide Number Placeholder 6">
             <a:extLst>
               <a:ext uri="{FF2B5EF4-FFF2-40B4-BE49-F238E27FC236}">
-                <a16:creationId xmlns:a16="http://schemas.microsoft.com/office/drawing/2014/main" id="{B0A95BDC-FC58-4638-AA59-A3DA9931FD3D}"/>
+                <a16:creationId xmlns:a16="http://schemas.microsoft.com/office/drawing/2014/main" xmlns="" id="{B0A95BDC-FC58-4638-AA59-A3DA9931FD3D}"/>
               </a:ext>
             </a:extLst>
           </p:cNvPr>
@@ -12918,7 +11521,7 @@
           <p:cNvPr id="2" name="Title Placeholder 1">
             <a:extLst>
               <a:ext uri="{FF2B5EF4-FFF2-40B4-BE49-F238E27FC236}">
-                <a16:creationId xmlns:a16="http://schemas.microsoft.com/office/drawing/2014/main" id="{6D80BC3B-525F-4038-9330-0729879F9185}"/>
+                <a16:creationId xmlns:a16="http://schemas.microsoft.com/office/drawing/2014/main" xmlns="" id="{6D80BC3B-525F-4038-9330-0729879F9185}"/>
               </a:ext>
             </a:extLst>
           </p:cNvPr>
@@ -12956,7 +11559,7 @@
           <p:cNvPr id="3" name="Text Placeholder 2">
             <a:extLst>
               <a:ext uri="{FF2B5EF4-FFF2-40B4-BE49-F238E27FC236}">
-                <a16:creationId xmlns:a16="http://schemas.microsoft.com/office/drawing/2014/main" id="{99629186-93D7-46FA-AE02-36D9426043AF}"/>
+                <a16:creationId xmlns:a16="http://schemas.microsoft.com/office/drawing/2014/main" xmlns="" id="{99629186-93D7-46FA-AE02-36D9426043AF}"/>
               </a:ext>
             </a:extLst>
           </p:cNvPr>
@@ -13023,7 +11626,7 @@
           <p:cNvPr id="4" name="Date Placeholder 3">
             <a:extLst>
               <a:ext uri="{FF2B5EF4-FFF2-40B4-BE49-F238E27FC236}">
-                <a16:creationId xmlns:a16="http://schemas.microsoft.com/office/drawing/2014/main" id="{21BF1CEB-0530-4996-BAEF-2E6A04DAD60F}"/>
+                <a16:creationId xmlns:a16="http://schemas.microsoft.com/office/drawing/2014/main" xmlns="" id="{21BF1CEB-0530-4996-BAEF-2E6A04DAD60F}"/>
               </a:ext>
             </a:extLst>
           </p:cNvPr>
@@ -13070,7 +11673,7 @@
           <p:cNvPr id="5" name="Footer Placeholder 4">
             <a:extLst>
               <a:ext uri="{FF2B5EF4-FFF2-40B4-BE49-F238E27FC236}">
-                <a16:creationId xmlns:a16="http://schemas.microsoft.com/office/drawing/2014/main" id="{C8DCFF3D-7353-4B4D-9E75-FA835E06E749}"/>
+                <a16:creationId xmlns:a16="http://schemas.microsoft.com/office/drawing/2014/main" xmlns="" id="{C8DCFF3D-7353-4B4D-9E75-FA835E06E749}"/>
               </a:ext>
             </a:extLst>
           </p:cNvPr>
@@ -13113,7 +11716,7 @@
           <p:cNvPr id="6" name="Slide Number Placeholder 5">
             <a:extLst>
               <a:ext uri="{FF2B5EF4-FFF2-40B4-BE49-F238E27FC236}">
-                <a16:creationId xmlns:a16="http://schemas.microsoft.com/office/drawing/2014/main" id="{F382C8D6-8B0B-4982-9EE4-AA823C69C327}"/>
+                <a16:creationId xmlns:a16="http://schemas.microsoft.com/office/drawing/2014/main" xmlns="" id="{F382C8D6-8B0B-4982-9EE4-AA823C69C327}"/>
               </a:ext>
             </a:extLst>
           </p:cNvPr>
@@ -13489,10 +12092,10 @@
           <p:cNvPr id="48" name="Rectangle 47">
             <a:extLst>
               <a:ext uri="{FF2B5EF4-FFF2-40B4-BE49-F238E27FC236}">
-                <a16:creationId xmlns:a16="http://schemas.microsoft.com/office/drawing/2014/main" id="{2F4D5922-434B-4829-B93E-02DC38A29519}"/>
+                <a16:creationId xmlns:a16="http://schemas.microsoft.com/office/drawing/2014/main" xmlns="" id="{2F4D5922-434B-4829-B93E-02DC38A29519}"/>
               </a:ext>
               <a:ext uri="{C183D7F6-B498-43B3-948B-1728B52AA6E4}">
-                <adec:decorative xmlns:adec="http://schemas.microsoft.com/office/drawing/2017/decorative" val="1"/>
+                <adec:decorative xmlns:adec="http://schemas.microsoft.com/office/drawing/2017/decorative" xmlns="" val="1"/>
               </a:ext>
             </a:extLst>
           </p:cNvPr>
@@ -13502,7 +12105,7 @@
           <p:nvPr>
             <p:extLst>
               <p:ext uri="{386F3935-93C4-4BCD-93E2-E3B085C9AB24}">
-                <p16:designElem xmlns:p16="http://schemas.microsoft.com/office/powerpoint/2015/main" val="1"/>
+                <p16:designElem xmlns:p16="http://schemas.microsoft.com/office/powerpoint/2015/main" xmlns="" val="1"/>
               </p:ext>
             </p:extLst>
           </p:nvPr>
@@ -13552,10 +12155,10 @@
           <p:cNvPr id="50" name="Rectangle 49">
             <a:extLst>
               <a:ext uri="{FF2B5EF4-FFF2-40B4-BE49-F238E27FC236}">
-                <a16:creationId xmlns:a16="http://schemas.microsoft.com/office/drawing/2014/main" id="{F35FBA24-5C01-4635-A984-1DB6E340B052}"/>
+                <a16:creationId xmlns:a16="http://schemas.microsoft.com/office/drawing/2014/main" xmlns="" id="{F35FBA24-5C01-4635-A984-1DB6E340B052}"/>
               </a:ext>
               <a:ext uri="{C183D7F6-B498-43B3-948B-1728B52AA6E4}">
-                <adec:decorative xmlns:adec="http://schemas.microsoft.com/office/drawing/2017/decorative" val="1"/>
+                <adec:decorative xmlns:adec="http://schemas.microsoft.com/office/drawing/2017/decorative" xmlns="" val="1"/>
               </a:ext>
             </a:extLst>
           </p:cNvPr>
@@ -13565,7 +12168,7 @@
           <p:nvPr>
             <p:extLst>
               <p:ext uri="{386F3935-93C4-4BCD-93E2-E3B085C9AB24}">
-                <p16:designElem xmlns:p16="http://schemas.microsoft.com/office/powerpoint/2015/main" val="1"/>
+                <p16:designElem xmlns:p16="http://schemas.microsoft.com/office/powerpoint/2015/main" xmlns="" val="1"/>
               </p:ext>
             </p:extLst>
           </p:nvPr>
@@ -13617,10 +12220,10 @@
           <p:cNvPr id="52" name="Group 51">
             <a:extLst>
               <a:ext uri="{FF2B5EF4-FFF2-40B4-BE49-F238E27FC236}">
-                <a16:creationId xmlns:a16="http://schemas.microsoft.com/office/drawing/2014/main" id="{B7B4DECA-15C8-4678-96F8-1CA5C3D502E6}"/>
+                <a16:creationId xmlns:a16="http://schemas.microsoft.com/office/drawing/2014/main" xmlns="" id="{B7B4DECA-15C8-4678-96F8-1CA5C3D502E6}"/>
               </a:ext>
               <a:ext uri="{C183D7F6-B498-43B3-948B-1728B52AA6E4}">
-                <adec:decorative xmlns:adec="http://schemas.microsoft.com/office/drawing/2017/decorative" val="1"/>
+                <adec:decorative xmlns:adec="http://schemas.microsoft.com/office/drawing/2017/decorative" xmlns="" val="1"/>
               </a:ext>
             </a:extLst>
           </p:cNvPr>
@@ -13630,7 +12233,7 @@
           <p:nvPr>
             <p:extLst>
               <p:ext uri="{386F3935-93C4-4BCD-93E2-E3B085C9AB24}">
-                <p16:designElem xmlns:p16="http://schemas.microsoft.com/office/powerpoint/2015/main" val="1"/>
+                <p16:designElem xmlns:p16="http://schemas.microsoft.com/office/powerpoint/2015/main" xmlns="" val="1"/>
               </p:ext>
             </p:extLst>
           </p:nvPr>
@@ -13648,10 +12251,10 @@
             <p:cNvPr id="53" name="Straight Connector 52">
               <a:extLst>
                 <a:ext uri="{FF2B5EF4-FFF2-40B4-BE49-F238E27FC236}">
-                  <a16:creationId xmlns:a16="http://schemas.microsoft.com/office/drawing/2014/main" id="{F0D83F5C-F1F1-4882-9C32-26A6B186A897}"/>
+                  <a16:creationId xmlns:a16="http://schemas.microsoft.com/office/drawing/2014/main" xmlns="" id="{F0D83F5C-F1F1-4882-9C32-26A6B186A897}"/>
                 </a:ext>
                 <a:ext uri="{C183D7F6-B498-43B3-948B-1728B52AA6E4}">
-                  <adec:decorative xmlns:adec="http://schemas.microsoft.com/office/drawing/2017/decorative" val="1"/>
+                  <adec:decorative xmlns:adec="http://schemas.microsoft.com/office/drawing/2017/decorative" xmlns="" val="1"/>
                 </a:ext>
               </a:extLst>
             </p:cNvPr>
@@ -13661,7 +12264,7 @@
             <p:nvPr>
               <p:extLst>
                 <p:ext uri="{386F3935-93C4-4BCD-93E2-E3B085C9AB24}">
-                  <p16:designElem xmlns:p16="http://schemas.microsoft.com/office/powerpoint/2015/main" val="1"/>
+                  <p16:designElem xmlns:p16="http://schemas.microsoft.com/office/powerpoint/2015/main" xmlns="" val="1"/>
                 </p:ext>
               </p:extLst>
             </p:nvPr>
@@ -13705,10 +12308,10 @@
             <p:cNvPr id="54" name="Straight Connector 53">
               <a:extLst>
                 <a:ext uri="{FF2B5EF4-FFF2-40B4-BE49-F238E27FC236}">
-                  <a16:creationId xmlns:a16="http://schemas.microsoft.com/office/drawing/2014/main" id="{AED0986A-A3B6-4FFD-9EBD-A5CCBF8CE335}"/>
+                  <a16:creationId xmlns:a16="http://schemas.microsoft.com/office/drawing/2014/main" xmlns="" id="{AED0986A-A3B6-4FFD-9EBD-A5CCBF8CE335}"/>
                 </a:ext>
                 <a:ext uri="{C183D7F6-B498-43B3-948B-1728B52AA6E4}">
-                  <adec:decorative xmlns:adec="http://schemas.microsoft.com/office/drawing/2017/decorative" val="1"/>
+                  <adec:decorative xmlns:adec="http://schemas.microsoft.com/office/drawing/2017/decorative" xmlns="" val="1"/>
                 </a:ext>
               </a:extLst>
             </p:cNvPr>
@@ -13718,7 +12321,7 @@
             <p:nvPr>
               <p:extLst>
                 <p:ext uri="{386F3935-93C4-4BCD-93E2-E3B085C9AB24}">
-                  <p16:designElem xmlns:p16="http://schemas.microsoft.com/office/powerpoint/2015/main" val="1"/>
+                  <p16:designElem xmlns:p16="http://schemas.microsoft.com/office/powerpoint/2015/main" xmlns="" val="1"/>
                 </p:ext>
               </p:extLst>
             </p:nvPr>
@@ -13762,10 +12365,10 @@
             <p:cNvPr id="55" name="Straight Connector 54">
               <a:extLst>
                 <a:ext uri="{FF2B5EF4-FFF2-40B4-BE49-F238E27FC236}">
-                  <a16:creationId xmlns:a16="http://schemas.microsoft.com/office/drawing/2014/main" id="{AABA8203-A31E-45DE-97A5-E5B006413055}"/>
+                  <a16:creationId xmlns:a16="http://schemas.microsoft.com/office/drawing/2014/main" xmlns="" id="{AABA8203-A31E-45DE-97A5-E5B006413055}"/>
                 </a:ext>
                 <a:ext uri="{C183D7F6-B498-43B3-948B-1728B52AA6E4}">
-                  <adec:decorative xmlns:adec="http://schemas.microsoft.com/office/drawing/2017/decorative" val="1"/>
+                  <adec:decorative xmlns:adec="http://schemas.microsoft.com/office/drawing/2017/decorative" xmlns="" val="1"/>
                 </a:ext>
               </a:extLst>
             </p:cNvPr>
@@ -13775,7 +12378,7 @@
             <p:nvPr>
               <p:extLst>
                 <p:ext uri="{386F3935-93C4-4BCD-93E2-E3B085C9AB24}">
-                  <p16:designElem xmlns:p16="http://schemas.microsoft.com/office/powerpoint/2015/main" val="1"/>
+                  <p16:designElem xmlns:p16="http://schemas.microsoft.com/office/powerpoint/2015/main" xmlns="" val="1"/>
                 </p:ext>
               </p:extLst>
             </p:nvPr>
@@ -13819,10 +12422,10 @@
             <p:cNvPr id="56" name="Straight Connector 55">
               <a:extLst>
                 <a:ext uri="{FF2B5EF4-FFF2-40B4-BE49-F238E27FC236}">
-                  <a16:creationId xmlns:a16="http://schemas.microsoft.com/office/drawing/2014/main" id="{5202206D-4121-46D6-9F2F-4F24D2144432}"/>
+                  <a16:creationId xmlns:a16="http://schemas.microsoft.com/office/drawing/2014/main" xmlns="" id="{5202206D-4121-46D6-9F2F-4F24D2144432}"/>
                 </a:ext>
                 <a:ext uri="{C183D7F6-B498-43B3-948B-1728B52AA6E4}">
-                  <adec:decorative xmlns:adec="http://schemas.microsoft.com/office/drawing/2017/decorative" val="1"/>
+                  <adec:decorative xmlns:adec="http://schemas.microsoft.com/office/drawing/2017/decorative" xmlns="" val="1"/>
                 </a:ext>
               </a:extLst>
             </p:cNvPr>
@@ -13832,7 +12435,7 @@
             <p:nvPr>
               <p:extLst>
                 <p:ext uri="{386F3935-93C4-4BCD-93E2-E3B085C9AB24}">
-                  <p16:designElem xmlns:p16="http://schemas.microsoft.com/office/powerpoint/2015/main" val="1"/>
+                  <p16:designElem xmlns:p16="http://schemas.microsoft.com/office/powerpoint/2015/main" xmlns="" val="1"/>
                 </p:ext>
               </p:extLst>
             </p:nvPr>
@@ -13877,10 +12480,10 @@
           <p:cNvPr id="58" name="Group 57">
             <a:extLst>
               <a:ext uri="{FF2B5EF4-FFF2-40B4-BE49-F238E27FC236}">
-                <a16:creationId xmlns:a16="http://schemas.microsoft.com/office/drawing/2014/main" id="{A2E84827-A7DB-4923-93DA-389B07E74719}"/>
+                <a16:creationId xmlns:a16="http://schemas.microsoft.com/office/drawing/2014/main" xmlns="" id="{A2E84827-A7DB-4923-93DA-389B07E74719}"/>
               </a:ext>
               <a:ext uri="{C183D7F6-B498-43B3-948B-1728B52AA6E4}">
-                <adec:decorative xmlns:adec="http://schemas.microsoft.com/office/drawing/2017/decorative" val="1"/>
+                <adec:decorative xmlns:adec="http://schemas.microsoft.com/office/drawing/2017/decorative" xmlns="" val="1"/>
               </a:ext>
             </a:extLst>
           </p:cNvPr>
@@ -13890,7 +12493,7 @@
           <p:nvPr>
             <p:extLst>
               <p:ext uri="{386F3935-93C4-4BCD-93E2-E3B085C9AB24}">
-                <p16:designElem xmlns:p16="http://schemas.microsoft.com/office/powerpoint/2015/main" val="1"/>
+                <p16:designElem xmlns:p16="http://schemas.microsoft.com/office/powerpoint/2015/main" xmlns="" val="1"/>
               </p:ext>
             </p:extLst>
           </p:nvPr>
@@ -13908,10 +12511,10 @@
             <p:cNvPr id="45" name="Oval 44">
               <a:extLst>
                 <a:ext uri="{FF2B5EF4-FFF2-40B4-BE49-F238E27FC236}">
-                  <a16:creationId xmlns:a16="http://schemas.microsoft.com/office/drawing/2014/main" id="{B475FB0A-1DEC-4FC5-BD8C-3FCBA47327CE}"/>
+                  <a16:creationId xmlns:a16="http://schemas.microsoft.com/office/drawing/2014/main" xmlns="" id="{B475FB0A-1DEC-4FC5-BD8C-3FCBA47327CE}"/>
                 </a:ext>
                 <a:ext uri="{C183D7F6-B498-43B3-948B-1728B52AA6E4}">
-                  <adec:decorative xmlns:adec="http://schemas.microsoft.com/office/drawing/2017/decorative" val="1"/>
+                  <adec:decorative xmlns:adec="http://schemas.microsoft.com/office/drawing/2017/decorative" xmlns="" val="1"/>
                 </a:ext>
               </a:extLst>
             </p:cNvPr>
@@ -13919,7 +12522,7 @@
             <p:nvPr>
               <p:extLst>
                 <p:ext uri="{386F3935-93C4-4BCD-93E2-E3B085C9AB24}">
-                  <p16:designElem xmlns:p16="http://schemas.microsoft.com/office/powerpoint/2015/main" val="1"/>
+                  <p16:designElem xmlns:p16="http://schemas.microsoft.com/office/powerpoint/2015/main" xmlns="" val="1"/>
                 </p:ext>
               </p:extLst>
             </p:nvPr>
@@ -13985,10 +12588,10 @@
             <p:cNvPr id="46" name="Oval 45">
               <a:extLst>
                 <a:ext uri="{FF2B5EF4-FFF2-40B4-BE49-F238E27FC236}">
-                  <a16:creationId xmlns:a16="http://schemas.microsoft.com/office/drawing/2014/main" id="{04E9E545-4EC3-4981-B3B6-18E42E957065}"/>
+                  <a16:creationId xmlns:a16="http://schemas.microsoft.com/office/drawing/2014/main" xmlns="" id="{04E9E545-4EC3-4981-B3B6-18E42E957065}"/>
                 </a:ext>
                 <a:ext uri="{C183D7F6-B498-43B3-948B-1728B52AA6E4}">
-                  <adec:decorative xmlns:adec="http://schemas.microsoft.com/office/drawing/2017/decorative" val="1"/>
+                  <adec:decorative xmlns:adec="http://schemas.microsoft.com/office/drawing/2017/decorative" xmlns="" val="1"/>
                 </a:ext>
               </a:extLst>
             </p:cNvPr>
@@ -13996,7 +12599,7 @@
             <p:nvPr>
               <p:extLst>
                 <p:ext uri="{386F3935-93C4-4BCD-93E2-E3B085C9AB24}">
-                  <p16:designElem xmlns:p16="http://schemas.microsoft.com/office/powerpoint/2015/main" val="1"/>
+                  <p16:designElem xmlns:p16="http://schemas.microsoft.com/office/powerpoint/2015/main" xmlns="" val="1"/>
                 </p:ext>
               </p:extLst>
             </p:nvPr>
@@ -14062,10 +12665,10 @@
             <p:cNvPr id="47" name="Oval 46">
               <a:extLst>
                 <a:ext uri="{FF2B5EF4-FFF2-40B4-BE49-F238E27FC236}">
-                  <a16:creationId xmlns:a16="http://schemas.microsoft.com/office/drawing/2014/main" id="{17DD96B3-0F8D-4B9A-95A2-A2C1467E67EB}"/>
+                  <a16:creationId xmlns:a16="http://schemas.microsoft.com/office/drawing/2014/main" xmlns="" id="{17DD96B3-0F8D-4B9A-95A2-A2C1467E67EB}"/>
                 </a:ext>
                 <a:ext uri="{C183D7F6-B498-43B3-948B-1728B52AA6E4}">
-                  <adec:decorative xmlns:adec="http://schemas.microsoft.com/office/drawing/2017/decorative" val="1"/>
+                  <adec:decorative xmlns:adec="http://schemas.microsoft.com/office/drawing/2017/decorative" xmlns="" val="1"/>
                 </a:ext>
               </a:extLst>
             </p:cNvPr>
@@ -14073,7 +12676,7 @@
             <p:nvPr>
               <p:extLst>
                 <p:ext uri="{386F3935-93C4-4BCD-93E2-E3B085C9AB24}">
-                  <p16:designElem xmlns:p16="http://schemas.microsoft.com/office/powerpoint/2015/main" val="1"/>
+                  <p16:designElem xmlns:p16="http://schemas.microsoft.com/office/powerpoint/2015/main" xmlns="" val="1"/>
                 </p:ext>
               </p:extLst>
             </p:nvPr>
@@ -14137,10 +12740,10 @@
             <p:cNvPr id="49" name="Oval 48">
               <a:extLst>
                 <a:ext uri="{FF2B5EF4-FFF2-40B4-BE49-F238E27FC236}">
-                  <a16:creationId xmlns:a16="http://schemas.microsoft.com/office/drawing/2014/main" id="{058498A5-4A75-4597-BF79-CF9AFD7CC5CC}"/>
+                  <a16:creationId xmlns:a16="http://schemas.microsoft.com/office/drawing/2014/main" xmlns="" id="{058498A5-4A75-4597-BF79-CF9AFD7CC5CC}"/>
                 </a:ext>
                 <a:ext uri="{C183D7F6-B498-43B3-948B-1728B52AA6E4}">
-                  <adec:decorative xmlns:adec="http://schemas.microsoft.com/office/drawing/2017/decorative" val="1"/>
+                  <adec:decorative xmlns:adec="http://schemas.microsoft.com/office/drawing/2017/decorative" xmlns="" val="1"/>
                 </a:ext>
               </a:extLst>
             </p:cNvPr>
@@ -14148,7 +12751,7 @@
             <p:nvPr>
               <p:extLst>
                 <p:ext uri="{386F3935-93C4-4BCD-93E2-E3B085C9AB24}">
-                  <p16:designElem xmlns:p16="http://schemas.microsoft.com/office/powerpoint/2015/main" val="1"/>
+                  <p16:designElem xmlns:p16="http://schemas.microsoft.com/office/powerpoint/2015/main" xmlns="" val="1"/>
                 </p:ext>
               </p:extLst>
             </p:nvPr>
@@ -14212,10 +12815,10 @@
             <p:cNvPr id="51" name="Oval 50">
               <a:extLst>
                 <a:ext uri="{FF2B5EF4-FFF2-40B4-BE49-F238E27FC236}">
-                  <a16:creationId xmlns:a16="http://schemas.microsoft.com/office/drawing/2014/main" id="{33EAA869-CF2D-4AE1-B111-BC0672EF2575}"/>
+                  <a16:creationId xmlns:a16="http://schemas.microsoft.com/office/drawing/2014/main" xmlns="" id="{33EAA869-CF2D-4AE1-B111-BC0672EF2575}"/>
                 </a:ext>
                 <a:ext uri="{C183D7F6-B498-43B3-948B-1728B52AA6E4}">
-                  <adec:decorative xmlns:adec="http://schemas.microsoft.com/office/drawing/2017/decorative" val="1"/>
+                  <adec:decorative xmlns:adec="http://schemas.microsoft.com/office/drawing/2017/decorative" xmlns="" val="1"/>
                 </a:ext>
               </a:extLst>
             </p:cNvPr>
@@ -14223,7 +12826,7 @@
             <p:nvPr>
               <p:extLst>
                 <p:ext uri="{386F3935-93C4-4BCD-93E2-E3B085C9AB24}">
-                  <p16:designElem xmlns:p16="http://schemas.microsoft.com/office/powerpoint/2015/main" val="1"/>
+                  <p16:designElem xmlns:p16="http://schemas.microsoft.com/office/powerpoint/2015/main" xmlns="" val="1"/>
                 </p:ext>
               </p:extLst>
             </p:nvPr>
@@ -14289,10 +12892,10 @@
             <p:cNvPr id="57" name="Oval 56">
               <a:extLst>
                 <a:ext uri="{FF2B5EF4-FFF2-40B4-BE49-F238E27FC236}">
-                  <a16:creationId xmlns:a16="http://schemas.microsoft.com/office/drawing/2014/main" id="{5192C877-08BA-4D8F-B5D6-AD6004E9FF4A}"/>
+                  <a16:creationId xmlns:a16="http://schemas.microsoft.com/office/drawing/2014/main" xmlns="" id="{5192C877-08BA-4D8F-B5D6-AD6004E9FF4A}"/>
                 </a:ext>
                 <a:ext uri="{C183D7F6-B498-43B3-948B-1728B52AA6E4}">
-                  <adec:decorative xmlns:adec="http://schemas.microsoft.com/office/drawing/2017/decorative" val="1"/>
+                  <adec:decorative xmlns:adec="http://schemas.microsoft.com/office/drawing/2017/decorative" xmlns="" val="1"/>
                 </a:ext>
               </a:extLst>
             </p:cNvPr>
@@ -14300,7 +12903,7 @@
             <p:nvPr>
               <p:extLst>
                 <p:ext uri="{386F3935-93C4-4BCD-93E2-E3B085C9AB24}">
-                  <p16:designElem xmlns:p16="http://schemas.microsoft.com/office/powerpoint/2015/main" val="1"/>
+                  <p16:designElem xmlns:p16="http://schemas.microsoft.com/office/powerpoint/2015/main" xmlns="" val="1"/>
                 </p:ext>
               </p:extLst>
             </p:nvPr>
@@ -14366,7 +12969,7 @@
           <p:cNvPr id="9" name="Graphic 8" descr="Open Book">
             <a:extLst>
               <a:ext uri="{FF2B5EF4-FFF2-40B4-BE49-F238E27FC236}">
-                <a16:creationId xmlns:a16="http://schemas.microsoft.com/office/drawing/2014/main" id="{93E427C7-0218-4592-82DA-2431E4BF8756}"/>
+                <a16:creationId xmlns:a16="http://schemas.microsoft.com/office/drawing/2014/main" xmlns="" id="{93E427C7-0218-4592-82DA-2431E4BF8756}"/>
               </a:ext>
             </a:extLst>
           </p:cNvPr>
@@ -14382,7 +12985,7 @@
                 <a14:useLocalDpi xmlns:a14="http://schemas.microsoft.com/office/drawing/2010/main" val="0"/>
               </a:ext>
               <a:ext uri="{96DAC541-7B7A-43D3-8B79-37D633B846F1}">
-                <asvg:svgBlip xmlns:asvg="http://schemas.microsoft.com/office/drawing/2016/SVG/main" r:embed="rId3"/>
+                <asvg:svgBlip xmlns:asvg="http://schemas.microsoft.com/office/drawing/2016/SVG/main" xmlns="" r:embed="rId3"/>
               </a:ext>
             </a:extLst>
           </a:blip>
@@ -14405,7 +13008,7 @@
           <p:cNvPr id="5" name="Graphic 4" descr="Chat">
             <a:extLst>
               <a:ext uri="{FF2B5EF4-FFF2-40B4-BE49-F238E27FC236}">
-                <a16:creationId xmlns:a16="http://schemas.microsoft.com/office/drawing/2014/main" id="{EB71843F-0A0B-4317-B205-4B0A0B97C0FD}"/>
+                <a16:creationId xmlns:a16="http://schemas.microsoft.com/office/drawing/2014/main" xmlns="" id="{EB71843F-0A0B-4317-B205-4B0A0B97C0FD}"/>
               </a:ext>
             </a:extLst>
           </p:cNvPr>
@@ -14421,7 +13024,7 @@
                 <a14:useLocalDpi xmlns:a14="http://schemas.microsoft.com/office/drawing/2010/main" val="0"/>
               </a:ext>
               <a:ext uri="{96DAC541-7B7A-43D3-8B79-37D633B846F1}">
-                <asvg:svgBlip xmlns:asvg="http://schemas.microsoft.com/office/drawing/2016/SVG/main" r:embed="rId5"/>
+                <asvg:svgBlip xmlns:asvg="http://schemas.microsoft.com/office/drawing/2016/SVG/main" xmlns="" r:embed="rId5"/>
               </a:ext>
             </a:extLst>
           </a:blip>
@@ -14444,7 +13047,7 @@
           <p:cNvPr id="7" name="Graphic 6" descr="Blackboard">
             <a:extLst>
               <a:ext uri="{FF2B5EF4-FFF2-40B4-BE49-F238E27FC236}">
-                <a16:creationId xmlns:a16="http://schemas.microsoft.com/office/drawing/2014/main" id="{2696A1A4-8E43-47F6-A6DC-A9ADAB053D8B}"/>
+                <a16:creationId xmlns:a16="http://schemas.microsoft.com/office/drawing/2014/main" xmlns="" id="{2696A1A4-8E43-47F6-A6DC-A9ADAB053D8B}"/>
               </a:ext>
             </a:extLst>
           </p:cNvPr>
@@ -14460,7 +13063,7 @@
                 <a14:useLocalDpi xmlns:a14="http://schemas.microsoft.com/office/drawing/2010/main" val="0"/>
               </a:ext>
               <a:ext uri="{96DAC541-7B7A-43D3-8B79-37D633B846F1}">
-                <asvg:svgBlip xmlns:asvg="http://schemas.microsoft.com/office/drawing/2016/SVG/main" r:embed="rId7"/>
+                <asvg:svgBlip xmlns:asvg="http://schemas.microsoft.com/office/drawing/2016/SVG/main" xmlns="" r:embed="rId7"/>
               </a:ext>
             </a:extLst>
           </a:blip>
@@ -14483,7 +13086,7 @@
           <p:cNvPr id="11" name="Graphic 10" descr="Books on Shelf">
             <a:extLst>
               <a:ext uri="{FF2B5EF4-FFF2-40B4-BE49-F238E27FC236}">
-                <a16:creationId xmlns:a16="http://schemas.microsoft.com/office/drawing/2014/main" id="{18A239E6-97C0-4A74-8E7A-C9FD39A8C92C}"/>
+                <a16:creationId xmlns:a16="http://schemas.microsoft.com/office/drawing/2014/main" xmlns="" id="{18A239E6-97C0-4A74-8E7A-C9FD39A8C92C}"/>
               </a:ext>
             </a:extLst>
           </p:cNvPr>
@@ -14499,7 +13102,7 @@
                 <a14:useLocalDpi xmlns:a14="http://schemas.microsoft.com/office/drawing/2010/main" val="0"/>
               </a:ext>
               <a:ext uri="{96DAC541-7B7A-43D3-8B79-37D633B846F1}">
-                <asvg:svgBlip xmlns:asvg="http://schemas.microsoft.com/office/drawing/2016/SVG/main" r:embed="rId9"/>
+                <asvg:svgBlip xmlns:asvg="http://schemas.microsoft.com/office/drawing/2016/SVG/main" xmlns="" r:embed="rId9"/>
               </a:ext>
             </a:extLst>
           </a:blip>
@@ -14522,10 +13125,10 @@
           <p:cNvPr id="66" name="Rectangle 65">
             <a:extLst>
               <a:ext uri="{FF2B5EF4-FFF2-40B4-BE49-F238E27FC236}">
-                <a16:creationId xmlns:a16="http://schemas.microsoft.com/office/drawing/2014/main" id="{5819102A-0400-4C1F-8614-973F5262EF56}"/>
+                <a16:creationId xmlns:a16="http://schemas.microsoft.com/office/drawing/2014/main" xmlns="" id="{5819102A-0400-4C1F-8614-973F5262EF56}"/>
               </a:ext>
               <a:ext uri="{C183D7F6-B498-43B3-948B-1728B52AA6E4}">
-                <adec:decorative xmlns:adec="http://schemas.microsoft.com/office/drawing/2017/decorative" val="1"/>
+                <adec:decorative xmlns:adec="http://schemas.microsoft.com/office/drawing/2017/decorative" xmlns="" val="1"/>
               </a:ext>
             </a:extLst>
           </p:cNvPr>
@@ -14535,7 +13138,7 @@
           <p:nvPr>
             <p:extLst>
               <p:ext uri="{386F3935-93C4-4BCD-93E2-E3B085C9AB24}">
-                <p16:designElem xmlns:p16="http://schemas.microsoft.com/office/powerpoint/2015/main" val="1"/>
+                <p16:designElem xmlns:p16="http://schemas.microsoft.com/office/powerpoint/2015/main" xmlns="" val="1"/>
               </p:ext>
             </p:extLst>
           </p:nvPr>
@@ -14601,10 +13204,10 @@
           <p:cNvPr id="68" name="Rectangle 67">
             <a:extLst>
               <a:ext uri="{FF2B5EF4-FFF2-40B4-BE49-F238E27FC236}">
-                <a16:creationId xmlns:a16="http://schemas.microsoft.com/office/drawing/2014/main" id="{CF1485CA-41D2-421F-B28D-15EF845D5FE6}"/>
+                <a16:creationId xmlns:a16="http://schemas.microsoft.com/office/drawing/2014/main" xmlns="" id="{CF1485CA-41D2-421F-B28D-15EF845D5FE6}"/>
               </a:ext>
               <a:ext uri="{C183D7F6-B498-43B3-948B-1728B52AA6E4}">
-                <adec:decorative xmlns:adec="http://schemas.microsoft.com/office/drawing/2017/decorative" val="1"/>
+                <adec:decorative xmlns:adec="http://schemas.microsoft.com/office/drawing/2017/decorative" xmlns="" val="1"/>
               </a:ext>
             </a:extLst>
           </p:cNvPr>
@@ -14614,7 +13217,7 @@
           <p:nvPr>
             <p:extLst>
               <p:ext uri="{386F3935-93C4-4BCD-93E2-E3B085C9AB24}">
-                <p16:designElem xmlns:p16="http://schemas.microsoft.com/office/powerpoint/2015/main" val="1"/>
+                <p16:designElem xmlns:p16="http://schemas.microsoft.com/office/powerpoint/2015/main" xmlns="" val="1"/>
               </p:ext>
             </p:extLst>
           </p:nvPr>
@@ -14680,10 +13283,10 @@
           <p:cNvPr id="70" name="Group 69">
             <a:extLst>
               <a:ext uri="{FF2B5EF4-FFF2-40B4-BE49-F238E27FC236}">
-                <a16:creationId xmlns:a16="http://schemas.microsoft.com/office/drawing/2014/main" id="{04ED96A1-E6CA-493F-8610-6B8B7A28E3EB}"/>
+                <a16:creationId xmlns:a16="http://schemas.microsoft.com/office/drawing/2014/main" xmlns="" id="{04ED96A1-E6CA-493F-8610-6B8B7A28E3EB}"/>
               </a:ext>
               <a:ext uri="{C183D7F6-B498-43B3-948B-1728B52AA6E4}">
-                <adec:decorative xmlns:adec="http://schemas.microsoft.com/office/drawing/2017/decorative" val="1"/>
+                <adec:decorative xmlns:adec="http://schemas.microsoft.com/office/drawing/2017/decorative" xmlns="" val="1"/>
               </a:ext>
             </a:extLst>
           </p:cNvPr>
@@ -14693,7 +13296,7 @@
           <p:nvPr>
             <p:extLst>
               <p:ext uri="{386F3935-93C4-4BCD-93E2-E3B085C9AB24}">
-                <p16:designElem xmlns:p16="http://schemas.microsoft.com/office/powerpoint/2015/main" val="1"/>
+                <p16:designElem xmlns:p16="http://schemas.microsoft.com/office/powerpoint/2015/main" xmlns="" val="1"/>
               </p:ext>
             </p:extLst>
           </p:nvPr>
@@ -14711,10 +13314,10 @@
             <p:cNvPr id="71" name="Straight Connector 70">
               <a:extLst>
                 <a:ext uri="{FF2B5EF4-FFF2-40B4-BE49-F238E27FC236}">
-                  <a16:creationId xmlns:a16="http://schemas.microsoft.com/office/drawing/2014/main" id="{3C9231B8-0812-4FDE-9AC6-94984E20AC0F}"/>
+                  <a16:creationId xmlns:a16="http://schemas.microsoft.com/office/drawing/2014/main" xmlns="" id="{3C9231B8-0812-4FDE-9AC6-94984E20AC0F}"/>
                 </a:ext>
                 <a:ext uri="{C183D7F6-B498-43B3-948B-1728B52AA6E4}">
-                  <adec:decorative xmlns:adec="http://schemas.microsoft.com/office/drawing/2017/decorative" val="1"/>
+                  <adec:decorative xmlns:adec="http://schemas.microsoft.com/office/drawing/2017/decorative" xmlns="" val="1"/>
                 </a:ext>
               </a:extLst>
             </p:cNvPr>
@@ -14724,7 +13327,7 @@
             <p:nvPr>
               <p:extLst>
                 <p:ext uri="{386F3935-93C4-4BCD-93E2-E3B085C9AB24}">
-                  <p16:designElem xmlns:p16="http://schemas.microsoft.com/office/powerpoint/2015/main" val="1"/>
+                  <p16:designElem xmlns:p16="http://schemas.microsoft.com/office/powerpoint/2015/main" xmlns="" val="1"/>
                 </p:ext>
               </p:extLst>
             </p:nvPr>
@@ -14780,10 +13383,10 @@
             <p:cNvPr id="72" name="Straight Connector 71">
               <a:extLst>
                 <a:ext uri="{FF2B5EF4-FFF2-40B4-BE49-F238E27FC236}">
-                  <a16:creationId xmlns:a16="http://schemas.microsoft.com/office/drawing/2014/main" id="{4BF59FE3-7AD8-46E8-9440-D26863994258}"/>
+                  <a16:creationId xmlns:a16="http://schemas.microsoft.com/office/drawing/2014/main" xmlns="" id="{4BF59FE3-7AD8-46E8-9440-D26863994258}"/>
                 </a:ext>
                 <a:ext uri="{C183D7F6-B498-43B3-948B-1728B52AA6E4}">
-                  <adec:decorative xmlns:adec="http://schemas.microsoft.com/office/drawing/2017/decorative" val="1"/>
+                  <adec:decorative xmlns:adec="http://schemas.microsoft.com/office/drawing/2017/decorative" xmlns="" val="1"/>
                 </a:ext>
               </a:extLst>
             </p:cNvPr>
@@ -14793,7 +13396,7 @@
             <p:nvPr>
               <p:extLst>
                 <p:ext uri="{386F3935-93C4-4BCD-93E2-E3B085C9AB24}">
-                  <p16:designElem xmlns:p16="http://schemas.microsoft.com/office/powerpoint/2015/main" val="1"/>
+                  <p16:designElem xmlns:p16="http://schemas.microsoft.com/office/powerpoint/2015/main" xmlns="" val="1"/>
                 </p:ext>
               </p:extLst>
             </p:nvPr>
@@ -14849,10 +13452,10 @@
             <p:cNvPr id="73" name="Straight Connector 72">
               <a:extLst>
                 <a:ext uri="{FF2B5EF4-FFF2-40B4-BE49-F238E27FC236}">
-                  <a16:creationId xmlns:a16="http://schemas.microsoft.com/office/drawing/2014/main" id="{6EEEDF00-F676-4147-BAF0-64840E2857BD}"/>
+                  <a16:creationId xmlns:a16="http://schemas.microsoft.com/office/drawing/2014/main" xmlns="" id="{6EEEDF00-F676-4147-BAF0-64840E2857BD}"/>
                 </a:ext>
                 <a:ext uri="{C183D7F6-B498-43B3-948B-1728B52AA6E4}">
-                  <adec:decorative xmlns:adec="http://schemas.microsoft.com/office/drawing/2017/decorative" val="1"/>
+                  <adec:decorative xmlns:adec="http://schemas.microsoft.com/office/drawing/2017/decorative" xmlns="" val="1"/>
                 </a:ext>
               </a:extLst>
             </p:cNvPr>
@@ -14862,7 +13465,7 @@
             <p:nvPr>
               <p:extLst>
                 <p:ext uri="{386F3935-93C4-4BCD-93E2-E3B085C9AB24}">
-                  <p16:designElem xmlns:p16="http://schemas.microsoft.com/office/powerpoint/2015/main" val="1"/>
+                  <p16:designElem xmlns:p16="http://schemas.microsoft.com/office/powerpoint/2015/main" xmlns="" val="1"/>
                 </p:ext>
               </p:extLst>
             </p:nvPr>
@@ -14918,10 +13521,10 @@
             <p:cNvPr id="74" name="Straight Connector 73">
               <a:extLst>
                 <a:ext uri="{FF2B5EF4-FFF2-40B4-BE49-F238E27FC236}">
-                  <a16:creationId xmlns:a16="http://schemas.microsoft.com/office/drawing/2014/main" id="{94D3F73A-55E6-4A58-872D-BE9E9C7C30E3}"/>
+                  <a16:creationId xmlns:a16="http://schemas.microsoft.com/office/drawing/2014/main" xmlns="" id="{94D3F73A-55E6-4A58-872D-BE9E9C7C30E3}"/>
                 </a:ext>
                 <a:ext uri="{C183D7F6-B498-43B3-948B-1728B52AA6E4}">
-                  <adec:decorative xmlns:adec="http://schemas.microsoft.com/office/drawing/2017/decorative" val="1"/>
+                  <adec:decorative xmlns:adec="http://schemas.microsoft.com/office/drawing/2017/decorative" xmlns="" val="1"/>
                 </a:ext>
               </a:extLst>
             </p:cNvPr>
@@ -14931,7 +13534,7 @@
             <p:nvPr>
               <p:extLst>
                 <p:ext uri="{386F3935-93C4-4BCD-93E2-E3B085C9AB24}">
-                  <p16:designElem xmlns:p16="http://schemas.microsoft.com/office/powerpoint/2015/main" val="1"/>
+                  <p16:designElem xmlns:p16="http://schemas.microsoft.com/office/powerpoint/2015/main" xmlns="" val="1"/>
                 </p:ext>
               </p:extLst>
             </p:nvPr>
@@ -14988,7 +13591,7 @@
           <p:cNvPr id="2" name="Title 1">
             <a:extLst>
               <a:ext uri="{FF2B5EF4-FFF2-40B4-BE49-F238E27FC236}">
-                <a16:creationId xmlns:a16="http://schemas.microsoft.com/office/drawing/2014/main" id="{E561AC0E-7195-4ACF-AA0A-5E2923A987F7}"/>
+                <a16:creationId xmlns:a16="http://schemas.microsoft.com/office/drawing/2014/main" xmlns="" id="{E561AC0E-7195-4ACF-AA0A-5E2923A987F7}"/>
               </a:ext>
             </a:extLst>
           </p:cNvPr>
@@ -15031,7 +13634,7 @@
           <p:cNvPr id="3" name="Subtitle 2">
             <a:extLst>
               <a:ext uri="{FF2B5EF4-FFF2-40B4-BE49-F238E27FC236}">
-                <a16:creationId xmlns:a16="http://schemas.microsoft.com/office/drawing/2014/main" id="{814253EE-4FA2-4843-BE27-C7D5B08FFB81}"/>
+                <a16:creationId xmlns:a16="http://schemas.microsoft.com/office/drawing/2014/main" xmlns="" id="{814253EE-4FA2-4843-BE27-C7D5B08FFB81}"/>
               </a:ext>
             </a:extLst>
           </p:cNvPr>
@@ -15073,6 +13676,15 @@
                 <a:latin typeface="Franklin Gothic Book" panose="020B0503020102020204" pitchFamily="34" charset="0"/>
               </a:rPr>
             </a:br>
+            <a:r>
+              <a:rPr lang="en-US" dirty="0">
+                <a:solidFill>
+                  <a:schemeClr val="bg1"/>
+                </a:solidFill>
+                <a:latin typeface="Franklin Gothic Book" panose="020B0503020102020204" pitchFamily="34" charset="0"/>
+              </a:rPr>
+              <a:t/>
+            </a:r>
             <a:br>
               <a:rPr lang="en-US" dirty="0">
                 <a:solidFill>
@@ -15154,7 +13766,7 @@
           <p:cNvPr id="11" name="Graphic 10" descr="Books on Shelf">
             <a:extLst>
               <a:ext uri="{FF2B5EF4-FFF2-40B4-BE49-F238E27FC236}">
-                <a16:creationId xmlns:a16="http://schemas.microsoft.com/office/drawing/2014/main" id="{18A239E6-97C0-4A74-8E7A-C9FD39A8C92C}"/>
+                <a16:creationId xmlns:a16="http://schemas.microsoft.com/office/drawing/2014/main" xmlns="" id="{18A239E6-97C0-4A74-8E7A-C9FD39A8C92C}"/>
               </a:ext>
             </a:extLst>
           </p:cNvPr>
@@ -15170,7 +13782,7 @@
                 <a14:useLocalDpi xmlns:a14="http://schemas.microsoft.com/office/drawing/2010/main" val="0"/>
               </a:ext>
               <a:ext uri="{96DAC541-7B7A-43D3-8B79-37D633B846F1}">
-                <asvg:svgBlip xmlns:asvg="http://schemas.microsoft.com/office/drawing/2016/SVG/main" r:embed="rId4"/>
+                <asvg:svgBlip xmlns:asvg="http://schemas.microsoft.com/office/drawing/2016/SVG/main" xmlns="" r:embed="rId4"/>
               </a:ext>
             </a:extLst>
           </a:blip>
@@ -15193,10 +13805,10 @@
           <p:cNvPr id="16" name="Straight Connector 15">
             <a:extLst>
               <a:ext uri="{FF2B5EF4-FFF2-40B4-BE49-F238E27FC236}">
-                <a16:creationId xmlns:a16="http://schemas.microsoft.com/office/drawing/2014/main" id="{DFDA47BC-3069-47F5-8257-24B3B1F76A08}"/>
+                <a16:creationId xmlns:a16="http://schemas.microsoft.com/office/drawing/2014/main" xmlns="" id="{DFDA47BC-3069-47F5-8257-24B3B1F76A08}"/>
               </a:ext>
               <a:ext uri="{C183D7F6-B498-43B3-948B-1728B52AA6E4}">
-                <adec:decorative xmlns:adec="http://schemas.microsoft.com/office/drawing/2017/decorative" val="1"/>
+                <adec:decorative xmlns:adec="http://schemas.microsoft.com/office/drawing/2017/decorative" xmlns="" val="1"/>
               </a:ext>
             </a:extLst>
           </p:cNvPr>
@@ -15206,7 +13818,7 @@
           <p:nvPr>
             <p:extLst>
               <p:ext uri="{386F3935-93C4-4BCD-93E2-E3B085C9AB24}">
-                <p16:designElem xmlns:p16="http://schemas.microsoft.com/office/powerpoint/2015/main" val="1"/>
+                <p16:designElem xmlns:p16="http://schemas.microsoft.com/office/powerpoint/2015/main" xmlns="" val="1"/>
               </p:ext>
             </p:extLst>
           </p:nvPr>
@@ -15245,7 +13857,7 @@
           <p:cNvPr id="5" name="Graphic 4" descr="Chat">
             <a:extLst>
               <a:ext uri="{FF2B5EF4-FFF2-40B4-BE49-F238E27FC236}">
-                <a16:creationId xmlns:a16="http://schemas.microsoft.com/office/drawing/2014/main" id="{EB71843F-0A0B-4317-B205-4B0A0B97C0FD}"/>
+                <a16:creationId xmlns:a16="http://schemas.microsoft.com/office/drawing/2014/main" xmlns="" id="{EB71843F-0A0B-4317-B205-4B0A0B97C0FD}"/>
               </a:ext>
             </a:extLst>
           </p:cNvPr>
@@ -15261,7 +13873,7 @@
                 <a14:useLocalDpi xmlns:a14="http://schemas.microsoft.com/office/drawing/2010/main" val="0"/>
               </a:ext>
               <a:ext uri="{96DAC541-7B7A-43D3-8B79-37D633B846F1}">
-                <asvg:svgBlip xmlns:asvg="http://schemas.microsoft.com/office/drawing/2016/SVG/main" r:embed="rId6"/>
+                <asvg:svgBlip xmlns:asvg="http://schemas.microsoft.com/office/drawing/2016/SVG/main" xmlns="" r:embed="rId6"/>
               </a:ext>
             </a:extLst>
           </a:blip>
@@ -15284,10 +13896,10 @@
           <p:cNvPr id="20" name="Straight Connector 19">
             <a:extLst>
               <a:ext uri="{FF2B5EF4-FFF2-40B4-BE49-F238E27FC236}">
-                <a16:creationId xmlns:a16="http://schemas.microsoft.com/office/drawing/2014/main" id="{942B920A-73AD-402A-8EEF-B88E1A9398B8}"/>
+                <a16:creationId xmlns:a16="http://schemas.microsoft.com/office/drawing/2014/main" xmlns="" id="{942B920A-73AD-402A-8EEF-B88E1A9398B8}"/>
               </a:ext>
               <a:ext uri="{C183D7F6-B498-43B3-948B-1728B52AA6E4}">
-                <adec:decorative xmlns:adec="http://schemas.microsoft.com/office/drawing/2017/decorative" val="1"/>
+                <adec:decorative xmlns:adec="http://schemas.microsoft.com/office/drawing/2017/decorative" xmlns="" val="1"/>
               </a:ext>
             </a:extLst>
           </p:cNvPr>
@@ -15297,7 +13909,7 @@
           <p:nvPr>
             <p:extLst>
               <p:ext uri="{386F3935-93C4-4BCD-93E2-E3B085C9AB24}">
-                <p16:designElem xmlns:p16="http://schemas.microsoft.com/office/powerpoint/2015/main" val="1"/>
+                <p16:designElem xmlns:p16="http://schemas.microsoft.com/office/powerpoint/2015/main" xmlns="" val="1"/>
               </p:ext>
             </p:extLst>
           </p:nvPr>
@@ -15336,7 +13948,7 @@
           <p:cNvPr id="7" name="Graphic 6" descr="Blackboard">
             <a:extLst>
               <a:ext uri="{FF2B5EF4-FFF2-40B4-BE49-F238E27FC236}">
-                <a16:creationId xmlns:a16="http://schemas.microsoft.com/office/drawing/2014/main" id="{2696A1A4-8E43-47F6-A6DC-A9ADAB053D8B}"/>
+                <a16:creationId xmlns:a16="http://schemas.microsoft.com/office/drawing/2014/main" xmlns="" id="{2696A1A4-8E43-47F6-A6DC-A9ADAB053D8B}"/>
               </a:ext>
             </a:extLst>
           </p:cNvPr>
@@ -15352,7 +13964,7 @@
                 <a14:useLocalDpi xmlns:a14="http://schemas.microsoft.com/office/drawing/2010/main" val="0"/>
               </a:ext>
               <a:ext uri="{96DAC541-7B7A-43D3-8B79-37D633B846F1}">
-                <asvg:svgBlip xmlns:asvg="http://schemas.microsoft.com/office/drawing/2016/SVG/main" r:embed="rId8"/>
+                <asvg:svgBlip xmlns:asvg="http://schemas.microsoft.com/office/drawing/2016/SVG/main" xmlns="" r:embed="rId8"/>
               </a:ext>
             </a:extLst>
           </a:blip>
@@ -15375,10 +13987,10 @@
           <p:cNvPr id="22" name="Straight Connector 21">
             <a:extLst>
               <a:ext uri="{FF2B5EF4-FFF2-40B4-BE49-F238E27FC236}">
-                <a16:creationId xmlns:a16="http://schemas.microsoft.com/office/drawing/2014/main" id="{00C9EB70-BC82-414A-BF8D-AD7FC6727616}"/>
+                <a16:creationId xmlns:a16="http://schemas.microsoft.com/office/drawing/2014/main" xmlns="" id="{00C9EB70-BC82-414A-BF8D-AD7FC6727616}"/>
               </a:ext>
               <a:ext uri="{C183D7F6-B498-43B3-948B-1728B52AA6E4}">
-                <adec:decorative xmlns:adec="http://schemas.microsoft.com/office/drawing/2017/decorative" val="1"/>
+                <adec:decorative xmlns:adec="http://schemas.microsoft.com/office/drawing/2017/decorative" xmlns="" val="1"/>
               </a:ext>
             </a:extLst>
           </p:cNvPr>
@@ -15388,7 +14000,7 @@
           <p:nvPr>
             <p:extLst>
               <p:ext uri="{386F3935-93C4-4BCD-93E2-E3B085C9AB24}">
-                <p16:designElem xmlns:p16="http://schemas.microsoft.com/office/powerpoint/2015/main" val="1"/>
+                <p16:designElem xmlns:p16="http://schemas.microsoft.com/office/powerpoint/2015/main" xmlns="" val="1"/>
               </p:ext>
             </p:extLst>
           </p:nvPr>
@@ -15427,7 +14039,7 @@
           <p:cNvPr id="9" name="Graphic 8" descr="Open Book">
             <a:extLst>
               <a:ext uri="{FF2B5EF4-FFF2-40B4-BE49-F238E27FC236}">
-                <a16:creationId xmlns:a16="http://schemas.microsoft.com/office/drawing/2014/main" id="{93E427C7-0218-4592-82DA-2431E4BF8756}"/>
+                <a16:creationId xmlns:a16="http://schemas.microsoft.com/office/drawing/2014/main" xmlns="" id="{93E427C7-0218-4592-82DA-2431E4BF8756}"/>
               </a:ext>
             </a:extLst>
           </p:cNvPr>
@@ -15443,7 +14055,7 @@
                 <a14:useLocalDpi xmlns:a14="http://schemas.microsoft.com/office/drawing/2010/main" val="0"/>
               </a:ext>
               <a:ext uri="{96DAC541-7B7A-43D3-8B79-37D633B846F1}">
-                <asvg:svgBlip xmlns:asvg="http://schemas.microsoft.com/office/drawing/2016/SVG/main" r:embed="rId10"/>
+                <asvg:svgBlip xmlns:asvg="http://schemas.microsoft.com/office/drawing/2016/SVG/main" xmlns="" r:embed="rId10"/>
               </a:ext>
             </a:extLst>
           </a:blip>
@@ -15466,10 +14078,10 @@
           <p:cNvPr id="18" name="Rectangle 17">
             <a:extLst>
               <a:ext uri="{FF2B5EF4-FFF2-40B4-BE49-F238E27FC236}">
-                <a16:creationId xmlns:a16="http://schemas.microsoft.com/office/drawing/2014/main" id="{7AE95D8F-9825-4222-8846-E3461598CC62}"/>
+                <a16:creationId xmlns:a16="http://schemas.microsoft.com/office/drawing/2014/main" xmlns="" id="{7AE95D8F-9825-4222-8846-E3461598CC62}"/>
               </a:ext>
               <a:ext uri="{C183D7F6-B498-43B3-948B-1728B52AA6E4}">
-                <adec:decorative xmlns:adec="http://schemas.microsoft.com/office/drawing/2017/decorative" val="1"/>
+                <adec:decorative xmlns:adec="http://schemas.microsoft.com/office/drawing/2017/decorative" xmlns="" val="1"/>
               </a:ext>
             </a:extLst>
           </p:cNvPr>
@@ -15479,7 +14091,7 @@
           <p:nvPr>
             <p:extLst>
               <p:ext uri="{386F3935-93C4-4BCD-93E2-E3B085C9AB24}">
-                <p16:designElem xmlns:p16="http://schemas.microsoft.com/office/powerpoint/2015/main" val="1"/>
+                <p16:designElem xmlns:p16="http://schemas.microsoft.com/office/powerpoint/2015/main" xmlns="" val="1"/>
               </p:ext>
             </p:extLst>
           </p:nvPr>
@@ -15531,7 +14143,7 @@
           <p:cNvPr id="2" name="Title 1">
             <a:extLst>
               <a:ext uri="{FF2B5EF4-FFF2-40B4-BE49-F238E27FC236}">
-                <a16:creationId xmlns:a16="http://schemas.microsoft.com/office/drawing/2014/main" id="{E561AC0E-7195-4ACF-AA0A-5E2923A987F7}"/>
+                <a16:creationId xmlns:a16="http://schemas.microsoft.com/office/drawing/2014/main" xmlns="" id="{E561AC0E-7195-4ACF-AA0A-5E2923A987F7}"/>
               </a:ext>
             </a:extLst>
           </p:cNvPr>
@@ -15572,10 +14184,10 @@
           <p:cNvPr id="24" name="Straight Connector 23">
             <a:extLst>
               <a:ext uri="{FF2B5EF4-FFF2-40B4-BE49-F238E27FC236}">
-                <a16:creationId xmlns:a16="http://schemas.microsoft.com/office/drawing/2014/main" id="{3217665F-0036-444A-8D4A-33AF36A36A42}"/>
+                <a16:creationId xmlns:a16="http://schemas.microsoft.com/office/drawing/2014/main" xmlns="" id="{3217665F-0036-444A-8D4A-33AF36A36A42}"/>
               </a:ext>
               <a:ext uri="{C183D7F6-B498-43B3-948B-1728B52AA6E4}">
-                <adec:decorative xmlns:adec="http://schemas.microsoft.com/office/drawing/2017/decorative" val="1"/>
+                <adec:decorative xmlns:adec="http://schemas.microsoft.com/office/drawing/2017/decorative" xmlns="" val="1"/>
               </a:ext>
             </a:extLst>
           </p:cNvPr>
@@ -15585,7 +14197,7 @@
           <p:nvPr>
             <p:extLst>
               <p:ext uri="{386F3935-93C4-4BCD-93E2-E3B085C9AB24}">
-                <p16:designElem xmlns:p16="http://schemas.microsoft.com/office/powerpoint/2015/main" val="1"/>
+                <p16:designElem xmlns:p16="http://schemas.microsoft.com/office/powerpoint/2015/main" xmlns="" val="1"/>
               </p:ext>
             </p:extLst>
           </p:nvPr>
@@ -15624,7 +14236,7 @@
           <p:cNvPr id="3" name="Subtitle 2">
             <a:extLst>
               <a:ext uri="{FF2B5EF4-FFF2-40B4-BE49-F238E27FC236}">
-                <a16:creationId xmlns:a16="http://schemas.microsoft.com/office/drawing/2014/main" id="{814253EE-4FA2-4843-BE27-C7D5B08FFB81}"/>
+                <a16:creationId xmlns:a16="http://schemas.microsoft.com/office/drawing/2014/main" xmlns="" id="{814253EE-4FA2-4843-BE27-C7D5B08FFB81}"/>
               </a:ext>
             </a:extLst>
           </p:cNvPr>
@@ -15665,7 +14277,7 @@
           <p:cNvPr id="4" name="Subtitle 2">
             <a:extLst>
               <a:ext uri="{FF2B5EF4-FFF2-40B4-BE49-F238E27FC236}">
-                <a16:creationId xmlns:a16="http://schemas.microsoft.com/office/drawing/2014/main" id="{AFC1E650-D3E1-5843-BE3F-ED8C5C4411FF}"/>
+                <a16:creationId xmlns:a16="http://schemas.microsoft.com/office/drawing/2014/main" xmlns="" id="{AFC1E650-D3E1-5843-BE3F-ED8C5C4411FF}"/>
               </a:ext>
             </a:extLst>
           </p:cNvPr>
@@ -15882,7 +14494,7 @@
           <p:cNvPr id="6" name="Subtitle 2">
             <a:extLst>
               <a:ext uri="{FF2B5EF4-FFF2-40B4-BE49-F238E27FC236}">
-                <a16:creationId xmlns:a16="http://schemas.microsoft.com/office/drawing/2014/main" id="{E77463EC-CFA1-BDF4-71AC-634D3B59FFB3}"/>
+                <a16:creationId xmlns:a16="http://schemas.microsoft.com/office/drawing/2014/main" xmlns="" id="{E77463EC-CFA1-BDF4-71AC-634D3B59FFB3}"/>
               </a:ext>
             </a:extLst>
           </p:cNvPr>
@@ -16099,7 +14711,7 @@
           <p:cNvPr id="8" name="Subtitle 2">
             <a:extLst>
               <a:ext uri="{FF2B5EF4-FFF2-40B4-BE49-F238E27FC236}">
-                <a16:creationId xmlns:a16="http://schemas.microsoft.com/office/drawing/2014/main" id="{5A99EE68-C3E4-16DE-F50F-13276A8D13DF}"/>
+                <a16:creationId xmlns:a16="http://schemas.microsoft.com/office/drawing/2014/main" xmlns="" id="{5A99EE68-C3E4-16DE-F50F-13276A8D13DF}"/>
               </a:ext>
             </a:extLst>
           </p:cNvPr>
@@ -16596,10 +15208,10 @@
           <p:cNvPr id="20" name="Rectangle 19">
             <a:extLst>
               <a:ext uri="{FF2B5EF4-FFF2-40B4-BE49-F238E27FC236}">
-                <a16:creationId xmlns:a16="http://schemas.microsoft.com/office/drawing/2014/main" id="{3346177D-ADC4-4968-B747-5CFCD390B5B9}"/>
+                <a16:creationId xmlns:a16="http://schemas.microsoft.com/office/drawing/2014/main" xmlns="" id="{3346177D-ADC4-4968-B747-5CFCD390B5B9}"/>
               </a:ext>
               <a:ext uri="{C183D7F6-B498-43B3-948B-1728B52AA6E4}">
-                <adec:decorative xmlns:adec="http://schemas.microsoft.com/office/drawing/2017/decorative" val="1"/>
+                <adec:decorative xmlns:adec="http://schemas.microsoft.com/office/drawing/2017/decorative" xmlns="" val="1"/>
               </a:ext>
             </a:extLst>
           </p:cNvPr>
@@ -16609,7 +15221,7 @@
           <p:nvPr>
             <p:extLst>
               <p:ext uri="{386F3935-93C4-4BCD-93E2-E3B085C9AB24}">
-                <p16:designElem xmlns:p16="http://schemas.microsoft.com/office/powerpoint/2015/main" val="1"/>
+                <p16:designElem xmlns:p16="http://schemas.microsoft.com/office/powerpoint/2015/main" xmlns="" val="1"/>
               </p:ext>
             </p:extLst>
           </p:nvPr>
@@ -16672,7 +15284,7 @@
           <p:cNvPr id="2" name="Title 1">
             <a:extLst>
               <a:ext uri="{FF2B5EF4-FFF2-40B4-BE49-F238E27FC236}">
-                <a16:creationId xmlns:a16="http://schemas.microsoft.com/office/drawing/2014/main" id="{DD648CF1-C72A-4313-8FC7-BF6DD4642AFE}"/>
+                <a16:creationId xmlns:a16="http://schemas.microsoft.com/office/drawing/2014/main" xmlns="" id="{DD648CF1-C72A-4313-8FC7-BF6DD4642AFE}"/>
               </a:ext>
             </a:extLst>
           </p:cNvPr>
@@ -16710,7 +15322,7 @@
           <p:cNvPr id="5" name="Graphic 4" descr="Books on Shelf">
             <a:extLst>
               <a:ext uri="{FF2B5EF4-FFF2-40B4-BE49-F238E27FC236}">
-                <a16:creationId xmlns:a16="http://schemas.microsoft.com/office/drawing/2014/main" id="{0739E712-15FB-C592-48CE-682535259791}"/>
+                <a16:creationId xmlns:a16="http://schemas.microsoft.com/office/drawing/2014/main" xmlns="" id="{0739E712-15FB-C592-48CE-682535259791}"/>
               </a:ext>
             </a:extLst>
           </p:cNvPr>
@@ -16726,7 +15338,7 @@
                 <a14:useLocalDpi xmlns:a14="http://schemas.microsoft.com/office/drawing/2010/main" val="0"/>
               </a:ext>
               <a:ext uri="{96DAC541-7B7A-43D3-8B79-37D633B846F1}">
-                <asvg:svgBlip xmlns:asvg="http://schemas.microsoft.com/office/drawing/2016/SVG/main" r:embed="rId4"/>
+                <asvg:svgBlip xmlns:asvg="http://schemas.microsoft.com/office/drawing/2016/SVG/main" xmlns="" r:embed="rId4"/>
               </a:ext>
             </a:extLst>
           </a:blip>
@@ -16749,7 +15361,7 @@
           <p:cNvPr id="26" name="Content Placeholder 5">
             <a:extLst>
               <a:ext uri="{FF2B5EF4-FFF2-40B4-BE49-F238E27FC236}">
-                <a16:creationId xmlns:a16="http://schemas.microsoft.com/office/drawing/2014/main" id="{28F642FD-5BB3-7AD2-F783-D1CF0F8D04F1}"/>
+                <a16:creationId xmlns:a16="http://schemas.microsoft.com/office/drawing/2014/main" xmlns="" id="{28F642FD-5BB3-7AD2-F783-D1CF0F8D04F1}"/>
               </a:ext>
             </a:extLst>
           </p:cNvPr>
@@ -16775,10 +15387,10 @@
           <p:cNvPr id="22" name="Rectangle 21">
             <a:extLst>
               <a:ext uri="{FF2B5EF4-FFF2-40B4-BE49-F238E27FC236}">
-                <a16:creationId xmlns:a16="http://schemas.microsoft.com/office/drawing/2014/main" id="{0844A943-BF79-4FEA-ABB1-3BD54D236606}"/>
+                <a16:creationId xmlns:a16="http://schemas.microsoft.com/office/drawing/2014/main" xmlns="" id="{0844A943-BF79-4FEA-ABB1-3BD54D236606}"/>
               </a:ext>
               <a:ext uri="{C183D7F6-B498-43B3-948B-1728B52AA6E4}">
-                <adec:decorative xmlns:adec="http://schemas.microsoft.com/office/drawing/2017/decorative" val="1"/>
+                <adec:decorative xmlns:adec="http://schemas.microsoft.com/office/drawing/2017/decorative" xmlns="" val="1"/>
               </a:ext>
             </a:extLst>
           </p:cNvPr>
@@ -16788,7 +15400,7 @@
           <p:nvPr>
             <p:extLst>
               <p:ext uri="{386F3935-93C4-4BCD-93E2-E3B085C9AB24}">
-                <p16:designElem xmlns:p16="http://schemas.microsoft.com/office/powerpoint/2015/main" val="1"/>
+                <p16:designElem xmlns:p16="http://schemas.microsoft.com/office/powerpoint/2015/main" xmlns="" val="1"/>
               </p:ext>
             </p:extLst>
           </p:nvPr>
@@ -16846,10 +15458,10 @@
           <p:cNvPr id="24" name="Rectangle 23">
             <a:extLst>
               <a:ext uri="{FF2B5EF4-FFF2-40B4-BE49-F238E27FC236}">
-                <a16:creationId xmlns:a16="http://schemas.microsoft.com/office/drawing/2014/main" id="{6437CC72-F4A8-4DC3-AFAB-D22C482C8100}"/>
+                <a16:creationId xmlns:a16="http://schemas.microsoft.com/office/drawing/2014/main" xmlns="" id="{6437CC72-F4A8-4DC3-AFAB-D22C482C8100}"/>
               </a:ext>
               <a:ext uri="{C183D7F6-B498-43B3-948B-1728B52AA6E4}">
-                <adec:decorative xmlns:adec="http://schemas.microsoft.com/office/drawing/2017/decorative" val="1"/>
+                <adec:decorative xmlns:adec="http://schemas.microsoft.com/office/drawing/2017/decorative" xmlns="" val="1"/>
               </a:ext>
             </a:extLst>
           </p:cNvPr>
@@ -16859,7 +15471,7 @@
           <p:nvPr>
             <p:extLst>
               <p:ext uri="{386F3935-93C4-4BCD-93E2-E3B085C9AB24}">
-                <p16:designElem xmlns:p16="http://schemas.microsoft.com/office/powerpoint/2015/main" val="1"/>
+                <p16:designElem xmlns:p16="http://schemas.microsoft.com/office/powerpoint/2015/main" xmlns="" val="1"/>
               </p:ext>
             </p:extLst>
           </p:nvPr>
@@ -17042,10 +15654,10 @@
           <p:cNvPr id="29" name="Rectangle 28">
             <a:extLst>
               <a:ext uri="{FF2B5EF4-FFF2-40B4-BE49-F238E27FC236}">
-                <a16:creationId xmlns:a16="http://schemas.microsoft.com/office/drawing/2014/main" id="{2EB492CD-616E-47F8-933B-5E2D952A0593}"/>
+                <a16:creationId xmlns:a16="http://schemas.microsoft.com/office/drawing/2014/main" xmlns="" id="{2EB492CD-616E-47F8-933B-5E2D952A0593}"/>
               </a:ext>
               <a:ext uri="{C183D7F6-B498-43B3-948B-1728B52AA6E4}">
-                <adec:decorative xmlns:adec="http://schemas.microsoft.com/office/drawing/2017/decorative" val="1"/>
+                <adec:decorative xmlns:adec="http://schemas.microsoft.com/office/drawing/2017/decorative" xmlns="" val="1"/>
               </a:ext>
             </a:extLst>
           </p:cNvPr>
@@ -17055,7 +15667,7 @@
           <p:nvPr>
             <p:extLst>
               <p:ext uri="{386F3935-93C4-4BCD-93E2-E3B085C9AB24}">
-                <p16:designElem xmlns:p16="http://schemas.microsoft.com/office/powerpoint/2015/main" val="1"/>
+                <p16:designElem xmlns:p16="http://schemas.microsoft.com/office/powerpoint/2015/main" xmlns="" val="1"/>
               </p:ext>
             </p:extLst>
           </p:nvPr>
@@ -17196,10 +15808,10 @@
           <p:cNvPr id="31" name="Arc 30">
             <a:extLst>
               <a:ext uri="{FF2B5EF4-FFF2-40B4-BE49-F238E27FC236}">
-                <a16:creationId xmlns:a16="http://schemas.microsoft.com/office/drawing/2014/main" id="{59383CF9-23B5-4335-9B21-1791C4CF1C75}"/>
+                <a16:creationId xmlns:a16="http://schemas.microsoft.com/office/drawing/2014/main" xmlns="" id="{59383CF9-23B5-4335-9B21-1791C4CF1C75}"/>
               </a:ext>
               <a:ext uri="{C183D7F6-B498-43B3-948B-1728B52AA6E4}">
-                <adec:decorative xmlns:adec="http://schemas.microsoft.com/office/drawing/2017/decorative" val="1"/>
+                <adec:decorative xmlns:adec="http://schemas.microsoft.com/office/drawing/2017/decorative" xmlns="" val="1"/>
               </a:ext>
             </a:extLst>
           </p:cNvPr>
@@ -17209,7 +15821,7 @@
           <p:nvPr>
             <p:extLst>
               <p:ext uri="{386F3935-93C4-4BCD-93E2-E3B085C9AB24}">
-                <p16:designElem xmlns:p16="http://schemas.microsoft.com/office/powerpoint/2015/main" val="1"/>
+                <p16:designElem xmlns:p16="http://schemas.microsoft.com/office/powerpoint/2015/main" xmlns="" val="1"/>
               </p:ext>
             </p:extLst>
           </p:nvPr>
@@ -17290,7 +15902,7 @@
           <p:cNvPr id="2" name="Title 1">
             <a:extLst>
               <a:ext uri="{FF2B5EF4-FFF2-40B4-BE49-F238E27FC236}">
-                <a16:creationId xmlns:a16="http://schemas.microsoft.com/office/drawing/2014/main" id="{DD648CF1-C72A-4313-8FC7-BF6DD4642AFE}"/>
+                <a16:creationId xmlns:a16="http://schemas.microsoft.com/office/drawing/2014/main" xmlns="" id="{DD648CF1-C72A-4313-8FC7-BF6DD4642AFE}"/>
               </a:ext>
             </a:extLst>
           </p:cNvPr>
@@ -17328,10 +15940,10 @@
           <p:cNvPr id="33" name="Freeform: Shape 32">
             <a:extLst>
               <a:ext uri="{FF2B5EF4-FFF2-40B4-BE49-F238E27FC236}">
-                <a16:creationId xmlns:a16="http://schemas.microsoft.com/office/drawing/2014/main" id="{0007FE00-9498-4706-B255-6437B0252C02}"/>
+                <a16:creationId xmlns:a16="http://schemas.microsoft.com/office/drawing/2014/main" xmlns="" id="{0007FE00-9498-4706-B255-6437B0252C02}"/>
               </a:ext>
               <a:ext uri="{C183D7F6-B498-43B3-948B-1728B52AA6E4}">
-                <adec:decorative xmlns:adec="http://schemas.microsoft.com/office/drawing/2017/decorative" val="1"/>
+                <adec:decorative xmlns:adec="http://schemas.microsoft.com/office/drawing/2017/decorative" xmlns="" val="1"/>
               </a:ext>
             </a:extLst>
           </p:cNvPr>
@@ -17341,7 +15953,7 @@
           <p:nvPr>
             <p:extLst>
               <p:ext uri="{386F3935-93C4-4BCD-93E2-E3B085C9AB24}">
-                <p16:designElem xmlns:p16="http://schemas.microsoft.com/office/powerpoint/2015/main" val="1"/>
+                <p16:designElem xmlns:p16="http://schemas.microsoft.com/office/powerpoint/2015/main" xmlns="" val="1"/>
               </p:ext>
             </p:extLst>
           </p:nvPr>
@@ -17464,7 +16076,7 @@
           <p:cNvPr id="4" name="Graphic 3" descr="Chat">
             <a:extLst>
               <a:ext uri="{FF2B5EF4-FFF2-40B4-BE49-F238E27FC236}">
-                <a16:creationId xmlns:a16="http://schemas.microsoft.com/office/drawing/2014/main" id="{5030A493-6BA6-A802-CFD9-0877CBA95D87}"/>
+                <a16:creationId xmlns:a16="http://schemas.microsoft.com/office/drawing/2014/main" xmlns="" id="{5030A493-6BA6-A802-CFD9-0877CBA95D87}"/>
               </a:ext>
             </a:extLst>
           </p:cNvPr>
@@ -17480,7 +16092,7 @@
                 <a14:useLocalDpi xmlns:a14="http://schemas.microsoft.com/office/drawing/2010/main" val="0"/>
               </a:ext>
               <a:ext uri="{96DAC541-7B7A-43D3-8B79-37D633B846F1}">
-                <asvg:svgBlip xmlns:asvg="http://schemas.microsoft.com/office/drawing/2016/SVG/main" r:embed="rId4"/>
+                <asvg:svgBlip xmlns:asvg="http://schemas.microsoft.com/office/drawing/2016/SVG/main" xmlns="" r:embed="rId4"/>
               </a:ext>
             </a:extLst>
           </a:blip>
@@ -17547,7 +16159,7 @@
           <p:cNvPr id="6" name="Content Placeholder 5">
             <a:extLst>
               <a:ext uri="{FF2B5EF4-FFF2-40B4-BE49-F238E27FC236}">
-                <a16:creationId xmlns:a16="http://schemas.microsoft.com/office/drawing/2014/main" id="{C856D755-2374-40B4-B692-603C5E927388}"/>
+                <a16:creationId xmlns:a16="http://schemas.microsoft.com/office/drawing/2014/main" xmlns="" id="{C856D755-2374-40B4-B692-603C5E927388}"/>
               </a:ext>
             </a:extLst>
           </p:cNvPr>
@@ -17742,10 +16354,10 @@
           <p:cNvPr id="29" name="Rectangle 28">
             <a:extLst>
               <a:ext uri="{FF2B5EF4-FFF2-40B4-BE49-F238E27FC236}">
-                <a16:creationId xmlns:a16="http://schemas.microsoft.com/office/drawing/2014/main" id="{2EB492CD-616E-47F8-933B-5E2D952A0593}"/>
+                <a16:creationId xmlns:a16="http://schemas.microsoft.com/office/drawing/2014/main" xmlns="" id="{2EB492CD-616E-47F8-933B-5E2D952A0593}"/>
               </a:ext>
               <a:ext uri="{C183D7F6-B498-43B3-948B-1728B52AA6E4}">
-                <adec:decorative xmlns:adec="http://schemas.microsoft.com/office/drawing/2017/decorative" val="1"/>
+                <adec:decorative xmlns:adec="http://schemas.microsoft.com/office/drawing/2017/decorative" xmlns="" val="1"/>
               </a:ext>
             </a:extLst>
           </p:cNvPr>
@@ -17755,7 +16367,7 @@
           <p:nvPr>
             <p:extLst>
               <p:ext uri="{386F3935-93C4-4BCD-93E2-E3B085C9AB24}">
-                <p16:designElem xmlns:p16="http://schemas.microsoft.com/office/powerpoint/2015/main" val="1"/>
+                <p16:designElem xmlns:p16="http://schemas.microsoft.com/office/powerpoint/2015/main" xmlns="" val="1"/>
               </p:ext>
             </p:extLst>
           </p:nvPr>
@@ -17896,10 +16508,10 @@
           <p:cNvPr id="31" name="Arc 30">
             <a:extLst>
               <a:ext uri="{FF2B5EF4-FFF2-40B4-BE49-F238E27FC236}">
-                <a16:creationId xmlns:a16="http://schemas.microsoft.com/office/drawing/2014/main" id="{59383CF9-23B5-4335-9B21-1791C4CF1C75}"/>
+                <a16:creationId xmlns:a16="http://schemas.microsoft.com/office/drawing/2014/main" xmlns="" id="{59383CF9-23B5-4335-9B21-1791C4CF1C75}"/>
               </a:ext>
               <a:ext uri="{C183D7F6-B498-43B3-948B-1728B52AA6E4}">
-                <adec:decorative xmlns:adec="http://schemas.microsoft.com/office/drawing/2017/decorative" val="1"/>
+                <adec:decorative xmlns:adec="http://schemas.microsoft.com/office/drawing/2017/decorative" xmlns="" val="1"/>
               </a:ext>
             </a:extLst>
           </p:cNvPr>
@@ -17909,7 +16521,7 @@
           <p:nvPr>
             <p:extLst>
               <p:ext uri="{386F3935-93C4-4BCD-93E2-E3B085C9AB24}">
-                <p16:designElem xmlns:p16="http://schemas.microsoft.com/office/powerpoint/2015/main" val="1"/>
+                <p16:designElem xmlns:p16="http://schemas.microsoft.com/office/powerpoint/2015/main" xmlns="" val="1"/>
               </p:ext>
             </p:extLst>
           </p:nvPr>
@@ -17990,7 +16602,7 @@
           <p:cNvPr id="2" name="Title 1">
             <a:extLst>
               <a:ext uri="{FF2B5EF4-FFF2-40B4-BE49-F238E27FC236}">
-                <a16:creationId xmlns:a16="http://schemas.microsoft.com/office/drawing/2014/main" id="{DD648CF1-C72A-4313-8FC7-BF6DD4642AFE}"/>
+                <a16:creationId xmlns:a16="http://schemas.microsoft.com/office/drawing/2014/main" xmlns="" id="{DD648CF1-C72A-4313-8FC7-BF6DD4642AFE}"/>
               </a:ext>
             </a:extLst>
           </p:cNvPr>
@@ -18028,10 +16640,10 @@
           <p:cNvPr id="33" name="Freeform: Shape 32">
             <a:extLst>
               <a:ext uri="{FF2B5EF4-FFF2-40B4-BE49-F238E27FC236}">
-                <a16:creationId xmlns:a16="http://schemas.microsoft.com/office/drawing/2014/main" id="{0007FE00-9498-4706-B255-6437B0252C02}"/>
+                <a16:creationId xmlns:a16="http://schemas.microsoft.com/office/drawing/2014/main" xmlns="" id="{0007FE00-9498-4706-B255-6437B0252C02}"/>
               </a:ext>
               <a:ext uri="{C183D7F6-B498-43B3-948B-1728B52AA6E4}">
-                <adec:decorative xmlns:adec="http://schemas.microsoft.com/office/drawing/2017/decorative" val="1"/>
+                <adec:decorative xmlns:adec="http://schemas.microsoft.com/office/drawing/2017/decorative" xmlns="" val="1"/>
               </a:ext>
             </a:extLst>
           </p:cNvPr>
@@ -18041,7 +16653,7 @@
           <p:nvPr>
             <p:extLst>
               <p:ext uri="{386F3935-93C4-4BCD-93E2-E3B085C9AB24}">
-                <p16:designElem xmlns:p16="http://schemas.microsoft.com/office/powerpoint/2015/main" val="1"/>
+                <p16:designElem xmlns:p16="http://schemas.microsoft.com/office/powerpoint/2015/main" xmlns="" val="1"/>
               </p:ext>
             </p:extLst>
           </p:nvPr>
@@ -18164,7 +16776,7 @@
           <p:cNvPr id="35" name="Content Placeholder 5">
             <a:extLst>
               <a:ext uri="{FF2B5EF4-FFF2-40B4-BE49-F238E27FC236}">
-                <a16:creationId xmlns:a16="http://schemas.microsoft.com/office/drawing/2014/main" id="{B6C9D6D1-A819-FDEA-6A47-F4D16D88855F}"/>
+                <a16:creationId xmlns:a16="http://schemas.microsoft.com/office/drawing/2014/main" xmlns="" id="{B6C9D6D1-A819-FDEA-6A47-F4D16D88855F}"/>
               </a:ext>
             </a:extLst>
           </p:cNvPr>
@@ -18195,7 +16807,7 @@
           <p:cNvPr id="3" name="Graphic 2" descr="Blackboard">
             <a:extLst>
               <a:ext uri="{FF2B5EF4-FFF2-40B4-BE49-F238E27FC236}">
-                <a16:creationId xmlns:a16="http://schemas.microsoft.com/office/drawing/2014/main" id="{462F7C43-722C-E3E6-CA5A-0C1C61B0D63E}"/>
+                <a16:creationId xmlns:a16="http://schemas.microsoft.com/office/drawing/2014/main" xmlns="" id="{462F7C43-722C-E3E6-CA5A-0C1C61B0D63E}"/>
               </a:ext>
             </a:extLst>
           </p:cNvPr>
@@ -18211,7 +16823,7 @@
                 <a14:useLocalDpi xmlns:a14="http://schemas.microsoft.com/office/drawing/2010/main" val="0"/>
               </a:ext>
               <a:ext uri="{96DAC541-7B7A-43D3-8B79-37D633B846F1}">
-                <asvg:svgBlip xmlns:asvg="http://schemas.microsoft.com/office/drawing/2016/SVG/main" r:embed="rId9"/>
+                <asvg:svgBlip xmlns:asvg="http://schemas.microsoft.com/office/drawing/2016/SVG/main" xmlns="" r:embed="rId9"/>
               </a:ext>
             </a:extLst>
           </a:blip>
@@ -18355,10 +16967,10 @@
           <p:cNvPr id="29" name="Rectangle 28">
             <a:extLst>
               <a:ext uri="{FF2B5EF4-FFF2-40B4-BE49-F238E27FC236}">
-                <a16:creationId xmlns:a16="http://schemas.microsoft.com/office/drawing/2014/main" id="{2EB492CD-616E-47F8-933B-5E2D952A0593}"/>
+                <a16:creationId xmlns:a16="http://schemas.microsoft.com/office/drawing/2014/main" xmlns="" id="{2EB492CD-616E-47F8-933B-5E2D952A0593}"/>
               </a:ext>
               <a:ext uri="{C183D7F6-B498-43B3-948B-1728B52AA6E4}">
-                <adec:decorative xmlns:adec="http://schemas.microsoft.com/office/drawing/2017/decorative" val="1"/>
+                <adec:decorative xmlns:adec="http://schemas.microsoft.com/office/drawing/2017/decorative" xmlns="" val="1"/>
               </a:ext>
             </a:extLst>
           </p:cNvPr>
@@ -18368,7 +16980,7 @@
           <p:nvPr>
             <p:extLst>
               <p:ext uri="{386F3935-93C4-4BCD-93E2-E3B085C9AB24}">
-                <p16:designElem xmlns:p16="http://schemas.microsoft.com/office/powerpoint/2015/main" val="1"/>
+                <p16:designElem xmlns:p16="http://schemas.microsoft.com/office/powerpoint/2015/main" xmlns="" val="1"/>
               </p:ext>
             </p:extLst>
           </p:nvPr>
@@ -18509,10 +17121,10 @@
           <p:cNvPr id="31" name="Arc 30">
             <a:extLst>
               <a:ext uri="{FF2B5EF4-FFF2-40B4-BE49-F238E27FC236}">
-                <a16:creationId xmlns:a16="http://schemas.microsoft.com/office/drawing/2014/main" id="{59383CF9-23B5-4335-9B21-1791C4CF1C75}"/>
+                <a16:creationId xmlns:a16="http://schemas.microsoft.com/office/drawing/2014/main" xmlns="" id="{59383CF9-23B5-4335-9B21-1791C4CF1C75}"/>
               </a:ext>
               <a:ext uri="{C183D7F6-B498-43B3-948B-1728B52AA6E4}">
-                <adec:decorative xmlns:adec="http://schemas.microsoft.com/office/drawing/2017/decorative" val="1"/>
+                <adec:decorative xmlns:adec="http://schemas.microsoft.com/office/drawing/2017/decorative" xmlns="" val="1"/>
               </a:ext>
             </a:extLst>
           </p:cNvPr>
@@ -18522,7 +17134,7 @@
           <p:nvPr>
             <p:extLst>
               <p:ext uri="{386F3935-93C4-4BCD-93E2-E3B085C9AB24}">
-                <p16:designElem xmlns:p16="http://schemas.microsoft.com/office/powerpoint/2015/main" val="1"/>
+                <p16:designElem xmlns:p16="http://schemas.microsoft.com/office/powerpoint/2015/main" xmlns="" val="1"/>
               </p:ext>
             </p:extLst>
           </p:nvPr>
@@ -18603,7 +17215,7 @@
           <p:cNvPr id="2" name="Title 1">
             <a:extLst>
               <a:ext uri="{FF2B5EF4-FFF2-40B4-BE49-F238E27FC236}">
-                <a16:creationId xmlns:a16="http://schemas.microsoft.com/office/drawing/2014/main" id="{DD648CF1-C72A-4313-8FC7-BF6DD4642AFE}"/>
+                <a16:creationId xmlns:a16="http://schemas.microsoft.com/office/drawing/2014/main" xmlns="" id="{DD648CF1-C72A-4313-8FC7-BF6DD4642AFE}"/>
               </a:ext>
             </a:extLst>
           </p:cNvPr>
@@ -18644,10 +17256,10 @@
           <p:cNvPr id="33" name="Freeform: Shape 32">
             <a:extLst>
               <a:ext uri="{FF2B5EF4-FFF2-40B4-BE49-F238E27FC236}">
-                <a16:creationId xmlns:a16="http://schemas.microsoft.com/office/drawing/2014/main" id="{0007FE00-9498-4706-B255-6437B0252C02}"/>
+                <a16:creationId xmlns:a16="http://schemas.microsoft.com/office/drawing/2014/main" xmlns="" id="{0007FE00-9498-4706-B255-6437B0252C02}"/>
               </a:ext>
               <a:ext uri="{C183D7F6-B498-43B3-948B-1728B52AA6E4}">
-                <adec:decorative xmlns:adec="http://schemas.microsoft.com/office/drawing/2017/decorative" val="1"/>
+                <adec:decorative xmlns:adec="http://schemas.microsoft.com/office/drawing/2017/decorative" xmlns="" val="1"/>
               </a:ext>
             </a:extLst>
           </p:cNvPr>
@@ -18657,7 +17269,7 @@
           <p:nvPr>
             <p:extLst>
               <p:ext uri="{386F3935-93C4-4BCD-93E2-E3B085C9AB24}">
-                <p16:designElem xmlns:p16="http://schemas.microsoft.com/office/powerpoint/2015/main" val="1"/>
+                <p16:designElem xmlns:p16="http://schemas.microsoft.com/office/powerpoint/2015/main" xmlns="" val="1"/>
               </p:ext>
             </p:extLst>
           </p:nvPr>
@@ -18780,7 +17392,7 @@
           <p:cNvPr id="35" name="Content Placeholder 5">
             <a:extLst>
               <a:ext uri="{FF2B5EF4-FFF2-40B4-BE49-F238E27FC236}">
-                <a16:creationId xmlns:a16="http://schemas.microsoft.com/office/drawing/2014/main" id="{B6C9D6D1-A819-FDEA-6A47-F4D16D88855F}"/>
+                <a16:creationId xmlns:a16="http://schemas.microsoft.com/office/drawing/2014/main" xmlns="" id="{B6C9D6D1-A819-FDEA-6A47-F4D16D88855F}"/>
               </a:ext>
             </a:extLst>
           </p:cNvPr>
@@ -18811,7 +17423,7 @@
           <p:cNvPr id="4" name="Graphic 3" descr="Open Book">
             <a:extLst>
               <a:ext uri="{FF2B5EF4-FFF2-40B4-BE49-F238E27FC236}">
-                <a16:creationId xmlns:a16="http://schemas.microsoft.com/office/drawing/2014/main" id="{90DC0918-5555-ED40-DE2B-8DCC861173A5}"/>
+                <a16:creationId xmlns:a16="http://schemas.microsoft.com/office/drawing/2014/main" xmlns="" id="{90DC0918-5555-ED40-DE2B-8DCC861173A5}"/>
               </a:ext>
             </a:extLst>
           </p:cNvPr>
@@ -18827,7 +17439,7 @@
                 <a14:useLocalDpi xmlns:a14="http://schemas.microsoft.com/office/drawing/2010/main" val="0"/>
               </a:ext>
               <a:ext uri="{96DAC541-7B7A-43D3-8B79-37D633B846F1}">
-                <asvg:svgBlip xmlns:asvg="http://schemas.microsoft.com/office/drawing/2016/SVG/main" r:embed="rId9"/>
+                <asvg:svgBlip xmlns:asvg="http://schemas.microsoft.com/office/drawing/2016/SVG/main" xmlns="" r:embed="rId9"/>
               </a:ext>
             </a:extLst>
           </a:blip>
@@ -18971,7 +17583,7 @@
           <p:cNvPr id="2" name="Title 1">
             <a:extLst>
               <a:ext uri="{FF2B5EF4-FFF2-40B4-BE49-F238E27FC236}">
-                <a16:creationId xmlns:a16="http://schemas.microsoft.com/office/drawing/2014/main" id="{A98F6D58-1A39-41ED-99F7-0CE9F03BD344}"/>
+                <a16:creationId xmlns:a16="http://schemas.microsoft.com/office/drawing/2014/main" xmlns="" id="{A98F6D58-1A39-41ED-99F7-0CE9F03BD344}"/>
               </a:ext>
             </a:extLst>
           </p:cNvPr>
@@ -19008,6 +17620,13 @@
                 <a:cs typeface="Segoe UI" panose="020B0502040204020203" pitchFamily="34" charset="0"/>
               </a:rPr>
             </a:br>
+            <a:r>
+              <a:rPr lang="en-US" dirty="0">
+                <a:latin typeface="Franklin Gothic Book" panose="020B0503020102020204" pitchFamily="34" charset="0"/>
+                <a:cs typeface="Segoe UI" panose="020B0502040204020203" pitchFamily="34" charset="0"/>
+              </a:rPr>
+              <a:t/>
+            </a:r>
             <a:br>
               <a:rPr lang="en-US" dirty="0">
                 <a:latin typeface="Franklin Gothic Book" panose="020B0503020102020204" pitchFamily="34" charset="0"/>
@@ -19029,7 +17648,7 @@
           <p:cNvPr id="4" name="Graphic 3" descr="Chat">
             <a:extLst>
               <a:ext uri="{FF2B5EF4-FFF2-40B4-BE49-F238E27FC236}">
-                <a16:creationId xmlns:a16="http://schemas.microsoft.com/office/drawing/2014/main" id="{AEE98CC8-0F49-4433-9FD0-35E20C04B5DC}"/>
+                <a16:creationId xmlns:a16="http://schemas.microsoft.com/office/drawing/2014/main" xmlns="" id="{AEE98CC8-0F49-4433-9FD0-35E20C04B5DC}"/>
               </a:ext>
             </a:extLst>
           </p:cNvPr>
@@ -19039,13 +17658,13 @@
           <p:nvPr/>
         </p:nvPicPr>
         <p:blipFill>
-          <a:blip r:embed="rId3">
+          <a:blip r:embed="rId3" cstate="print">
             <a:extLst>
               <a:ext uri="{28A0092B-C50C-407E-A947-70E740481C1C}">
                 <a14:useLocalDpi xmlns:a14="http://schemas.microsoft.com/office/drawing/2010/main" val="0"/>
               </a:ext>
               <a:ext uri="{96DAC541-7B7A-43D3-8B79-37D633B846F1}">
-                <asvg:svgBlip xmlns:asvg="http://schemas.microsoft.com/office/drawing/2016/SVG/main" r:embed="rId4"/>
+                <asvg:svgBlip xmlns:asvg="http://schemas.microsoft.com/office/drawing/2016/SVG/main" xmlns="" r:embed="rId4"/>
               </a:ext>
             </a:extLst>
           </a:blip>
@@ -19068,10 +17687,10 @@
           <p:cNvPr id="8" name="Graphic 7">
             <a:extLst>
               <a:ext uri="{FF2B5EF4-FFF2-40B4-BE49-F238E27FC236}">
-                <a16:creationId xmlns:a16="http://schemas.microsoft.com/office/drawing/2014/main" id="{590430A8-7125-464C-98BA-3409573DB574}"/>
+                <a16:creationId xmlns:a16="http://schemas.microsoft.com/office/drawing/2014/main" xmlns="" id="{590430A8-7125-464C-98BA-3409573DB574}"/>
               </a:ext>
               <a:ext uri="{C183D7F6-B498-43B3-948B-1728B52AA6E4}">
-                <adec:decorative xmlns:adec="http://schemas.microsoft.com/office/drawing/2017/decorative" val="1"/>
+                <adec:decorative xmlns:adec="http://schemas.microsoft.com/office/drawing/2017/decorative" xmlns="" val="1"/>
               </a:ext>
             </a:extLst>
           </p:cNvPr>
@@ -19081,20 +17700,20 @@
           <p:nvPr>
             <p:extLst>
               <p:ext uri="{386F3935-93C4-4BCD-93E2-E3B085C9AB24}">
-                <p16:designElem xmlns:p16="http://schemas.microsoft.com/office/powerpoint/2015/main" val="1"/>
+                <p16:designElem xmlns:p16="http://schemas.microsoft.com/office/powerpoint/2015/main" xmlns="" val="1"/>
               </p:ext>
             </p:extLst>
           </p:nvPr>
         </p:nvPicPr>
         <p:blipFill>
-          <a:blip r:embed="rId3">
+          <a:blip r:embed="rId5">
             <a:alphaModFix amt="15000"/>
             <a:extLst>
               <a:ext uri="{28A0092B-C50C-407E-A947-70E740481C1C}">
                 <a14:useLocalDpi xmlns:a14="http://schemas.microsoft.com/office/drawing/2010/main" val="0"/>
               </a:ext>
               <a:ext uri="{96DAC541-7B7A-43D3-8B79-37D633B846F1}">
-                <asvg:svgBlip xmlns:asvg="http://schemas.microsoft.com/office/drawing/2016/SVG/main" r:embed="rId5"/>
+                <asvg:svgBlip xmlns:asvg="http://schemas.microsoft.com/office/drawing/2016/SVG/main" xmlns="" r:embed="rId6"/>
               </a:ext>
             </a:extLst>
           </a:blip>
@@ -19116,6 +17735,130 @@
     <p:extLst>
       <p:ext uri="{BB962C8B-B14F-4D97-AF65-F5344CB8AC3E}">
         <p14:creationId xmlns:p14="http://schemas.microsoft.com/office/powerpoint/2010/main" val="2880909745"/>
+      </p:ext>
+    </p:extLst>
+  </p:cSld>
+  <p:clrMapOvr>
+    <a:masterClrMapping/>
+  </p:clrMapOvr>
+</p:sld>
+</file>
+
+<file path=ppt/slides/slide8.xml><?xml version="1.0" encoding="utf-8"?>
+<p:sld xmlns:a="http://schemas.openxmlformats.org/drawingml/2006/main" xmlns:r="http://schemas.openxmlformats.org/officeDocument/2006/relationships" xmlns:p="http://schemas.openxmlformats.org/presentationml/2006/main">
+  <p:cSld>
+    <p:spTree>
+      <p:nvGrpSpPr>
+        <p:cNvPr id="1" name=""/>
+        <p:cNvGrpSpPr/>
+        <p:nvPr/>
+      </p:nvGrpSpPr>
+      <p:grpSpPr>
+        <a:xfrm>
+          <a:off x="0" y="0"/>
+          <a:ext cx="0" cy="0"/>
+          <a:chOff x="0" y="0"/>
+          <a:chExt cx="0" cy="0"/>
+        </a:xfrm>
+      </p:grpSpPr>
+      <p:sp>
+        <p:nvSpPr>
+          <p:cNvPr id="2" name="Title 1">
+            <a:extLst>
+              <a:ext uri="{FF2B5EF4-FFF2-40B4-BE49-F238E27FC236}">
+                <a16:creationId xmlns:a16="http://schemas.microsoft.com/office/drawing/2014/main" xmlns="" id="{8F9B89BF-165F-1D74-5422-0DDBC1303FFC}"/>
+              </a:ext>
+            </a:extLst>
+          </p:cNvPr>
+          <p:cNvSpPr>
+            <a:spLocks noGrp="1"/>
+          </p:cNvSpPr>
+          <p:nvPr>
+            <p:ph type="title"/>
+          </p:nvPr>
+        </p:nvSpPr>
+        <p:spPr/>
+        <p:txBody>
+          <a:bodyPr/>
+          <a:lstStyle/>
+          <a:p>
+            <a:r>
+              <a:rPr lang="en-US" dirty="0"/>
+              <a:t>Link to the Presentation Video</a:t>
+            </a:r>
+          </a:p>
+        </p:txBody>
+      </p:sp>
+      <p:sp>
+        <p:nvSpPr>
+          <p:cNvPr id="3" name="Content Placeholder 2">
+            <a:extLst>
+              <a:ext uri="{FF2B5EF4-FFF2-40B4-BE49-F238E27FC236}">
+                <a16:creationId xmlns:a16="http://schemas.microsoft.com/office/drawing/2014/main" xmlns="" id="{51E6C646-F6F6-738A-55F6-44BE664A9F2E}"/>
+              </a:ext>
+            </a:extLst>
+          </p:cNvPr>
+          <p:cNvSpPr>
+            <a:spLocks noGrp="1"/>
+          </p:cNvSpPr>
+          <p:nvPr>
+            <p:ph idx="1"/>
+          </p:nvPr>
+        </p:nvSpPr>
+        <p:spPr>
+          <a:xfrm>
+            <a:off x="838200" y="1825625"/>
+            <a:ext cx="10866120" cy="1603375"/>
+          </a:xfrm>
+        </p:spPr>
+        <p:txBody>
+          <a:bodyPr>
+            <a:normAutofit fontScale="92500" lnSpcReduction="10000"/>
+          </a:bodyPr>
+          <a:lstStyle/>
+          <a:p>
+            <a:r>
+              <a:rPr lang="en-US" sz="3600" dirty="0">
+                <a:hlinkClick r:id="rId2"/>
+              </a:rPr>
+              <a:t>Link to </a:t>
+            </a:r>
+            <a:r>
+              <a:rPr lang="en-US" sz="3600" dirty="0" err="1">
+                <a:hlinkClick r:id="rId2"/>
+              </a:rPr>
+              <a:t>youtube</a:t>
+            </a:r>
+            <a:r>
+              <a:rPr lang="en-US" sz="3600" dirty="0">
+                <a:hlinkClick r:id="rId2"/>
+              </a:rPr>
+              <a:t> </a:t>
+            </a:r>
+            <a:r>
+              <a:rPr lang="en-US" sz="3600" dirty="0" smtClean="0">
+                <a:hlinkClick r:id="rId2"/>
+              </a:rPr>
+              <a:t>video</a:t>
+            </a:r>
+            <a:endParaRPr lang="en-US" sz="3600" dirty="0" smtClean="0"/>
+          </a:p>
+          <a:p>
+            <a:endParaRPr lang="en-US" sz="3600" dirty="0" smtClean="0"/>
+          </a:p>
+          <a:p>
+            <a:r>
+              <a:rPr lang="en-US" sz="3600" dirty="0"/>
+              <a:t>https://youtu.be/j8Yv0dvDsPw?si=TtRfr5NxKdcqmx6E</a:t>
+            </a:r>
+            <a:endParaRPr lang="en-US" sz="3600" dirty="0"/>
+          </a:p>
+        </p:txBody>
+      </p:sp>
+    </p:spTree>
+    <p:extLst>
+      <p:ext uri="{BB962C8B-B14F-4D97-AF65-F5344CB8AC3E}">
+        <p14:creationId xmlns:p14="http://schemas.microsoft.com/office/powerpoint/2010/main" val="3755171509"/>
       </p:ext>
     </p:extLst>
   </p:cSld>

</xml_diff>